<commit_message>
figures overhall lagrange math added for HOPHMM BW
</commit_message>
<xml_diff>
--- a/Help/Figures2.pptx
+++ b/Help/Figures2.pptx
@@ -228,7 +228,7 @@
           <a:p>
             <a:fld id="{C07E4396-26A3-4143-A0A3-BBC18DD0CEAD}" type="datetimeFigureOut">
               <a:rPr lang="en-US" smtClean="0"/>
-              <a:t>2020-01-20</a:t>
+              <a:t>2020-01-30</a:t>
             </a:fld>
             <a:endParaRPr lang="en-US" dirty="0"/>
           </a:p>
@@ -792,7 +792,7 @@
           <a:p>
             <a:fld id="{2DC2A043-560F-4D2E-8D1E-02B02E053659}" type="datetimeFigureOut">
               <a:rPr lang="en-US" smtClean="0"/>
-              <a:t>2020-01-20</a:t>
+              <a:t>2020-01-30</a:t>
             </a:fld>
             <a:endParaRPr lang="en-US" dirty="0"/>
           </a:p>
@@ -960,7 +960,7 @@
           <a:p>
             <a:fld id="{2DC2A043-560F-4D2E-8D1E-02B02E053659}" type="datetimeFigureOut">
               <a:rPr lang="en-US" smtClean="0"/>
-              <a:t>2020-01-20</a:t>
+              <a:t>2020-01-30</a:t>
             </a:fld>
             <a:endParaRPr lang="en-US" dirty="0"/>
           </a:p>
@@ -1138,7 +1138,7 @@
           <a:p>
             <a:fld id="{2DC2A043-560F-4D2E-8D1E-02B02E053659}" type="datetimeFigureOut">
               <a:rPr lang="en-US" smtClean="0"/>
-              <a:t>2020-01-20</a:t>
+              <a:t>2020-01-30</a:t>
             </a:fld>
             <a:endParaRPr lang="en-US" dirty="0"/>
           </a:p>
@@ -1306,7 +1306,7 @@
           <a:p>
             <a:fld id="{2DC2A043-560F-4D2E-8D1E-02B02E053659}" type="datetimeFigureOut">
               <a:rPr lang="en-US" smtClean="0"/>
-              <a:t>2020-01-20</a:t>
+              <a:t>2020-01-30</a:t>
             </a:fld>
             <a:endParaRPr lang="en-US" dirty="0"/>
           </a:p>
@@ -1551,7 +1551,7 @@
           <a:p>
             <a:fld id="{2DC2A043-560F-4D2E-8D1E-02B02E053659}" type="datetimeFigureOut">
               <a:rPr lang="en-US" smtClean="0"/>
-              <a:t>2020-01-20</a:t>
+              <a:t>2020-01-30</a:t>
             </a:fld>
             <a:endParaRPr lang="en-US" dirty="0"/>
           </a:p>
@@ -1780,7 +1780,7 @@
           <a:p>
             <a:fld id="{2DC2A043-560F-4D2E-8D1E-02B02E053659}" type="datetimeFigureOut">
               <a:rPr lang="en-US" smtClean="0"/>
-              <a:t>2020-01-20</a:t>
+              <a:t>2020-01-30</a:t>
             </a:fld>
             <a:endParaRPr lang="en-US" dirty="0"/>
           </a:p>
@@ -2144,7 +2144,7 @@
           <a:p>
             <a:fld id="{2DC2A043-560F-4D2E-8D1E-02B02E053659}" type="datetimeFigureOut">
               <a:rPr lang="en-US" smtClean="0"/>
-              <a:t>2020-01-20</a:t>
+              <a:t>2020-01-30</a:t>
             </a:fld>
             <a:endParaRPr lang="en-US" dirty="0"/>
           </a:p>
@@ -2261,7 +2261,7 @@
           <a:p>
             <a:fld id="{2DC2A043-560F-4D2E-8D1E-02B02E053659}" type="datetimeFigureOut">
               <a:rPr lang="en-US" smtClean="0"/>
-              <a:t>2020-01-20</a:t>
+              <a:t>2020-01-30</a:t>
             </a:fld>
             <a:endParaRPr lang="en-US" dirty="0"/>
           </a:p>
@@ -2356,7 +2356,7 @@
           <a:p>
             <a:fld id="{2DC2A043-560F-4D2E-8D1E-02B02E053659}" type="datetimeFigureOut">
               <a:rPr lang="en-US" smtClean="0"/>
-              <a:t>2020-01-20</a:t>
+              <a:t>2020-01-30</a:t>
             </a:fld>
             <a:endParaRPr lang="en-US" dirty="0"/>
           </a:p>
@@ -2631,7 +2631,7 @@
           <a:p>
             <a:fld id="{2DC2A043-560F-4D2E-8D1E-02B02E053659}" type="datetimeFigureOut">
               <a:rPr lang="en-US" smtClean="0"/>
-              <a:t>2020-01-20</a:t>
+              <a:t>2020-01-30</a:t>
             </a:fld>
             <a:endParaRPr lang="en-US" dirty="0"/>
           </a:p>
@@ -2883,7 +2883,7 @@
           <a:p>
             <a:fld id="{2DC2A043-560F-4D2E-8D1E-02B02E053659}" type="datetimeFigureOut">
               <a:rPr lang="en-US" smtClean="0"/>
-              <a:t>2020-01-20</a:t>
+              <a:t>2020-01-30</a:t>
             </a:fld>
             <a:endParaRPr lang="en-US" dirty="0"/>
           </a:p>
@@ -3094,7 +3094,7 @@
           <a:p>
             <a:fld id="{2DC2A043-560F-4D2E-8D1E-02B02E053659}" type="datetimeFigureOut">
               <a:rPr lang="en-US" smtClean="0"/>
-              <a:t>2020-01-20</a:t>
+              <a:t>2020-01-30</a:t>
             </a:fld>
             <a:endParaRPr lang="en-US" dirty="0"/>
           </a:p>
@@ -3508,9 +3508,9 @@
         <p:grpSpPr>
           <a:xfrm>
             <a:off x="1325281" y="916112"/>
-            <a:ext cx="9312239" cy="5396248"/>
+            <a:ext cx="9312239" cy="5391736"/>
             <a:chOff x="1325281" y="916112"/>
-            <a:chExt cx="9312239" cy="5396248"/>
+            <a:chExt cx="9312239" cy="5391736"/>
           </a:xfrm>
         </p:grpSpPr>
         <p:cxnSp>
@@ -3801,25 +3801,7 @@
                             </a:solidFill>
                             <a:latin typeface="Cambria Math" panose="02040503050406030204" pitchFamily="18" charset="0"/>
                           </a:rPr>
-                          <m:t>0</m:t>
-                        </m:r>
-                        <m:r>
-                          <a:rPr lang="en-US" sz="1700" b="0" i="1" smtClean="0">
-                            <a:solidFill>
-                              <a:schemeClr val="bg1"/>
-                            </a:solidFill>
-                            <a:latin typeface="Cambria Math" panose="02040503050406030204" pitchFamily="18" charset="0"/>
-                          </a:rPr>
-                          <m:t>.</m:t>
-                        </m:r>
-                        <m:r>
-                          <a:rPr lang="en-US" sz="1700" b="0" i="1" smtClean="0">
-                            <a:solidFill>
-                              <a:schemeClr val="bg1"/>
-                            </a:solidFill>
-                            <a:latin typeface="Cambria Math" panose="02040503050406030204" pitchFamily="18" charset="0"/>
-                          </a:rPr>
-                          <m:t>8</m:t>
+                          <m:t>0.8</m:t>
                         </m:r>
                       </m:oMath>
                     </m:oMathPara>
@@ -4108,16 +4090,7 @@
                             </a:solidFill>
                             <a:latin typeface="Cambria Math" panose="02040503050406030204" pitchFamily="18" charset="0"/>
                           </a:rPr>
-                          <m:t> </m:t>
-                        </m:r>
-                        <m:r>
-                          <a:rPr lang="en-US" sz="1700" b="0" i="1" smtClean="0">
-                            <a:solidFill>
-                              <a:schemeClr val="tx1"/>
-                            </a:solidFill>
-                            <a:latin typeface="Cambria Math" panose="02040503050406030204" pitchFamily="18" charset="0"/>
-                          </a:rPr>
-                          <m:t>0</m:t>
+                          <m:t> 0</m:t>
                         </m:r>
                         <m:r>
                           <a:rPr lang="en-US" sz="1700" b="0" i="0" smtClean="0">
@@ -4745,34 +4718,7 @@
                             </a:solidFill>
                             <a:latin typeface="Cambria Math" panose="02040503050406030204" pitchFamily="18" charset="0"/>
                           </a:rPr>
-                          <m:t> </m:t>
-                        </m:r>
-                        <m:r>
-                          <a:rPr lang="en-US" sz="1700" b="0" i="1" smtClean="0">
-                            <a:solidFill>
-                              <a:schemeClr val="tx1"/>
-                            </a:solidFill>
-                            <a:latin typeface="Cambria Math" panose="02040503050406030204" pitchFamily="18" charset="0"/>
-                          </a:rPr>
-                          <m:t>0</m:t>
-                        </m:r>
-                        <m:r>
-                          <a:rPr lang="en-US" sz="1700" b="0" i="1" smtClean="0">
-                            <a:solidFill>
-                              <a:schemeClr val="tx1"/>
-                            </a:solidFill>
-                            <a:latin typeface="Cambria Math" panose="02040503050406030204" pitchFamily="18" charset="0"/>
-                          </a:rPr>
-                          <m:t>.</m:t>
-                        </m:r>
-                        <m:r>
-                          <a:rPr lang="en-US" sz="1700" b="0" i="1" smtClean="0">
-                            <a:solidFill>
-                              <a:schemeClr val="tx1"/>
-                            </a:solidFill>
-                            <a:latin typeface="Cambria Math" panose="02040503050406030204" pitchFamily="18" charset="0"/>
-                          </a:rPr>
-                          <m:t>1</m:t>
+                          <m:t> 0.1</m:t>
                         </m:r>
                       </m:oMath>
                     </m:oMathPara>
@@ -4881,34 +4827,7 @@
                             </a:solidFill>
                             <a:latin typeface="Cambria Math" panose="02040503050406030204" pitchFamily="18" charset="0"/>
                           </a:rPr>
-                          <m:t> </m:t>
-                        </m:r>
-                        <m:r>
-                          <a:rPr lang="en-US" sz="1700" b="0" i="1" smtClean="0">
-                            <a:solidFill>
-                              <a:sysClr val="windowText" lastClr="000000"/>
-                            </a:solidFill>
-                            <a:latin typeface="Cambria Math" panose="02040503050406030204" pitchFamily="18" charset="0"/>
-                          </a:rPr>
-                          <m:t>0</m:t>
-                        </m:r>
-                        <m:r>
-                          <a:rPr lang="en-US" sz="1700" b="0" i="1" smtClean="0">
-                            <a:solidFill>
-                              <a:sysClr val="windowText" lastClr="000000"/>
-                            </a:solidFill>
-                            <a:latin typeface="Cambria Math" panose="02040503050406030204" pitchFamily="18" charset="0"/>
-                          </a:rPr>
-                          <m:t>.</m:t>
-                        </m:r>
-                        <m:r>
-                          <a:rPr lang="en-US" sz="1700" b="0" i="1" smtClean="0">
-                            <a:solidFill>
-                              <a:sysClr val="windowText" lastClr="000000"/>
-                            </a:solidFill>
-                            <a:latin typeface="Cambria Math" panose="02040503050406030204" pitchFamily="18" charset="0"/>
-                          </a:rPr>
-                          <m:t>05</m:t>
+                          <m:t> 0.05</m:t>
                         </m:r>
                       </m:oMath>
                     </m:oMathPara>
@@ -5015,34 +4934,7 @@
                             </a:solidFill>
                             <a:latin typeface="Cambria Math" panose="02040503050406030204" pitchFamily="18" charset="0"/>
                           </a:rPr>
-                          <m:t> </m:t>
-                        </m:r>
-                        <m:r>
-                          <a:rPr lang="en-US" sz="1700" b="0" i="1" smtClean="0">
-                            <a:solidFill>
-                              <a:schemeClr val="tx1"/>
-                            </a:solidFill>
-                            <a:latin typeface="Cambria Math" panose="02040503050406030204" pitchFamily="18" charset="0"/>
-                          </a:rPr>
-                          <m:t>0</m:t>
-                        </m:r>
-                        <m:r>
-                          <a:rPr lang="en-US" sz="1700" b="0" i="1" smtClean="0">
-                            <a:solidFill>
-                              <a:schemeClr val="tx1"/>
-                            </a:solidFill>
-                            <a:latin typeface="Cambria Math" panose="02040503050406030204" pitchFamily="18" charset="0"/>
-                          </a:rPr>
-                          <m:t>.</m:t>
-                        </m:r>
-                        <m:r>
-                          <a:rPr lang="en-US" sz="1700" b="0" i="1" smtClean="0">
-                            <a:solidFill>
-                              <a:schemeClr val="tx1"/>
-                            </a:solidFill>
-                            <a:latin typeface="Cambria Math" panose="02040503050406030204" pitchFamily="18" charset="0"/>
-                          </a:rPr>
-                          <m:t>0</m:t>
+                          <m:t> 0.0</m:t>
                         </m:r>
                       </m:oMath>
                     </m:oMathPara>
@@ -5151,34 +5043,7 @@
                             </a:solidFill>
                             <a:latin typeface="Cambria Math" panose="02040503050406030204" pitchFamily="18" charset="0"/>
                           </a:rPr>
-                          <m:t> </m:t>
-                        </m:r>
-                        <m:r>
-                          <a:rPr lang="en-US" sz="1700" b="0" i="1" smtClean="0">
-                            <a:solidFill>
-                              <a:sysClr val="windowText" lastClr="000000"/>
-                            </a:solidFill>
-                            <a:latin typeface="Cambria Math" panose="02040503050406030204" pitchFamily="18" charset="0"/>
-                          </a:rPr>
-                          <m:t>0</m:t>
-                        </m:r>
-                        <m:r>
-                          <a:rPr lang="en-US" sz="1700" b="0" i="1" smtClean="0">
-                            <a:solidFill>
-                              <a:sysClr val="windowText" lastClr="000000"/>
-                            </a:solidFill>
-                            <a:latin typeface="Cambria Math" panose="02040503050406030204" pitchFamily="18" charset="0"/>
-                          </a:rPr>
-                          <m:t>.</m:t>
-                        </m:r>
-                        <m:r>
-                          <a:rPr lang="en-US" sz="1700" b="0" i="1" smtClean="0">
-                            <a:solidFill>
-                              <a:sysClr val="windowText" lastClr="000000"/>
-                            </a:solidFill>
-                            <a:latin typeface="Cambria Math" panose="02040503050406030204" pitchFamily="18" charset="0"/>
-                          </a:rPr>
-                          <m:t>05</m:t>
+                          <m:t> 0.05</m:t>
                         </m:r>
                       </m:oMath>
                     </m:oMathPara>
@@ -5288,34 +5153,7 @@
                             </a:solidFill>
                             <a:latin typeface="Cambria Math" panose="02040503050406030204" pitchFamily="18" charset="0"/>
                           </a:rPr>
-                          <m:t> </m:t>
-                        </m:r>
-                        <m:r>
-                          <a:rPr lang="en-US" sz="1700" b="0" i="1" smtClean="0">
-                            <a:solidFill>
-                              <a:schemeClr val="bg1"/>
-                            </a:solidFill>
-                            <a:latin typeface="Cambria Math" panose="02040503050406030204" pitchFamily="18" charset="0"/>
-                          </a:rPr>
-                          <m:t>0</m:t>
-                        </m:r>
-                        <m:r>
-                          <a:rPr lang="en-US" sz="1700" b="0" i="1" smtClean="0">
-                            <a:solidFill>
-                              <a:schemeClr val="bg1"/>
-                            </a:solidFill>
-                            <a:latin typeface="Cambria Math" panose="02040503050406030204" pitchFamily="18" charset="0"/>
-                          </a:rPr>
-                          <m:t>.</m:t>
-                        </m:r>
-                        <m:r>
-                          <a:rPr lang="en-US" sz="1700" b="0" i="1" smtClean="0">
-                            <a:solidFill>
-                              <a:schemeClr val="bg1"/>
-                            </a:solidFill>
-                            <a:latin typeface="Cambria Math" panose="02040503050406030204" pitchFamily="18" charset="0"/>
-                          </a:rPr>
-                          <m:t>8</m:t>
+                          <m:t> 0.8</m:t>
                         </m:r>
                       </m:oMath>
                     </m:oMathPara>
@@ -6584,8 +6422,8 @@
             </p:sp>
           </mc:Fallback>
         </mc:AlternateContent>
-        <mc:AlternateContent xmlns:mc="http://schemas.openxmlformats.org/markup-compatibility/2006" xmlns:a14="http://schemas.microsoft.com/office/drawing/2010/main">
-          <mc:Choice Requires="a14">
+        <mc:AlternateContent xmlns:mc="http://schemas.openxmlformats.org/markup-compatibility/2006">
+          <mc:Choice xmlns:a14="http://schemas.microsoft.com/office/drawing/2010/main" Requires="a14">
             <p:sp>
               <p:nvSpPr>
                 <p:cNvPr id="35" name="Rectangle 34"/>
@@ -6594,7 +6432,7 @@
               </p:nvSpPr>
               <p:spPr>
                 <a:xfrm>
-                  <a:off x="4917147" y="1804540"/>
+                  <a:off x="4915552" y="1804540"/>
                   <a:ext cx="502920" cy="502920"/>
                 </a:xfrm>
                 <a:prstGeom prst="rect">
@@ -6709,7 +6547,7 @@
               </p:txBody>
             </p:sp>
           </mc:Choice>
-          <mc:Fallback xmlns="">
+          <mc:Fallback>
             <p:sp>
               <p:nvSpPr>
                 <p:cNvPr id="35" name="Rectangle 34"/>
@@ -6720,7 +6558,7 @@
               </p:nvSpPr>
               <p:spPr>
                 <a:xfrm>
-                  <a:off x="4917147" y="1804540"/>
+                  <a:off x="4915552" y="1804540"/>
                   <a:ext cx="502920" cy="502920"/>
                 </a:xfrm>
                 <a:prstGeom prst="rect">
@@ -6729,7 +6567,7 @@
                 <a:blipFill rotWithShape="0">
                   <a:blip r:embed="rId26"/>
                   <a:stretch>
-                    <a:fillRect l="-10714" r="-9524"/>
+                    <a:fillRect l="-9412" r="-9412"/>
                   </a:stretch>
                 </a:blipFill>
               </p:spPr>
@@ -6748,8 +6586,8 @@
             </p:sp>
           </mc:Fallback>
         </mc:AlternateContent>
-        <mc:AlternateContent xmlns:mc="http://schemas.openxmlformats.org/markup-compatibility/2006" xmlns:a14="http://schemas.microsoft.com/office/drawing/2010/main">
-          <mc:Choice Requires="a14">
+        <mc:AlternateContent xmlns:mc="http://schemas.openxmlformats.org/markup-compatibility/2006">
+          <mc:Choice xmlns:a14="http://schemas.microsoft.com/office/drawing/2010/main" Requires="a14">
             <p:sp>
               <p:nvSpPr>
                 <p:cNvPr id="36" name="Rectangle 35"/>
@@ -6758,7 +6596,7 @@
               </p:nvSpPr>
               <p:spPr>
                 <a:xfrm>
-                  <a:off x="5422480" y="1804992"/>
+                  <a:off x="5420885" y="1804992"/>
                   <a:ext cx="502920" cy="502920"/>
                 </a:xfrm>
                 <a:prstGeom prst="rect">
@@ -6873,7 +6711,7 @@
               </p:txBody>
             </p:sp>
           </mc:Choice>
-          <mc:Fallback xmlns="">
+          <mc:Fallback>
             <p:sp>
               <p:nvSpPr>
                 <p:cNvPr id="36" name="Rectangle 35"/>
@@ -6884,7 +6722,7 @@
               </p:nvSpPr>
               <p:spPr>
                 <a:xfrm>
-                  <a:off x="5422480" y="1804992"/>
+                  <a:off x="5420885" y="1804992"/>
                   <a:ext cx="502920" cy="502920"/>
                 </a:xfrm>
                 <a:prstGeom prst="rect">
@@ -6893,7 +6731,7 @@
                 <a:blipFill rotWithShape="0">
                   <a:blip r:embed="rId27"/>
                   <a:stretch>
-                    <a:fillRect l="-10714" r="-9524"/>
+                    <a:fillRect l="-9412" r="-9412"/>
                   </a:stretch>
                 </a:blipFill>
               </p:spPr>
@@ -6912,8 +6750,8 @@
             </p:sp>
           </mc:Fallback>
         </mc:AlternateContent>
-        <mc:AlternateContent xmlns:mc="http://schemas.openxmlformats.org/markup-compatibility/2006" xmlns:a14="http://schemas.microsoft.com/office/drawing/2010/main">
-          <mc:Choice Requires="a14">
+        <mc:AlternateContent xmlns:mc="http://schemas.openxmlformats.org/markup-compatibility/2006">
+          <mc:Choice xmlns:a14="http://schemas.microsoft.com/office/drawing/2010/main" Requires="a14">
             <p:sp>
               <p:nvSpPr>
                 <p:cNvPr id="37" name="Rectangle 36"/>
@@ -6980,7 +6818,7 @@
               </p:txBody>
             </p:sp>
           </mc:Choice>
-          <mc:Fallback xmlns="">
+          <mc:Fallback>
             <p:sp>
               <p:nvSpPr>
                 <p:cNvPr id="37" name="Rectangle 36"/>
@@ -7019,8 +6857,8 @@
             </p:sp>
           </mc:Fallback>
         </mc:AlternateContent>
-        <mc:AlternateContent xmlns:mc="http://schemas.openxmlformats.org/markup-compatibility/2006" xmlns:a14="http://schemas.microsoft.com/office/drawing/2010/main">
-          <mc:Choice Requires="a14">
+        <mc:AlternateContent xmlns:mc="http://schemas.openxmlformats.org/markup-compatibility/2006">
+          <mc:Choice xmlns:a14="http://schemas.microsoft.com/office/drawing/2010/main" Requires="a14">
             <p:sp>
               <p:nvSpPr>
                 <p:cNvPr id="38" name="Rectangle 37"/>
@@ -7029,7 +6867,7 @@
               </p:nvSpPr>
               <p:spPr>
                 <a:xfrm>
-                  <a:off x="4915552" y="2307815"/>
+                  <a:off x="4915552" y="2306833"/>
                   <a:ext cx="502920" cy="502920"/>
                 </a:xfrm>
                 <a:prstGeom prst="rect">
@@ -7087,7 +6925,7 @@
               </p:txBody>
             </p:sp>
           </mc:Choice>
-          <mc:Fallback xmlns="">
+          <mc:Fallback>
             <p:sp>
               <p:nvSpPr>
                 <p:cNvPr id="38" name="Rectangle 37"/>
@@ -7098,7 +6936,7 @@
               </p:nvSpPr>
               <p:spPr>
                 <a:xfrm>
-                  <a:off x="4915552" y="2307815"/>
+                  <a:off x="4915552" y="2306833"/>
                   <a:ext cx="502920" cy="502920"/>
                 </a:xfrm>
                 <a:prstGeom prst="rect">
@@ -7126,8 +6964,8 @@
             </p:sp>
           </mc:Fallback>
         </mc:AlternateContent>
-        <mc:AlternateContent xmlns:mc="http://schemas.openxmlformats.org/markup-compatibility/2006" xmlns:a14="http://schemas.microsoft.com/office/drawing/2010/main">
-          <mc:Choice Requires="a14">
+        <mc:AlternateContent xmlns:mc="http://schemas.openxmlformats.org/markup-compatibility/2006">
+          <mc:Choice xmlns:a14="http://schemas.microsoft.com/office/drawing/2010/main" Requires="a14">
             <p:sp>
               <p:nvSpPr>
                 <p:cNvPr id="39" name="Rectangle 38"/>
@@ -7136,7 +6974,7 @@
               </p:nvSpPr>
               <p:spPr>
                 <a:xfrm>
-                  <a:off x="5420885" y="2308267"/>
+                  <a:off x="5420885" y="2306833"/>
                   <a:ext cx="502920" cy="502920"/>
                 </a:xfrm>
                 <a:prstGeom prst="rect">
@@ -7194,7 +7032,7 @@
               </p:txBody>
             </p:sp>
           </mc:Choice>
-          <mc:Fallback xmlns="">
+          <mc:Fallback>
             <p:sp>
               <p:nvSpPr>
                 <p:cNvPr id="39" name="Rectangle 38"/>
@@ -7205,7 +7043,7 @@
               </p:nvSpPr>
               <p:spPr>
                 <a:xfrm>
-                  <a:off x="5420885" y="2308267"/>
+                  <a:off x="5420885" y="2306833"/>
                   <a:ext cx="502920" cy="502920"/>
                 </a:xfrm>
                 <a:prstGeom prst="rect">
@@ -7287,34 +7125,7 @@
                             </a:solidFill>
                             <a:latin typeface="Cambria Math" panose="02040503050406030204" pitchFamily="18" charset="0"/>
                           </a:rPr>
-                          <m:t> </m:t>
-                        </m:r>
-                        <m:r>
-                          <a:rPr lang="en-US" sz="1700" b="0" i="1" smtClean="0">
-                            <a:solidFill>
-                              <a:sysClr val="windowText" lastClr="000000"/>
-                            </a:solidFill>
-                            <a:latin typeface="Cambria Math" panose="02040503050406030204" pitchFamily="18" charset="0"/>
-                          </a:rPr>
-                          <m:t>0</m:t>
-                        </m:r>
-                        <m:r>
-                          <a:rPr lang="en-US" sz="1700" b="0" i="1" smtClean="0">
-                            <a:solidFill>
-                              <a:sysClr val="windowText" lastClr="000000"/>
-                            </a:solidFill>
-                            <a:latin typeface="Cambria Math" panose="02040503050406030204" pitchFamily="18" charset="0"/>
-                          </a:rPr>
-                          <m:t>.</m:t>
-                        </m:r>
-                        <m:r>
-                          <a:rPr lang="en-US" sz="1700" b="0" i="1" smtClean="0">
-                            <a:solidFill>
-                              <a:sysClr val="windowText" lastClr="000000"/>
-                            </a:solidFill>
-                            <a:latin typeface="Cambria Math" panose="02040503050406030204" pitchFamily="18" charset="0"/>
-                          </a:rPr>
-                          <m:t>0</m:t>
+                          <m:t> 0.0</m:t>
                         </m:r>
                       </m:oMath>
                     </m:oMathPara>
@@ -7367,8 +7178,8 @@
             </p:sp>
           </mc:Fallback>
         </mc:AlternateContent>
-        <mc:AlternateContent xmlns:mc="http://schemas.openxmlformats.org/markup-compatibility/2006" xmlns:a14="http://schemas.microsoft.com/office/drawing/2010/main">
-          <mc:Choice Requires="a14">
+        <mc:AlternateContent xmlns:mc="http://schemas.openxmlformats.org/markup-compatibility/2006">
+          <mc:Choice xmlns:a14="http://schemas.microsoft.com/office/drawing/2010/main" Requires="a14">
             <p:sp>
               <p:nvSpPr>
                 <p:cNvPr id="41" name="Rectangle 40"/>
@@ -7423,34 +7234,7 @@
                             </a:solidFill>
                             <a:latin typeface="Cambria Math" panose="02040503050406030204" pitchFamily="18" charset="0"/>
                           </a:rPr>
-                          <m:t> </m:t>
-                        </m:r>
-                        <m:r>
-                          <a:rPr lang="en-US" sz="1700" b="0" i="1" smtClean="0">
-                            <a:solidFill>
-                              <a:schemeClr val="tx1"/>
-                            </a:solidFill>
-                            <a:latin typeface="Cambria Math" panose="02040503050406030204" pitchFamily="18" charset="0"/>
-                          </a:rPr>
-                          <m:t>0</m:t>
-                        </m:r>
-                        <m:r>
-                          <a:rPr lang="en-US" sz="1700" b="0" i="1" smtClean="0">
-                            <a:solidFill>
-                              <a:schemeClr val="tx1"/>
-                            </a:solidFill>
-                            <a:latin typeface="Cambria Math" panose="02040503050406030204" pitchFamily="18" charset="0"/>
-                          </a:rPr>
-                          <m:t>.</m:t>
-                        </m:r>
-                        <m:r>
-                          <a:rPr lang="en-US" sz="1700" b="0" i="1" smtClean="0">
-                            <a:solidFill>
-                              <a:schemeClr val="tx1"/>
-                            </a:solidFill>
-                            <a:latin typeface="Cambria Math" panose="02040503050406030204" pitchFamily="18" charset="0"/>
-                          </a:rPr>
-                          <m:t>1</m:t>
+                          <m:t> 0.1</m:t>
                         </m:r>
                       </m:oMath>
                     </m:oMathPara>
@@ -7464,7 +7248,7 @@
               </p:txBody>
             </p:sp>
           </mc:Choice>
-          <mc:Fallback xmlns="">
+          <mc:Fallback>
             <p:sp>
               <p:nvSpPr>
                 <p:cNvPr id="41" name="Rectangle 40"/>
@@ -7503,8 +7287,8 @@
             </p:sp>
           </mc:Fallback>
         </mc:AlternateContent>
-        <mc:AlternateContent xmlns:mc="http://schemas.openxmlformats.org/markup-compatibility/2006" xmlns:a14="http://schemas.microsoft.com/office/drawing/2010/main">
-          <mc:Choice Requires="a14">
+        <mc:AlternateContent xmlns:mc="http://schemas.openxmlformats.org/markup-compatibility/2006">
+          <mc:Choice xmlns:a14="http://schemas.microsoft.com/office/drawing/2010/main" Requires="a14">
             <p:sp>
               <p:nvSpPr>
                 <p:cNvPr id="42" name="Rectangle 41"/>
@@ -7557,34 +7341,7 @@
                             </a:solidFill>
                             <a:latin typeface="Cambria Math" panose="02040503050406030204" pitchFamily="18" charset="0"/>
                           </a:rPr>
-                          <m:t> </m:t>
-                        </m:r>
-                        <m:r>
-                          <a:rPr lang="en-US" sz="1700" b="0" i="1" smtClean="0">
-                            <a:solidFill>
-                              <a:sysClr val="windowText" lastClr="000000"/>
-                            </a:solidFill>
-                            <a:latin typeface="Cambria Math" panose="02040503050406030204" pitchFamily="18" charset="0"/>
-                          </a:rPr>
-                          <m:t>0</m:t>
-                        </m:r>
-                        <m:r>
-                          <a:rPr lang="en-US" sz="1700" b="0" i="1" smtClean="0">
-                            <a:solidFill>
-                              <a:sysClr val="windowText" lastClr="000000"/>
-                            </a:solidFill>
-                            <a:latin typeface="Cambria Math" panose="02040503050406030204" pitchFamily="18" charset="0"/>
-                          </a:rPr>
-                          <m:t>.</m:t>
-                        </m:r>
-                        <m:r>
-                          <a:rPr lang="en-US" sz="1700" b="0" i="1" smtClean="0">
-                            <a:solidFill>
-                              <a:sysClr val="windowText" lastClr="000000"/>
-                            </a:solidFill>
-                            <a:latin typeface="Cambria Math" panose="02040503050406030204" pitchFamily="18" charset="0"/>
-                          </a:rPr>
-                          <m:t>0</m:t>
+                          <m:t> 0.0</m:t>
                         </m:r>
                       </m:oMath>
                     </m:oMathPara>
@@ -7598,7 +7355,7 @@
               </p:txBody>
             </p:sp>
           </mc:Choice>
-          <mc:Fallback xmlns="">
+          <mc:Fallback>
             <p:sp>
               <p:nvSpPr>
                 <p:cNvPr id="42" name="Rectangle 41"/>
@@ -9142,8 +8899,8 @@
             </p:sp>
           </mc:Fallback>
         </mc:AlternateContent>
-        <mc:AlternateContent xmlns:mc="http://schemas.openxmlformats.org/markup-compatibility/2006" xmlns:a14="http://schemas.microsoft.com/office/drawing/2010/main">
-          <mc:Choice Requires="a14">
+        <mc:AlternateContent xmlns:mc="http://schemas.openxmlformats.org/markup-compatibility/2006">
+          <mc:Choice xmlns:a14="http://schemas.microsoft.com/office/drawing/2010/main" Requires="a14">
             <p:sp>
               <p:nvSpPr>
                 <p:cNvPr id="56" name="Rectangle 55"/>
@@ -9210,7 +8967,7 @@
               </p:txBody>
             </p:sp>
           </mc:Choice>
-          <mc:Fallback xmlns="">
+          <mc:Fallback>
             <p:sp>
               <p:nvSpPr>
                 <p:cNvPr id="56" name="Rectangle 55"/>
@@ -9249,8 +9006,8 @@
             </p:sp>
           </mc:Fallback>
         </mc:AlternateContent>
-        <mc:AlternateContent xmlns:mc="http://schemas.openxmlformats.org/markup-compatibility/2006" xmlns:a14="http://schemas.microsoft.com/office/drawing/2010/main">
-          <mc:Choice Requires="a14">
+        <mc:AlternateContent xmlns:mc="http://schemas.openxmlformats.org/markup-compatibility/2006">
+          <mc:Choice xmlns:a14="http://schemas.microsoft.com/office/drawing/2010/main" Requires="a14">
             <p:sp>
               <p:nvSpPr>
                 <p:cNvPr id="57" name="Rectangle 56"/>
@@ -9317,7 +9074,7 @@
               </p:txBody>
             </p:sp>
           </mc:Choice>
-          <mc:Fallback xmlns="">
+          <mc:Fallback>
             <p:sp>
               <p:nvSpPr>
                 <p:cNvPr id="57" name="Rectangle 56"/>
@@ -9463,8 +9220,8 @@
             </p:sp>
           </mc:Fallback>
         </mc:AlternateContent>
-        <mc:AlternateContent xmlns:mc="http://schemas.openxmlformats.org/markup-compatibility/2006" xmlns:a14="http://schemas.microsoft.com/office/drawing/2010/main">
-          <mc:Choice Requires="a14">
+        <mc:AlternateContent xmlns:mc="http://schemas.openxmlformats.org/markup-compatibility/2006">
+          <mc:Choice xmlns:a14="http://schemas.microsoft.com/office/drawing/2010/main" Requires="a14">
             <p:sp>
               <p:nvSpPr>
                 <p:cNvPr id="59" name="Rectangle 58"/>
@@ -9531,7 +9288,7 @@
               </p:txBody>
             </p:sp>
           </mc:Choice>
-          <mc:Fallback xmlns="">
+          <mc:Fallback>
             <p:sp>
               <p:nvSpPr>
                 <p:cNvPr id="59" name="Rectangle 58"/>
@@ -9570,8 +9327,8 @@
             </p:sp>
           </mc:Fallback>
         </mc:AlternateContent>
-        <mc:AlternateContent xmlns:mc="http://schemas.openxmlformats.org/markup-compatibility/2006" xmlns:a14="http://schemas.microsoft.com/office/drawing/2010/main">
-          <mc:Choice Requires="a14">
+        <mc:AlternateContent xmlns:mc="http://schemas.openxmlformats.org/markup-compatibility/2006">
+          <mc:Choice xmlns:a14="http://schemas.microsoft.com/office/drawing/2010/main" Requires="a14">
             <p:sp>
               <p:nvSpPr>
                 <p:cNvPr id="60" name="Rectangle 59"/>
@@ -9638,7 +9395,7 @@
               </p:txBody>
             </p:sp>
           </mc:Choice>
-          <mc:Fallback xmlns="">
+          <mc:Fallback>
             <p:sp>
               <p:nvSpPr>
                 <p:cNvPr id="60" name="Rectangle 59"/>
@@ -11182,8 +10939,8 @@
             </p:sp>
           </mc:Fallback>
         </mc:AlternateContent>
-        <mc:AlternateContent xmlns:mc="http://schemas.openxmlformats.org/markup-compatibility/2006" xmlns:a14="http://schemas.microsoft.com/office/drawing/2010/main">
-          <mc:Choice Requires="a14">
+        <mc:AlternateContent xmlns:mc="http://schemas.openxmlformats.org/markup-compatibility/2006">
+          <mc:Choice xmlns:a14="http://schemas.microsoft.com/office/drawing/2010/main" Requires="a14">
             <p:sp>
               <p:nvSpPr>
                 <p:cNvPr id="74" name="Rectangle 73"/>
@@ -11250,7 +11007,7 @@
               </p:txBody>
             </p:sp>
           </mc:Choice>
-          <mc:Fallback xmlns="">
+          <mc:Fallback>
             <p:sp>
               <p:nvSpPr>
                 <p:cNvPr id="74" name="Rectangle 73"/>
@@ -11289,8 +11046,8 @@
             </p:sp>
           </mc:Fallback>
         </mc:AlternateContent>
-        <mc:AlternateContent xmlns:mc="http://schemas.openxmlformats.org/markup-compatibility/2006" xmlns:a14="http://schemas.microsoft.com/office/drawing/2010/main">
-          <mc:Choice Requires="a14">
+        <mc:AlternateContent xmlns:mc="http://schemas.openxmlformats.org/markup-compatibility/2006">
+          <mc:Choice xmlns:a14="http://schemas.microsoft.com/office/drawing/2010/main" Requires="a14">
             <p:sp>
               <p:nvSpPr>
                 <p:cNvPr id="75" name="Rectangle 74"/>
@@ -11357,7 +11114,7 @@
               </p:txBody>
             </p:sp>
           </mc:Choice>
-          <mc:Fallback xmlns="">
+          <mc:Fallback>
             <p:sp>
               <p:nvSpPr>
                 <p:cNvPr id="75" name="Rectangle 74"/>
@@ -11988,8 +11745,8 @@
             </p:sp>
           </mc:Fallback>
         </mc:AlternateContent>
-        <mc:AlternateContent xmlns:mc="http://schemas.openxmlformats.org/markup-compatibility/2006" xmlns:a14="http://schemas.microsoft.com/office/drawing/2010/main">
-          <mc:Choice Requires="a14">
+        <mc:AlternateContent xmlns:mc="http://schemas.openxmlformats.org/markup-compatibility/2006">
+          <mc:Choice xmlns:a14="http://schemas.microsoft.com/office/drawing/2010/main" Requires="a14">
             <p:sp>
               <p:nvSpPr>
                 <p:cNvPr id="81" name="Rectangle 80"/>
@@ -11998,7 +11755,7 @@
               </p:nvSpPr>
               <p:spPr>
                 <a:xfrm>
-                  <a:off x="1890454" y="5807019"/>
+                  <a:off x="1890454" y="5804928"/>
                   <a:ext cx="502920" cy="502920"/>
                 </a:xfrm>
                 <a:prstGeom prst="rect">
@@ -12056,7 +11813,7 @@
               </p:txBody>
             </p:sp>
           </mc:Choice>
-          <mc:Fallback xmlns="">
+          <mc:Fallback>
             <p:sp>
               <p:nvSpPr>
                 <p:cNvPr id="81" name="Rectangle 80"/>
@@ -12067,7 +11824,7 @@
               </p:nvSpPr>
               <p:spPr>
                 <a:xfrm>
-                  <a:off x="1890454" y="5807019"/>
+                  <a:off x="1890454" y="5804928"/>
                   <a:ext cx="502920" cy="502920"/>
                 </a:xfrm>
                 <a:prstGeom prst="rect">
@@ -12523,8 +12280,8 @@
             </p:sp>
           </mc:Fallback>
         </mc:AlternateContent>
-        <mc:AlternateContent xmlns:mc="http://schemas.openxmlformats.org/markup-compatibility/2006" xmlns:a14="http://schemas.microsoft.com/office/drawing/2010/main">
-          <mc:Choice Requires="a14">
+        <mc:AlternateContent xmlns:mc="http://schemas.openxmlformats.org/markup-compatibility/2006">
+          <mc:Choice xmlns:a14="http://schemas.microsoft.com/office/drawing/2010/main" Requires="a14">
             <p:sp>
               <p:nvSpPr>
                 <p:cNvPr id="86" name="Rectangle 85"/>
@@ -12533,7 +12290,7 @@
               </p:nvSpPr>
               <p:spPr>
                 <a:xfrm>
-                  <a:off x="2394665" y="5807867"/>
+                  <a:off x="2394665" y="5804928"/>
                   <a:ext cx="502920" cy="502920"/>
                 </a:xfrm>
                 <a:prstGeom prst="rect">
@@ -12591,7 +12348,7 @@
               </p:txBody>
             </p:sp>
           </mc:Choice>
-          <mc:Fallback xmlns="">
+          <mc:Fallback>
             <p:sp>
               <p:nvSpPr>
                 <p:cNvPr id="86" name="Rectangle 85"/>
@@ -12602,7 +12359,7 @@
               </p:nvSpPr>
               <p:spPr>
                 <a:xfrm>
-                  <a:off x="2394665" y="5807867"/>
+                  <a:off x="2394665" y="5804928"/>
                   <a:ext cx="502920" cy="502920"/>
                 </a:xfrm>
                 <a:prstGeom prst="rect">
@@ -12630,8 +12387,8 @@
             </p:sp>
           </mc:Fallback>
         </mc:AlternateContent>
-        <mc:AlternateContent xmlns:mc="http://schemas.openxmlformats.org/markup-compatibility/2006" xmlns:a14="http://schemas.microsoft.com/office/drawing/2010/main">
-          <mc:Choice Requires="a14">
+        <mc:AlternateContent xmlns:mc="http://schemas.openxmlformats.org/markup-compatibility/2006">
+          <mc:Choice xmlns:a14="http://schemas.microsoft.com/office/drawing/2010/main" Requires="a14">
             <p:sp>
               <p:nvSpPr>
                 <p:cNvPr id="87" name="Rectangle 86"/>
@@ -12640,7 +12397,7 @@
               </p:nvSpPr>
               <p:spPr>
                 <a:xfrm>
-                  <a:off x="2900125" y="5807823"/>
+                  <a:off x="2900125" y="5804928"/>
                   <a:ext cx="502920" cy="502920"/>
                 </a:xfrm>
                 <a:prstGeom prst="rect">
@@ -12698,7 +12455,7 @@
               </p:txBody>
             </p:sp>
           </mc:Choice>
-          <mc:Fallback xmlns="">
+          <mc:Fallback>
             <p:sp>
               <p:nvSpPr>
                 <p:cNvPr id="87" name="Rectangle 86"/>
@@ -12709,7 +12466,7 @@
               </p:nvSpPr>
               <p:spPr>
                 <a:xfrm>
-                  <a:off x="2900125" y="5807823"/>
+                  <a:off x="2900125" y="5804928"/>
                   <a:ext cx="502920" cy="502920"/>
                 </a:xfrm>
                 <a:prstGeom prst="rect">
@@ -12737,8 +12494,8 @@
             </p:sp>
           </mc:Fallback>
         </mc:AlternateContent>
-        <mc:AlternateContent xmlns:mc="http://schemas.openxmlformats.org/markup-compatibility/2006" xmlns:a14="http://schemas.microsoft.com/office/drawing/2010/main">
-          <mc:Choice Requires="a14">
+        <mc:AlternateContent xmlns:mc="http://schemas.openxmlformats.org/markup-compatibility/2006">
+          <mc:Choice xmlns:a14="http://schemas.microsoft.com/office/drawing/2010/main" Requires="a14">
             <p:sp>
               <p:nvSpPr>
                 <p:cNvPr id="88" name="Rectangle 87"/>
@@ -12747,7 +12504,7 @@
               </p:nvSpPr>
               <p:spPr>
                 <a:xfrm>
-                  <a:off x="3404927" y="5809440"/>
+                  <a:off x="3404927" y="5804928"/>
                   <a:ext cx="502920" cy="502920"/>
                 </a:xfrm>
                 <a:prstGeom prst="rect">
@@ -12805,7 +12562,7 @@
               </p:txBody>
             </p:sp>
           </mc:Choice>
-          <mc:Fallback xmlns="">
+          <mc:Fallback>
             <p:sp>
               <p:nvSpPr>
                 <p:cNvPr id="88" name="Rectangle 87"/>
@@ -12816,7 +12573,7 @@
               </p:nvSpPr>
               <p:spPr>
                 <a:xfrm>
-                  <a:off x="3404927" y="5809440"/>
+                  <a:off x="3404927" y="5804928"/>
                   <a:ext cx="502920" cy="502920"/>
                 </a:xfrm>
                 <a:prstGeom prst="rect">
@@ -12844,8 +12601,8 @@
             </p:sp>
           </mc:Fallback>
         </mc:AlternateContent>
-        <mc:AlternateContent xmlns:mc="http://schemas.openxmlformats.org/markup-compatibility/2006" xmlns:a14="http://schemas.microsoft.com/office/drawing/2010/main">
-          <mc:Choice Requires="a14">
+        <mc:AlternateContent xmlns:mc="http://schemas.openxmlformats.org/markup-compatibility/2006">
+          <mc:Choice xmlns:a14="http://schemas.microsoft.com/office/drawing/2010/main" Requires="a14">
             <p:sp>
               <p:nvSpPr>
                 <p:cNvPr id="89" name="Rectangle 88"/>
@@ -12854,7 +12611,7 @@
               </p:nvSpPr>
               <p:spPr>
                 <a:xfrm>
-                  <a:off x="3910260" y="5806082"/>
+                  <a:off x="3910260" y="5804928"/>
                   <a:ext cx="502920" cy="502920"/>
                 </a:xfrm>
                 <a:prstGeom prst="rect">
@@ -12912,7 +12669,7 @@
               </p:txBody>
             </p:sp>
           </mc:Choice>
-          <mc:Fallback xmlns="">
+          <mc:Fallback>
             <p:sp>
               <p:nvSpPr>
                 <p:cNvPr id="89" name="Rectangle 88"/>
@@ -12923,7 +12680,7 @@
               </p:nvSpPr>
               <p:spPr>
                 <a:xfrm>
-                  <a:off x="3910260" y="5806082"/>
+                  <a:off x="3910260" y="5804928"/>
                   <a:ext cx="502920" cy="502920"/>
                 </a:xfrm>
                 <a:prstGeom prst="rect">
@@ -12951,8 +12708,8 @@
             </p:sp>
           </mc:Fallback>
         </mc:AlternateContent>
-        <mc:AlternateContent xmlns:mc="http://schemas.openxmlformats.org/markup-compatibility/2006" xmlns:a14="http://schemas.microsoft.com/office/drawing/2010/main">
-          <mc:Choice Requires="a14">
+        <mc:AlternateContent xmlns:mc="http://schemas.openxmlformats.org/markup-compatibility/2006">
+          <mc:Choice xmlns:a14="http://schemas.microsoft.com/office/drawing/2010/main" Requires="a14">
             <p:sp>
               <p:nvSpPr>
                 <p:cNvPr id="90" name="Rectangle 89"/>
@@ -12961,7 +12718,7 @@
               </p:nvSpPr>
               <p:spPr>
                 <a:xfrm>
-                  <a:off x="1387374" y="5809253"/>
+                  <a:off x="1387374" y="5804928"/>
                   <a:ext cx="502920" cy="502920"/>
                 </a:xfrm>
                 <a:prstGeom prst="rect">
@@ -13076,7 +12833,7 @@
               </p:txBody>
             </p:sp>
           </mc:Choice>
-          <mc:Fallback xmlns="">
+          <mc:Fallback>
             <p:sp>
               <p:nvSpPr>
                 <p:cNvPr id="90" name="Rectangle 89"/>
@@ -13087,7 +12844,7 @@
               </p:nvSpPr>
               <p:spPr>
                 <a:xfrm>
-                  <a:off x="1387374" y="5809253"/>
+                  <a:off x="1387374" y="5804928"/>
                   <a:ext cx="502920" cy="502920"/>
                 </a:xfrm>
                 <a:prstGeom prst="rect">
@@ -13436,8 +13193,8 @@
             </p:sp>
           </mc:Fallback>
         </mc:AlternateContent>
-        <mc:AlternateContent xmlns:mc="http://schemas.openxmlformats.org/markup-compatibility/2006" xmlns:a14="http://schemas.microsoft.com/office/drawing/2010/main">
-          <mc:Choice Requires="a14">
+        <mc:AlternateContent xmlns:mc="http://schemas.openxmlformats.org/markup-compatibility/2006">
+          <mc:Choice xmlns:a14="http://schemas.microsoft.com/office/drawing/2010/main" Requires="a14">
             <p:sp>
               <p:nvSpPr>
                 <p:cNvPr id="94" name="Rectangle 93"/>
@@ -13446,7 +13203,7 @@
               </p:nvSpPr>
               <p:spPr>
                 <a:xfrm>
-                  <a:off x="4410750" y="5806669"/>
+                  <a:off x="4410750" y="5804928"/>
                   <a:ext cx="502920" cy="502920"/>
                 </a:xfrm>
                 <a:prstGeom prst="rect">
@@ -13504,7 +13261,7 @@
               </p:txBody>
             </p:sp>
           </mc:Choice>
-          <mc:Fallback xmlns="">
+          <mc:Fallback>
             <p:sp>
               <p:nvSpPr>
                 <p:cNvPr id="94" name="Rectangle 93"/>
@@ -13515,14 +13272,14 @@
               </p:nvSpPr>
               <p:spPr>
                 <a:xfrm>
-                  <a:off x="4410750" y="5806669"/>
+                  <a:off x="4410750" y="5804928"/>
                   <a:ext cx="502920" cy="502920"/>
                 </a:xfrm>
                 <a:prstGeom prst="rect">
                   <a:avLst/>
                 </a:prstGeom>
                 <a:blipFill rotWithShape="0">
-                  <a:blip r:embed="rId85"/>
+                  <a:blip r:embed="rId79"/>
                   <a:stretch>
                     <a:fillRect/>
                   </a:stretch>
@@ -13543,8 +13300,8 @@
             </p:sp>
           </mc:Fallback>
         </mc:AlternateContent>
-        <mc:AlternateContent xmlns:mc="http://schemas.openxmlformats.org/markup-compatibility/2006" xmlns:a14="http://schemas.microsoft.com/office/drawing/2010/main">
-          <mc:Choice Requires="a14">
+        <mc:AlternateContent xmlns:mc="http://schemas.openxmlformats.org/markup-compatibility/2006">
+          <mc:Choice xmlns:a14="http://schemas.microsoft.com/office/drawing/2010/main" Requires="a14">
             <p:sp>
               <p:nvSpPr>
                 <p:cNvPr id="95" name="Rectangle 94"/>
@@ -13553,7 +13310,7 @@
               </p:nvSpPr>
               <p:spPr>
                 <a:xfrm>
-                  <a:off x="4915552" y="5808286"/>
+                  <a:off x="4915552" y="5804928"/>
                   <a:ext cx="502920" cy="502920"/>
                 </a:xfrm>
                 <a:prstGeom prst="rect">
@@ -13611,7 +13368,7 @@
               </p:txBody>
             </p:sp>
           </mc:Choice>
-          <mc:Fallback xmlns="">
+          <mc:Fallback>
             <p:sp>
               <p:nvSpPr>
                 <p:cNvPr id="95" name="Rectangle 94"/>
@@ -13622,14 +13379,14 @@
               </p:nvSpPr>
               <p:spPr>
                 <a:xfrm>
-                  <a:off x="4915552" y="5808286"/>
+                  <a:off x="4915552" y="5804928"/>
                   <a:ext cx="502920" cy="502920"/>
                 </a:xfrm>
                 <a:prstGeom prst="rect">
                   <a:avLst/>
                 </a:prstGeom>
                 <a:blipFill rotWithShape="0">
-                  <a:blip r:embed="rId86"/>
+                  <a:blip r:embed="rId85"/>
                   <a:stretch>
                     <a:fillRect/>
                   </a:stretch>
@@ -13650,8 +13407,8 @@
             </p:sp>
           </mc:Fallback>
         </mc:AlternateContent>
-        <mc:AlternateContent xmlns:mc="http://schemas.openxmlformats.org/markup-compatibility/2006" xmlns:a14="http://schemas.microsoft.com/office/drawing/2010/main">
-          <mc:Choice Requires="a14">
+        <mc:AlternateContent xmlns:mc="http://schemas.openxmlformats.org/markup-compatibility/2006">
+          <mc:Choice xmlns:a14="http://schemas.microsoft.com/office/drawing/2010/main" Requires="a14">
             <p:sp>
               <p:nvSpPr>
                 <p:cNvPr id="96" name="Rectangle 95"/>
@@ -13718,7 +13475,7 @@
               </p:txBody>
             </p:sp>
           </mc:Choice>
-          <mc:Fallback xmlns="">
+          <mc:Fallback>
             <p:sp>
               <p:nvSpPr>
                 <p:cNvPr id="96" name="Rectangle 95"/>
@@ -13736,7 +13493,7 @@
                   <a:avLst/>
                 </a:prstGeom>
                 <a:blipFill rotWithShape="0">
-                  <a:blip r:embed="rId87"/>
+                  <a:blip r:embed="rId86"/>
                   <a:stretch>
                     <a:fillRect/>
                   </a:stretch>
@@ -14013,25 +13770,7 @@
                             </a:solidFill>
                             <a:latin typeface="Cambria Math" panose="02040503050406030204" pitchFamily="18" charset="0"/>
                           </a:rPr>
-                          <m:t>0</m:t>
-                        </m:r>
-                        <m:r>
-                          <a:rPr lang="en-US" sz="1700" b="0" i="1" smtClean="0">
-                            <a:solidFill>
-                              <a:schemeClr val="bg1"/>
-                            </a:solidFill>
-                            <a:latin typeface="Cambria Math" panose="02040503050406030204" pitchFamily="18" charset="0"/>
-                          </a:rPr>
-                          <m:t>.</m:t>
-                        </m:r>
-                        <m:r>
-                          <a:rPr lang="en-US" sz="1700" b="0" i="1" smtClean="0">
-                            <a:solidFill>
-                              <a:schemeClr val="bg1"/>
-                            </a:solidFill>
-                            <a:latin typeface="Cambria Math" panose="02040503050406030204" pitchFamily="18" charset="0"/>
-                          </a:rPr>
-                          <m:t>8</m:t>
+                          <m:t>0.8</m:t>
                         </m:r>
                       </m:oMath>
                     </m:oMathPara>
@@ -14290,16 +14029,7 @@
                             </a:solidFill>
                             <a:latin typeface="Cambria Math" panose="02040503050406030204" pitchFamily="18" charset="0"/>
                           </a:rPr>
-                          <m:t> </m:t>
-                        </m:r>
-                        <m:r>
-                          <a:rPr lang="en-US" sz="1700" b="0" i="1" smtClean="0">
-                            <a:solidFill>
-                              <a:schemeClr val="tx1"/>
-                            </a:solidFill>
-                            <a:latin typeface="Cambria Math" panose="02040503050406030204" pitchFamily="18" charset="0"/>
-                          </a:rPr>
-                          <m:t>0</m:t>
+                          <m:t> 0</m:t>
                         </m:r>
                         <m:r>
                           <a:rPr lang="en-US" sz="1700" b="0" i="0" smtClean="0">
@@ -14927,34 +14657,7 @@
                             </a:solidFill>
                             <a:latin typeface="Cambria Math" panose="02040503050406030204" pitchFamily="18" charset="0"/>
                           </a:rPr>
-                          <m:t> </m:t>
-                        </m:r>
-                        <m:r>
-                          <a:rPr lang="en-US" sz="1700" b="0" i="1" smtClean="0">
-                            <a:solidFill>
-                              <a:schemeClr val="tx1"/>
-                            </a:solidFill>
-                            <a:latin typeface="Cambria Math" panose="02040503050406030204" pitchFamily="18" charset="0"/>
-                          </a:rPr>
-                          <m:t>0</m:t>
-                        </m:r>
-                        <m:r>
-                          <a:rPr lang="en-US" sz="1700" b="0" i="1" smtClean="0">
-                            <a:solidFill>
-                              <a:schemeClr val="tx1"/>
-                            </a:solidFill>
-                            <a:latin typeface="Cambria Math" panose="02040503050406030204" pitchFamily="18" charset="0"/>
-                          </a:rPr>
-                          <m:t>.</m:t>
-                        </m:r>
-                        <m:r>
-                          <a:rPr lang="en-US" sz="1700" b="0" i="1" smtClean="0">
-                            <a:solidFill>
-                              <a:schemeClr val="tx1"/>
-                            </a:solidFill>
-                            <a:latin typeface="Cambria Math" panose="02040503050406030204" pitchFamily="18" charset="0"/>
-                          </a:rPr>
-                          <m:t>1</m:t>
+                          <m:t> 0.1</m:t>
                         </m:r>
                       </m:oMath>
                     </m:oMathPara>
@@ -15063,34 +14766,7 @@
                             </a:solidFill>
                             <a:latin typeface="Cambria Math" panose="02040503050406030204" pitchFamily="18" charset="0"/>
                           </a:rPr>
-                          <m:t> </m:t>
-                        </m:r>
-                        <m:r>
-                          <a:rPr lang="en-US" sz="1700" b="0" i="1" smtClean="0">
-                            <a:solidFill>
-                              <a:sysClr val="windowText" lastClr="000000"/>
-                            </a:solidFill>
-                            <a:latin typeface="Cambria Math" panose="02040503050406030204" pitchFamily="18" charset="0"/>
-                          </a:rPr>
-                          <m:t>0</m:t>
-                        </m:r>
-                        <m:r>
-                          <a:rPr lang="en-US" sz="1700" b="0" i="1" smtClean="0">
-                            <a:solidFill>
-                              <a:sysClr val="windowText" lastClr="000000"/>
-                            </a:solidFill>
-                            <a:latin typeface="Cambria Math" panose="02040503050406030204" pitchFamily="18" charset="0"/>
-                          </a:rPr>
-                          <m:t>.</m:t>
-                        </m:r>
-                        <m:r>
-                          <a:rPr lang="en-US" sz="1700" b="0" i="1" smtClean="0">
-                            <a:solidFill>
-                              <a:sysClr val="windowText" lastClr="000000"/>
-                            </a:solidFill>
-                            <a:latin typeface="Cambria Math" panose="02040503050406030204" pitchFamily="18" charset="0"/>
-                          </a:rPr>
-                          <m:t>05</m:t>
+                          <m:t> 0.05</m:t>
                         </m:r>
                       </m:oMath>
                     </m:oMathPara>
@@ -15197,34 +14873,7 @@
                             </a:solidFill>
                             <a:latin typeface="Cambria Math" panose="02040503050406030204" pitchFamily="18" charset="0"/>
                           </a:rPr>
-                          <m:t> </m:t>
-                        </m:r>
-                        <m:r>
-                          <a:rPr lang="en-US" sz="1700" b="0" i="1" smtClean="0">
-                            <a:solidFill>
-                              <a:schemeClr val="tx1"/>
-                            </a:solidFill>
-                            <a:latin typeface="Cambria Math" panose="02040503050406030204" pitchFamily="18" charset="0"/>
-                          </a:rPr>
-                          <m:t>0</m:t>
-                        </m:r>
-                        <m:r>
-                          <a:rPr lang="en-US" sz="1700" b="0" i="1" smtClean="0">
-                            <a:solidFill>
-                              <a:schemeClr val="tx1"/>
-                            </a:solidFill>
-                            <a:latin typeface="Cambria Math" panose="02040503050406030204" pitchFamily="18" charset="0"/>
-                          </a:rPr>
-                          <m:t>.</m:t>
-                        </m:r>
-                        <m:r>
-                          <a:rPr lang="en-US" sz="1700" b="0" i="1" smtClean="0">
-                            <a:solidFill>
-                              <a:schemeClr val="tx1"/>
-                            </a:solidFill>
-                            <a:latin typeface="Cambria Math" panose="02040503050406030204" pitchFamily="18" charset="0"/>
-                          </a:rPr>
-                          <m:t>0</m:t>
+                          <m:t> 0.0</m:t>
                         </m:r>
                       </m:oMath>
                     </m:oMathPara>
@@ -15333,34 +14982,7 @@
                             </a:solidFill>
                             <a:latin typeface="Cambria Math" panose="02040503050406030204" pitchFamily="18" charset="0"/>
                           </a:rPr>
-                          <m:t> </m:t>
-                        </m:r>
-                        <m:r>
-                          <a:rPr lang="en-US" sz="1700" b="0" i="1" smtClean="0">
-                            <a:solidFill>
-                              <a:sysClr val="windowText" lastClr="000000"/>
-                            </a:solidFill>
-                            <a:latin typeface="Cambria Math" panose="02040503050406030204" pitchFamily="18" charset="0"/>
-                          </a:rPr>
-                          <m:t>0</m:t>
-                        </m:r>
-                        <m:r>
-                          <a:rPr lang="en-US" sz="1700" b="0" i="1" smtClean="0">
-                            <a:solidFill>
-                              <a:sysClr val="windowText" lastClr="000000"/>
-                            </a:solidFill>
-                            <a:latin typeface="Cambria Math" panose="02040503050406030204" pitchFamily="18" charset="0"/>
-                          </a:rPr>
-                          <m:t>.</m:t>
-                        </m:r>
-                        <m:r>
-                          <a:rPr lang="en-US" sz="1700" b="0" i="1" smtClean="0">
-                            <a:solidFill>
-                              <a:sysClr val="windowText" lastClr="000000"/>
-                            </a:solidFill>
-                            <a:latin typeface="Cambria Math" panose="02040503050406030204" pitchFamily="18" charset="0"/>
-                          </a:rPr>
-                          <m:t>05</m:t>
+                          <m:t> 0.05</m:t>
                         </m:r>
                       </m:oMath>
                     </m:oMathPara>
@@ -15470,34 +15092,7 @@
                             </a:solidFill>
                             <a:latin typeface="Cambria Math" panose="02040503050406030204" pitchFamily="18" charset="0"/>
                           </a:rPr>
-                          <m:t> </m:t>
-                        </m:r>
-                        <m:r>
-                          <a:rPr lang="en-US" sz="1700" b="0" i="1" smtClean="0">
-                            <a:solidFill>
-                              <a:schemeClr val="bg1"/>
-                            </a:solidFill>
-                            <a:latin typeface="Cambria Math" panose="02040503050406030204" pitchFamily="18" charset="0"/>
-                          </a:rPr>
-                          <m:t>0</m:t>
-                        </m:r>
-                        <m:r>
-                          <a:rPr lang="en-US" sz="1700" b="0" i="1" smtClean="0">
-                            <a:solidFill>
-                              <a:schemeClr val="bg1"/>
-                            </a:solidFill>
-                            <a:latin typeface="Cambria Math" panose="02040503050406030204" pitchFamily="18" charset="0"/>
-                          </a:rPr>
-                          <m:t>.</m:t>
-                        </m:r>
-                        <m:r>
-                          <a:rPr lang="en-US" sz="1700" b="0" i="1" smtClean="0">
-                            <a:solidFill>
-                              <a:schemeClr val="bg1"/>
-                            </a:solidFill>
-                            <a:latin typeface="Cambria Math" panose="02040503050406030204" pitchFamily="18" charset="0"/>
-                          </a:rPr>
-                          <m:t>8</m:t>
+                          <m:t> 0.8</m:t>
                         </m:r>
                       </m:oMath>
                     </m:oMathPara>
@@ -16299,34 +15894,7 @@
                             </a:solidFill>
                             <a:latin typeface="Cambria Math" panose="02040503050406030204" pitchFamily="18" charset="0"/>
                           </a:rPr>
-                          <m:t> </m:t>
-                        </m:r>
-                        <m:r>
-                          <a:rPr lang="en-US" sz="1700" b="0" i="1" smtClean="0">
-                            <a:solidFill>
-                              <a:sysClr val="windowText" lastClr="000000"/>
-                            </a:solidFill>
-                            <a:latin typeface="Cambria Math" panose="02040503050406030204" pitchFamily="18" charset="0"/>
-                          </a:rPr>
-                          <m:t>0</m:t>
-                        </m:r>
-                        <m:r>
-                          <a:rPr lang="en-US" sz="1700" b="0" i="1" smtClean="0">
-                            <a:solidFill>
-                              <a:sysClr val="windowText" lastClr="000000"/>
-                            </a:solidFill>
-                            <a:latin typeface="Cambria Math" panose="02040503050406030204" pitchFamily="18" charset="0"/>
-                          </a:rPr>
-                          <m:t>.</m:t>
-                        </m:r>
-                        <m:r>
-                          <a:rPr lang="en-US" sz="1700" b="0" i="1" smtClean="0">
-                            <a:solidFill>
-                              <a:sysClr val="windowText" lastClr="000000"/>
-                            </a:solidFill>
-                            <a:latin typeface="Cambria Math" panose="02040503050406030204" pitchFamily="18" charset="0"/>
-                          </a:rPr>
-                          <m:t>0</m:t>
+                          <m:t> 0.0</m:t>
                         </m:r>
                       </m:oMath>
                     </m:oMathPara>
@@ -16435,34 +16003,7 @@
                             </a:solidFill>
                             <a:latin typeface="Cambria Math" panose="02040503050406030204" pitchFamily="18" charset="0"/>
                           </a:rPr>
-                          <m:t> </m:t>
-                        </m:r>
-                        <m:r>
-                          <a:rPr lang="en-US" sz="1700" b="0" i="1" smtClean="0">
-                            <a:solidFill>
-                              <a:schemeClr val="tx1"/>
-                            </a:solidFill>
-                            <a:latin typeface="Cambria Math" panose="02040503050406030204" pitchFamily="18" charset="0"/>
-                          </a:rPr>
-                          <m:t>0</m:t>
-                        </m:r>
-                        <m:r>
-                          <a:rPr lang="en-US" sz="1700" b="0" i="1" smtClean="0">
-                            <a:solidFill>
-                              <a:schemeClr val="tx1"/>
-                            </a:solidFill>
-                            <a:latin typeface="Cambria Math" panose="02040503050406030204" pitchFamily="18" charset="0"/>
-                          </a:rPr>
-                          <m:t>.</m:t>
-                        </m:r>
-                        <m:r>
-                          <a:rPr lang="en-US" sz="1700" b="0" i="1" smtClean="0">
-                            <a:solidFill>
-                              <a:schemeClr val="tx1"/>
-                            </a:solidFill>
-                            <a:latin typeface="Cambria Math" panose="02040503050406030204" pitchFamily="18" charset="0"/>
-                          </a:rPr>
-                          <m:t>1</m:t>
+                          <m:t> 0.1</m:t>
                         </m:r>
                       </m:oMath>
                     </m:oMathPara>
@@ -16569,34 +16110,7 @@
                             </a:solidFill>
                             <a:latin typeface="Cambria Math" panose="02040503050406030204" pitchFamily="18" charset="0"/>
                           </a:rPr>
-                          <m:t> </m:t>
-                        </m:r>
-                        <m:r>
-                          <a:rPr lang="en-US" sz="1700" b="0" i="1" smtClean="0">
-                            <a:solidFill>
-                              <a:sysClr val="windowText" lastClr="000000"/>
-                            </a:solidFill>
-                            <a:latin typeface="Cambria Math" panose="02040503050406030204" pitchFamily="18" charset="0"/>
-                          </a:rPr>
-                          <m:t>0</m:t>
-                        </m:r>
-                        <m:r>
-                          <a:rPr lang="en-US" sz="1700" b="0" i="1" smtClean="0">
-                            <a:solidFill>
-                              <a:sysClr val="windowText" lastClr="000000"/>
-                            </a:solidFill>
-                            <a:latin typeface="Cambria Math" panose="02040503050406030204" pitchFamily="18" charset="0"/>
-                          </a:rPr>
-                          <m:t>.</m:t>
-                        </m:r>
-                        <m:r>
-                          <a:rPr lang="en-US" sz="1700" b="0" i="1" smtClean="0">
-                            <a:solidFill>
-                              <a:sysClr val="windowText" lastClr="000000"/>
-                            </a:solidFill>
-                            <a:latin typeface="Cambria Math" panose="02040503050406030204" pitchFamily="18" charset="0"/>
-                          </a:rPr>
-                          <m:t>0</m:t>
+                          <m:t> 0.0</m:t>
                         </m:r>
                       </m:oMath>
                     </m:oMathPara>
@@ -39496,8 +39010,8 @@
               </a:p>
             </p:txBody>
           </p:sp>
-          <mc:AlternateContent xmlns:mc="http://schemas.openxmlformats.org/markup-compatibility/2006">
-            <mc:Choice xmlns:a14="http://schemas.microsoft.com/office/drawing/2010/main" Requires="a14">
+          <mc:AlternateContent xmlns:mc="http://schemas.openxmlformats.org/markup-compatibility/2006" xmlns:a14="http://schemas.microsoft.com/office/drawing/2010/main">
+            <mc:Choice Requires="a14">
               <p:sp>
                 <p:nvSpPr>
                   <p:cNvPr id="670" name="Rectangle 669"/>
@@ -39594,7 +39108,7 @@
                 </p:txBody>
               </p:sp>
             </mc:Choice>
-            <mc:Fallback>
+            <mc:Fallback xmlns="">
               <p:sp>
                 <p:nvSpPr>
                   <p:cNvPr id="670" name="Rectangle 669"/>
@@ -39838,8 +39352,8 @@
               </a:p>
             </p:txBody>
           </p:sp>
-          <mc:AlternateContent xmlns:mc="http://schemas.openxmlformats.org/markup-compatibility/2006">
-            <mc:Choice xmlns:a14="http://schemas.microsoft.com/office/drawing/2010/main" Requires="a14">
+          <mc:AlternateContent xmlns:mc="http://schemas.openxmlformats.org/markup-compatibility/2006" xmlns:a14="http://schemas.microsoft.com/office/drawing/2010/main">
+            <mc:Choice Requires="a14">
               <p:sp>
                 <p:nvSpPr>
                   <p:cNvPr id="676" name="Rectangle 675"/>
@@ -39916,7 +39430,7 @@
                 </p:txBody>
               </p:sp>
             </mc:Choice>
-            <mc:Fallback>
+            <mc:Fallback xmlns="">
               <p:sp>
                 <p:nvSpPr>
                   <p:cNvPr id="676" name="Rectangle 675"/>
@@ -40090,8 +39604,8 @@
               </a:fontRef>
             </p:style>
           </p:cxnSp>
-          <mc:AlternateContent xmlns:mc="http://schemas.openxmlformats.org/markup-compatibility/2006">
-            <mc:Choice xmlns:a14="http://schemas.microsoft.com/office/drawing/2010/main" Requires="a14">
+          <mc:AlternateContent xmlns:mc="http://schemas.openxmlformats.org/markup-compatibility/2006" xmlns:a14="http://schemas.microsoft.com/office/drawing/2010/main">
+            <mc:Choice Requires="a14">
               <p:sp>
                 <p:nvSpPr>
                   <p:cNvPr id="681" name="Rectangle 680"/>
@@ -40154,7 +39668,16 @@
                               </a:solidFill>
                               <a:latin typeface="Cambria Math" panose="02040503050406030204" pitchFamily="18" charset="0"/>
                             </a:rPr>
-                            <m:t>−1</m:t>
+                            <m:t>−</m:t>
+                          </m:r>
+                          <m:r>
+                            <a:rPr lang="en-US" sz="1400" b="0" i="1" smtClean="0">
+                              <a:solidFill>
+                                <a:schemeClr val="tx1"/>
+                              </a:solidFill>
+                              <a:latin typeface="Cambria Math" panose="02040503050406030204" pitchFamily="18" charset="0"/>
+                            </a:rPr>
+                            <m:t>1</m:t>
                           </m:r>
                         </m:oMath>
                       </m:oMathPara>
@@ -40168,7 +39691,7 @@
                 </p:txBody>
               </p:sp>
             </mc:Choice>
-            <mc:Fallback>
+            <mc:Fallback xmlns="">
               <p:sp>
                 <p:nvSpPr>
                   <p:cNvPr id="681" name="Rectangle 680"/>
@@ -40210,8 +39733,8 @@
               </p:sp>
             </mc:Fallback>
           </mc:AlternateContent>
-          <mc:AlternateContent xmlns:mc="http://schemas.openxmlformats.org/markup-compatibility/2006">
-            <mc:Choice xmlns:a14="http://schemas.microsoft.com/office/drawing/2010/main" Requires="a14">
+          <mc:AlternateContent xmlns:mc="http://schemas.openxmlformats.org/markup-compatibility/2006" xmlns:a14="http://schemas.microsoft.com/office/drawing/2010/main">
+            <mc:Choice Requires="a14">
               <p:sp>
                 <p:nvSpPr>
                   <p:cNvPr id="682" name="Rectangle 681"/>
@@ -40288,7 +39811,7 @@
                 </p:txBody>
               </p:sp>
             </mc:Choice>
-            <mc:Fallback>
+            <mc:Fallback xmlns="">
               <p:sp>
                 <p:nvSpPr>
                   <p:cNvPr id="682" name="Rectangle 681"/>
@@ -40514,8 +40037,8 @@
               </a:p>
             </p:txBody>
           </p:sp>
-          <mc:AlternateContent xmlns:mc="http://schemas.openxmlformats.org/markup-compatibility/2006">
-            <mc:Choice xmlns:a14="http://schemas.microsoft.com/office/drawing/2010/main" Requires="a14">
+          <mc:AlternateContent xmlns:mc="http://schemas.openxmlformats.org/markup-compatibility/2006" xmlns:a14="http://schemas.microsoft.com/office/drawing/2010/main">
+            <mc:Choice Requires="a14">
               <p:sp>
                 <p:nvSpPr>
                   <p:cNvPr id="687" name="Rectangle 686"/>
@@ -40840,7 +40363,18 @@
                                         <a:schemeClr val="tx1"/>
                                       </a:solidFill>
                                     </a:rPr>
-                                    <m:t>′,</m:t>
+                                    <m:t>′</m:t>
+                                  </m:r>
+                                  <m:r>
+                                    <m:rPr>
+                                      <m:nor/>
+                                    </m:rPr>
+                                    <a:rPr lang="en-US" i="1" dirty="0">
+                                      <a:solidFill>
+                                        <a:schemeClr val="tx1"/>
+                                      </a:solidFill>
+                                    </a:rPr>
+                                    <m:t>,</m:t>
                                   </m:r>
                                   <m:r>
                                     <m:rPr>
@@ -40907,7 +40441,18 @@
                                         <a:schemeClr val="tx1"/>
                                       </a:solidFill>
                                     </a:rPr>
-                                    <m:t>′,</m:t>
+                                    <m:t>′</m:t>
+                                  </m:r>
+                                  <m:r>
+                                    <m:rPr>
+                                      <m:nor/>
+                                    </m:rPr>
+                                    <a:rPr lang="en-US" i="1" dirty="0">
+                                      <a:solidFill>
+                                        <a:schemeClr val="tx1"/>
+                                      </a:solidFill>
+                                    </a:rPr>
+                                    <m:t>,</m:t>
                                   </m:r>
                                   <m:r>
                                     <m:rPr>
@@ -40929,7 +40474,18 @@
                                         <a:schemeClr val="tx1"/>
                                       </a:solidFill>
                                     </a:rPr>
-                                    <m:t>−1</m:t>
+                                    <m:t>−</m:t>
+                                  </m:r>
+                                  <m:r>
+                                    <m:rPr>
+                                      <m:nor/>
+                                    </m:rPr>
+                                    <a:rPr lang="en-US" i="1" dirty="0">
+                                      <a:solidFill>
+                                        <a:schemeClr val="tx1"/>
+                                      </a:solidFill>
+                                    </a:rPr>
+                                    <m:t>1</m:t>
                                   </m:r>
                                 </m:sub>
                               </m:sSub>
@@ -40949,7 +40505,7 @@
                 </p:txBody>
               </p:sp>
             </mc:Choice>
-            <mc:Fallback>
+            <mc:Fallback xmlns="">
               <p:sp>
                 <p:nvSpPr>
                   <p:cNvPr id="687" name="Rectangle 686"/>
@@ -41144,8 +40700,8 @@
             </a:p>
           </p:txBody>
         </p:sp>
-        <mc:AlternateContent xmlns:mc="http://schemas.openxmlformats.org/markup-compatibility/2006">
-          <mc:Choice xmlns:a14="http://schemas.microsoft.com/office/drawing/2010/main" Requires="a14">
+        <mc:AlternateContent xmlns:mc="http://schemas.openxmlformats.org/markup-compatibility/2006" xmlns:a14="http://schemas.microsoft.com/office/drawing/2010/main">
+          <mc:Choice Requires="a14">
             <p:sp>
               <p:nvSpPr>
                 <p:cNvPr id="619" name="Rectangle 618"/>
@@ -41242,7 +40798,7 @@
               </p:txBody>
             </p:sp>
           </mc:Choice>
-          <mc:Fallback>
+          <mc:Fallback xmlns="">
             <p:sp>
               <p:nvSpPr>
                 <p:cNvPr id="619" name="Rectangle 618"/>
@@ -42231,8 +41787,8 @@
             </a:p>
           </p:txBody>
         </p:sp>
-        <mc:AlternateContent xmlns:mc="http://schemas.openxmlformats.org/markup-compatibility/2006">
-          <mc:Choice xmlns:a14="http://schemas.microsoft.com/office/drawing/2010/main" Requires="a14">
+        <mc:AlternateContent xmlns:mc="http://schemas.openxmlformats.org/markup-compatibility/2006" xmlns:a14="http://schemas.microsoft.com/office/drawing/2010/main">
+          <mc:Choice Requires="a14">
             <p:sp>
               <p:nvSpPr>
                 <p:cNvPr id="641" name="Rectangle 640"/>
@@ -42309,7 +41865,7 @@
               </p:txBody>
             </p:sp>
           </mc:Choice>
-          <mc:Fallback>
+          <mc:Fallback xmlns="">
             <p:sp>
               <p:nvSpPr>
                 <p:cNvPr id="641" name="Rectangle 640"/>
@@ -42483,8 +42039,8 @@
             </a:fontRef>
           </p:style>
         </p:cxnSp>
-        <mc:AlternateContent xmlns:mc="http://schemas.openxmlformats.org/markup-compatibility/2006">
-          <mc:Choice xmlns:a14="http://schemas.microsoft.com/office/drawing/2010/main" Requires="a14">
+        <mc:AlternateContent xmlns:mc="http://schemas.openxmlformats.org/markup-compatibility/2006" xmlns:a14="http://schemas.microsoft.com/office/drawing/2010/main">
+          <mc:Choice Requires="a14">
             <p:sp>
               <p:nvSpPr>
                 <p:cNvPr id="646" name="Rectangle 645"/>
@@ -42547,7 +42103,16 @@
                             </a:solidFill>
                             <a:latin typeface="Cambria Math" panose="02040503050406030204" pitchFamily="18" charset="0"/>
                           </a:rPr>
-                          <m:t>+1</m:t>
+                          <m:t>+</m:t>
+                        </m:r>
+                        <m:r>
+                          <a:rPr lang="en-US" sz="1400" b="0" i="1" smtClean="0">
+                            <a:solidFill>
+                              <a:schemeClr val="tx1"/>
+                            </a:solidFill>
+                            <a:latin typeface="Cambria Math" panose="02040503050406030204" pitchFamily="18" charset="0"/>
+                          </a:rPr>
+                          <m:t>1</m:t>
                         </m:r>
                       </m:oMath>
                     </m:oMathPara>
@@ -42561,7 +42126,7 @@
               </p:txBody>
             </p:sp>
           </mc:Choice>
-          <mc:Fallback>
+          <mc:Fallback xmlns="">
             <p:sp>
               <p:nvSpPr>
                 <p:cNvPr id="646" name="Rectangle 645"/>
@@ -42603,8 +42168,8 @@
             </p:sp>
           </mc:Fallback>
         </mc:AlternateContent>
-        <mc:AlternateContent xmlns:mc="http://schemas.openxmlformats.org/markup-compatibility/2006">
-          <mc:Choice xmlns:a14="http://schemas.microsoft.com/office/drawing/2010/main" Requires="a14">
+        <mc:AlternateContent xmlns:mc="http://schemas.openxmlformats.org/markup-compatibility/2006" xmlns:a14="http://schemas.microsoft.com/office/drawing/2010/main">
+          <mc:Choice Requires="a14">
             <p:sp>
               <p:nvSpPr>
                 <p:cNvPr id="647" name="Rectangle 646"/>
@@ -42681,7 +42246,7 @@
               </p:txBody>
             </p:sp>
           </mc:Choice>
-          <mc:Fallback>
+          <mc:Fallback xmlns="">
             <p:sp>
               <p:nvSpPr>
                 <p:cNvPr id="647" name="Rectangle 646"/>
@@ -42887,8 +42452,8 @@
             </a:p>
           </p:txBody>
         </p:sp>
-        <mc:AlternateContent xmlns:mc="http://schemas.openxmlformats.org/markup-compatibility/2006">
-          <mc:Choice xmlns:a14="http://schemas.microsoft.com/office/drawing/2010/main" Requires="a14">
+        <mc:AlternateContent xmlns:mc="http://schemas.openxmlformats.org/markup-compatibility/2006" xmlns:a14="http://schemas.microsoft.com/office/drawing/2010/main">
+          <mc:Choice Requires="a14">
             <p:sp>
               <p:nvSpPr>
                 <p:cNvPr id="688" name="Rectangle 687"/>
@@ -43121,7 +42686,18 @@
                                       <a:schemeClr val="tx1"/>
                                     </a:solidFill>
                                   </a:rPr>
-                                  <m:t>′,</m:t>
+                                  <m:t>′</m:t>
+                                </m:r>
+                                <m:r>
+                                  <m:rPr>
+                                    <m:nor/>
+                                  </m:rPr>
+                                  <a:rPr lang="en-US" i="1" dirty="0">
+                                    <a:solidFill>
+                                      <a:schemeClr val="tx1"/>
+                                    </a:solidFill>
+                                  </a:rPr>
+                                  <m:t>,</m:t>
                                 </m:r>
                                 <m:r>
                                   <m:rPr>
@@ -43253,7 +42829,16 @@
                                         </a:solidFill>
                                         <a:latin typeface="Cambria Math" panose="02040503050406030204" pitchFamily="18" charset="0"/>
                                       </a:rPr>
-                                      <m:t>+1</m:t>
+                                      <m:t>+</m:t>
+                                    </m:r>
+                                    <m:r>
+                                      <a:rPr lang="en-US" i="1" dirty="0">
+                                        <a:solidFill>
+                                          <a:schemeClr val="tx1"/>
+                                        </a:solidFill>
+                                        <a:latin typeface="Cambria Math" panose="02040503050406030204" pitchFamily="18" charset="0"/>
+                                      </a:rPr>
+                                      <m:t>1</m:t>
                                     </m:r>
                                   </m:sub>
                                 </m:sSub>
@@ -43354,7 +42939,7 @@
               </p:txBody>
             </p:sp>
           </mc:Choice>
-          <mc:Fallback>
+          <mc:Fallback xmlns="">
             <p:sp>
               <p:nvSpPr>
                 <p:cNvPr id="688" name="Rectangle 687"/>

</xml_diff>

<commit_message>
Matty's comments, figure fixes
</commit_message>
<xml_diff>
--- a/Help/Figures2.pptx
+++ b/Help/Figures2.pptx
@@ -226,7 +226,7 @@
           <a:p>
             <a:fld id="{C07E4396-26A3-4143-A0A3-BBC18DD0CEAD}" type="datetimeFigureOut">
               <a:rPr lang="en-US" smtClean="0"/>
-              <a:t>3/13/2020</a:t>
+              <a:t>4/19/2020</a:t>
             </a:fld>
             <a:endParaRPr lang="en-US" dirty="0"/>
           </a:p>
@@ -790,7 +790,7 @@
           <a:p>
             <a:fld id="{2DC2A043-560F-4D2E-8D1E-02B02E053659}" type="datetimeFigureOut">
               <a:rPr lang="en-US" smtClean="0"/>
-              <a:t>3/13/2020</a:t>
+              <a:t>4/19/2020</a:t>
             </a:fld>
             <a:endParaRPr lang="en-US" dirty="0"/>
           </a:p>
@@ -958,7 +958,7 @@
           <a:p>
             <a:fld id="{2DC2A043-560F-4D2E-8D1E-02B02E053659}" type="datetimeFigureOut">
               <a:rPr lang="en-US" smtClean="0"/>
-              <a:t>3/13/2020</a:t>
+              <a:t>4/19/2020</a:t>
             </a:fld>
             <a:endParaRPr lang="en-US" dirty="0"/>
           </a:p>
@@ -1136,7 +1136,7 @@
           <a:p>
             <a:fld id="{2DC2A043-560F-4D2E-8D1E-02B02E053659}" type="datetimeFigureOut">
               <a:rPr lang="en-US" smtClean="0"/>
-              <a:t>3/13/2020</a:t>
+              <a:t>4/19/2020</a:t>
             </a:fld>
             <a:endParaRPr lang="en-US" dirty="0"/>
           </a:p>
@@ -1304,7 +1304,7 @@
           <a:p>
             <a:fld id="{2DC2A043-560F-4D2E-8D1E-02B02E053659}" type="datetimeFigureOut">
               <a:rPr lang="en-US" smtClean="0"/>
-              <a:t>3/13/2020</a:t>
+              <a:t>4/19/2020</a:t>
             </a:fld>
             <a:endParaRPr lang="en-US" dirty="0"/>
           </a:p>
@@ -1549,7 +1549,7 @@
           <a:p>
             <a:fld id="{2DC2A043-560F-4D2E-8D1E-02B02E053659}" type="datetimeFigureOut">
               <a:rPr lang="en-US" smtClean="0"/>
-              <a:t>3/13/2020</a:t>
+              <a:t>4/19/2020</a:t>
             </a:fld>
             <a:endParaRPr lang="en-US" dirty="0"/>
           </a:p>
@@ -1778,7 +1778,7 @@
           <a:p>
             <a:fld id="{2DC2A043-560F-4D2E-8D1E-02B02E053659}" type="datetimeFigureOut">
               <a:rPr lang="en-US" smtClean="0"/>
-              <a:t>3/13/2020</a:t>
+              <a:t>4/19/2020</a:t>
             </a:fld>
             <a:endParaRPr lang="en-US" dirty="0"/>
           </a:p>
@@ -2142,7 +2142,7 @@
           <a:p>
             <a:fld id="{2DC2A043-560F-4D2E-8D1E-02B02E053659}" type="datetimeFigureOut">
               <a:rPr lang="en-US" smtClean="0"/>
-              <a:t>3/13/2020</a:t>
+              <a:t>4/19/2020</a:t>
             </a:fld>
             <a:endParaRPr lang="en-US" dirty="0"/>
           </a:p>
@@ -2259,7 +2259,7 @@
           <a:p>
             <a:fld id="{2DC2A043-560F-4D2E-8D1E-02B02E053659}" type="datetimeFigureOut">
               <a:rPr lang="en-US" smtClean="0"/>
-              <a:t>3/13/2020</a:t>
+              <a:t>4/19/2020</a:t>
             </a:fld>
             <a:endParaRPr lang="en-US" dirty="0"/>
           </a:p>
@@ -2354,7 +2354,7 @@
           <a:p>
             <a:fld id="{2DC2A043-560F-4D2E-8D1E-02B02E053659}" type="datetimeFigureOut">
               <a:rPr lang="en-US" smtClean="0"/>
-              <a:t>3/13/2020</a:t>
+              <a:t>4/19/2020</a:t>
             </a:fld>
             <a:endParaRPr lang="en-US" dirty="0"/>
           </a:p>
@@ -2629,7 +2629,7 @@
           <a:p>
             <a:fld id="{2DC2A043-560F-4D2E-8D1E-02B02E053659}" type="datetimeFigureOut">
               <a:rPr lang="en-US" smtClean="0"/>
-              <a:t>3/13/2020</a:t>
+              <a:t>4/19/2020</a:t>
             </a:fld>
             <a:endParaRPr lang="en-US" dirty="0"/>
           </a:p>
@@ -2881,7 +2881,7 @@
           <a:p>
             <a:fld id="{2DC2A043-560F-4D2E-8D1E-02B02E053659}" type="datetimeFigureOut">
               <a:rPr lang="en-US" smtClean="0"/>
-              <a:t>3/13/2020</a:t>
+              <a:t>4/19/2020</a:t>
             </a:fld>
             <a:endParaRPr lang="en-US" dirty="0"/>
           </a:p>
@@ -3092,7 +3092,7 @@
           <a:p>
             <a:fld id="{2DC2A043-560F-4D2E-8D1E-02B02E053659}" type="datetimeFigureOut">
               <a:rPr lang="en-US" smtClean="0"/>
-              <a:t>3/13/2020</a:t>
+              <a:t>4/19/2020</a:t>
             </a:fld>
             <a:endParaRPr lang="en-US" dirty="0"/>
           </a:p>
@@ -4601,7 +4601,25 @@
                             </a:solidFill>
                             <a:latin typeface="Cambria Math" panose="02040503050406030204" pitchFamily="18" charset="0"/>
                           </a:rPr>
-                          <m:t>0.8</m:t>
+                          <m:t>0</m:t>
+                        </m:r>
+                        <m:r>
+                          <a:rPr lang="en-US" sz="1700" b="0" i="1" smtClean="0">
+                            <a:solidFill>
+                              <a:schemeClr val="bg1"/>
+                            </a:solidFill>
+                            <a:latin typeface="Cambria Math" panose="02040503050406030204" pitchFamily="18" charset="0"/>
+                          </a:rPr>
+                          <m:t>.</m:t>
+                        </m:r>
+                        <m:r>
+                          <a:rPr lang="en-US" sz="1700" b="0" i="1" smtClean="0">
+                            <a:solidFill>
+                              <a:schemeClr val="bg1"/>
+                            </a:solidFill>
+                            <a:latin typeface="Cambria Math" panose="02040503050406030204" pitchFamily="18" charset="0"/>
+                          </a:rPr>
+                          <m:t>8</m:t>
                         </m:r>
                       </m:oMath>
                     </m:oMathPara>
@@ -4890,7 +4908,16 @@
                             </a:solidFill>
                             <a:latin typeface="Cambria Math" panose="02040503050406030204" pitchFamily="18" charset="0"/>
                           </a:rPr>
-                          <m:t> 0</m:t>
+                          <m:t> </m:t>
+                        </m:r>
+                        <m:r>
+                          <a:rPr lang="en-US" sz="1700" b="0" i="1" smtClean="0">
+                            <a:solidFill>
+                              <a:schemeClr val="tx1"/>
+                            </a:solidFill>
+                            <a:latin typeface="Cambria Math" panose="02040503050406030204" pitchFamily="18" charset="0"/>
+                          </a:rPr>
+                          <m:t>0</m:t>
                         </m:r>
                         <m:r>
                           <a:rPr lang="en-US" sz="1700" b="0" i="0" smtClean="0">
@@ -5518,7 +5545,34 @@
                             </a:solidFill>
                             <a:latin typeface="Cambria Math" panose="02040503050406030204" pitchFamily="18" charset="0"/>
                           </a:rPr>
-                          <m:t> 0.1</m:t>
+                          <m:t> </m:t>
+                        </m:r>
+                        <m:r>
+                          <a:rPr lang="en-US" sz="1700" b="0" i="1" smtClean="0">
+                            <a:solidFill>
+                              <a:schemeClr val="tx1"/>
+                            </a:solidFill>
+                            <a:latin typeface="Cambria Math" panose="02040503050406030204" pitchFamily="18" charset="0"/>
+                          </a:rPr>
+                          <m:t>0</m:t>
+                        </m:r>
+                        <m:r>
+                          <a:rPr lang="en-US" sz="1700" b="0" i="1" smtClean="0">
+                            <a:solidFill>
+                              <a:schemeClr val="tx1"/>
+                            </a:solidFill>
+                            <a:latin typeface="Cambria Math" panose="02040503050406030204" pitchFamily="18" charset="0"/>
+                          </a:rPr>
+                          <m:t>.</m:t>
+                        </m:r>
+                        <m:r>
+                          <a:rPr lang="en-US" sz="1700" b="0" i="1" smtClean="0">
+                            <a:solidFill>
+                              <a:schemeClr val="tx1"/>
+                            </a:solidFill>
+                            <a:latin typeface="Cambria Math" panose="02040503050406030204" pitchFamily="18" charset="0"/>
+                          </a:rPr>
+                          <m:t>1</m:t>
                         </m:r>
                       </m:oMath>
                     </m:oMathPara>
@@ -5627,7 +5681,34 @@
                             </a:solidFill>
                             <a:latin typeface="Cambria Math" panose="02040503050406030204" pitchFamily="18" charset="0"/>
                           </a:rPr>
-                          <m:t> 0.05</m:t>
+                          <m:t> </m:t>
+                        </m:r>
+                        <m:r>
+                          <a:rPr lang="en-US" sz="1700" b="0" i="1" smtClean="0">
+                            <a:solidFill>
+                              <a:sysClr val="windowText" lastClr="000000"/>
+                            </a:solidFill>
+                            <a:latin typeface="Cambria Math" panose="02040503050406030204" pitchFamily="18" charset="0"/>
+                          </a:rPr>
+                          <m:t>0</m:t>
+                        </m:r>
+                        <m:r>
+                          <a:rPr lang="en-US" sz="1700" b="0" i="1" smtClean="0">
+                            <a:solidFill>
+                              <a:sysClr val="windowText" lastClr="000000"/>
+                            </a:solidFill>
+                            <a:latin typeface="Cambria Math" panose="02040503050406030204" pitchFamily="18" charset="0"/>
+                          </a:rPr>
+                          <m:t>.</m:t>
+                        </m:r>
+                        <m:r>
+                          <a:rPr lang="en-US" sz="1700" b="0" i="1" smtClean="0">
+                            <a:solidFill>
+                              <a:sysClr val="windowText" lastClr="000000"/>
+                            </a:solidFill>
+                            <a:latin typeface="Cambria Math" panose="02040503050406030204" pitchFamily="18" charset="0"/>
+                          </a:rPr>
+                          <m:t>05</m:t>
                         </m:r>
                       </m:oMath>
                     </m:oMathPara>
@@ -5734,7 +5815,34 @@
                             </a:solidFill>
                             <a:latin typeface="Cambria Math" panose="02040503050406030204" pitchFamily="18" charset="0"/>
                           </a:rPr>
-                          <m:t> 0.0</m:t>
+                          <m:t> </m:t>
+                        </m:r>
+                        <m:r>
+                          <a:rPr lang="en-US" sz="1700" b="0" i="1" smtClean="0">
+                            <a:solidFill>
+                              <a:schemeClr val="tx1"/>
+                            </a:solidFill>
+                            <a:latin typeface="Cambria Math" panose="02040503050406030204" pitchFamily="18" charset="0"/>
+                          </a:rPr>
+                          <m:t>0</m:t>
+                        </m:r>
+                        <m:r>
+                          <a:rPr lang="en-US" sz="1700" b="0" i="1" smtClean="0">
+                            <a:solidFill>
+                              <a:schemeClr val="tx1"/>
+                            </a:solidFill>
+                            <a:latin typeface="Cambria Math" panose="02040503050406030204" pitchFamily="18" charset="0"/>
+                          </a:rPr>
+                          <m:t>.</m:t>
+                        </m:r>
+                        <m:r>
+                          <a:rPr lang="en-US" sz="1700" b="0" i="1" smtClean="0">
+                            <a:solidFill>
+                              <a:schemeClr val="tx1"/>
+                            </a:solidFill>
+                            <a:latin typeface="Cambria Math" panose="02040503050406030204" pitchFamily="18" charset="0"/>
+                          </a:rPr>
+                          <m:t>0</m:t>
                         </m:r>
                       </m:oMath>
                     </m:oMathPara>
@@ -5843,7 +5951,34 @@
                             </a:solidFill>
                             <a:latin typeface="Cambria Math" panose="02040503050406030204" pitchFamily="18" charset="0"/>
                           </a:rPr>
-                          <m:t> 0.05</m:t>
+                          <m:t> </m:t>
+                        </m:r>
+                        <m:r>
+                          <a:rPr lang="en-US" sz="1700" b="0" i="1" smtClean="0">
+                            <a:solidFill>
+                              <a:sysClr val="windowText" lastClr="000000"/>
+                            </a:solidFill>
+                            <a:latin typeface="Cambria Math" panose="02040503050406030204" pitchFamily="18" charset="0"/>
+                          </a:rPr>
+                          <m:t>0</m:t>
+                        </m:r>
+                        <m:r>
+                          <a:rPr lang="en-US" sz="1700" b="0" i="1" smtClean="0">
+                            <a:solidFill>
+                              <a:sysClr val="windowText" lastClr="000000"/>
+                            </a:solidFill>
+                            <a:latin typeface="Cambria Math" panose="02040503050406030204" pitchFamily="18" charset="0"/>
+                          </a:rPr>
+                          <m:t>.</m:t>
+                        </m:r>
+                        <m:r>
+                          <a:rPr lang="en-US" sz="1700" b="0" i="1" smtClean="0">
+                            <a:solidFill>
+                              <a:sysClr val="windowText" lastClr="000000"/>
+                            </a:solidFill>
+                            <a:latin typeface="Cambria Math" panose="02040503050406030204" pitchFamily="18" charset="0"/>
+                          </a:rPr>
+                          <m:t>05</m:t>
                         </m:r>
                       </m:oMath>
                     </m:oMathPara>
@@ -5953,7 +6088,34 @@
                             </a:solidFill>
                             <a:latin typeface="Cambria Math" panose="02040503050406030204" pitchFamily="18" charset="0"/>
                           </a:rPr>
-                          <m:t> 0.8</m:t>
+                          <m:t> </m:t>
+                        </m:r>
+                        <m:r>
+                          <a:rPr lang="en-US" sz="1700" b="0" i="1" smtClean="0">
+                            <a:solidFill>
+                              <a:schemeClr val="bg1"/>
+                            </a:solidFill>
+                            <a:latin typeface="Cambria Math" panose="02040503050406030204" pitchFamily="18" charset="0"/>
+                          </a:rPr>
+                          <m:t>0</m:t>
+                        </m:r>
+                        <m:r>
+                          <a:rPr lang="en-US" sz="1700" b="0" i="1" smtClean="0">
+                            <a:solidFill>
+                              <a:schemeClr val="bg1"/>
+                            </a:solidFill>
+                            <a:latin typeface="Cambria Math" panose="02040503050406030204" pitchFamily="18" charset="0"/>
+                          </a:rPr>
+                          <m:t>.</m:t>
+                        </m:r>
+                        <m:r>
+                          <a:rPr lang="en-US" sz="1700" b="0" i="1" smtClean="0">
+                            <a:solidFill>
+                              <a:schemeClr val="bg1"/>
+                            </a:solidFill>
+                            <a:latin typeface="Cambria Math" panose="02040503050406030204" pitchFamily="18" charset="0"/>
+                          </a:rPr>
+                          <m:t>8</m:t>
                         </m:r>
                       </m:oMath>
                     </m:oMathPara>
@@ -7534,7 +7696,34 @@
                             </a:solidFill>
                             <a:latin typeface="Cambria Math" panose="02040503050406030204" pitchFamily="18" charset="0"/>
                           </a:rPr>
-                          <m:t> 0.0</m:t>
+                          <m:t> </m:t>
+                        </m:r>
+                        <m:r>
+                          <a:rPr lang="en-US" sz="1700" b="0" i="1" smtClean="0">
+                            <a:solidFill>
+                              <a:sysClr val="windowText" lastClr="000000"/>
+                            </a:solidFill>
+                            <a:latin typeface="Cambria Math" panose="02040503050406030204" pitchFamily="18" charset="0"/>
+                          </a:rPr>
+                          <m:t>0</m:t>
+                        </m:r>
+                        <m:r>
+                          <a:rPr lang="en-US" sz="1700" b="0" i="1" smtClean="0">
+                            <a:solidFill>
+                              <a:sysClr val="windowText" lastClr="000000"/>
+                            </a:solidFill>
+                            <a:latin typeface="Cambria Math" panose="02040503050406030204" pitchFamily="18" charset="0"/>
+                          </a:rPr>
+                          <m:t>.</m:t>
+                        </m:r>
+                        <m:r>
+                          <a:rPr lang="en-US" sz="1700" b="0" i="1" smtClean="0">
+                            <a:solidFill>
+                              <a:sysClr val="windowText" lastClr="000000"/>
+                            </a:solidFill>
+                            <a:latin typeface="Cambria Math" panose="02040503050406030204" pitchFamily="18" charset="0"/>
+                          </a:rPr>
+                          <m:t>0</m:t>
                         </m:r>
                       </m:oMath>
                     </m:oMathPara>
@@ -7643,7 +7832,34 @@
                             </a:solidFill>
                             <a:latin typeface="Cambria Math" panose="02040503050406030204" pitchFamily="18" charset="0"/>
                           </a:rPr>
-                          <m:t> 0.1</m:t>
+                          <m:t> </m:t>
+                        </m:r>
+                        <m:r>
+                          <a:rPr lang="en-US" sz="1700" b="0" i="1" smtClean="0">
+                            <a:solidFill>
+                              <a:schemeClr val="tx1"/>
+                            </a:solidFill>
+                            <a:latin typeface="Cambria Math" panose="02040503050406030204" pitchFamily="18" charset="0"/>
+                          </a:rPr>
+                          <m:t>0</m:t>
+                        </m:r>
+                        <m:r>
+                          <a:rPr lang="en-US" sz="1700" b="0" i="1" smtClean="0">
+                            <a:solidFill>
+                              <a:schemeClr val="tx1"/>
+                            </a:solidFill>
+                            <a:latin typeface="Cambria Math" panose="02040503050406030204" pitchFamily="18" charset="0"/>
+                          </a:rPr>
+                          <m:t>.</m:t>
+                        </m:r>
+                        <m:r>
+                          <a:rPr lang="en-US" sz="1700" b="0" i="1" smtClean="0">
+                            <a:solidFill>
+                              <a:schemeClr val="tx1"/>
+                            </a:solidFill>
+                            <a:latin typeface="Cambria Math" panose="02040503050406030204" pitchFamily="18" charset="0"/>
+                          </a:rPr>
+                          <m:t>1</m:t>
                         </m:r>
                       </m:oMath>
                     </m:oMathPara>
@@ -7750,7 +7966,34 @@
                             </a:solidFill>
                             <a:latin typeface="Cambria Math" panose="02040503050406030204" pitchFamily="18" charset="0"/>
                           </a:rPr>
-                          <m:t> 0.0</m:t>
+                          <m:t> </m:t>
+                        </m:r>
+                        <m:r>
+                          <a:rPr lang="en-US" sz="1700" b="0" i="1" smtClean="0">
+                            <a:solidFill>
+                              <a:sysClr val="windowText" lastClr="000000"/>
+                            </a:solidFill>
+                            <a:latin typeface="Cambria Math" panose="02040503050406030204" pitchFamily="18" charset="0"/>
+                          </a:rPr>
+                          <m:t>0</m:t>
+                        </m:r>
+                        <m:r>
+                          <a:rPr lang="en-US" sz="1700" b="0" i="1" smtClean="0">
+                            <a:solidFill>
+                              <a:sysClr val="windowText" lastClr="000000"/>
+                            </a:solidFill>
+                            <a:latin typeface="Cambria Math" panose="02040503050406030204" pitchFamily="18" charset="0"/>
+                          </a:rPr>
+                          <m:t>.</m:t>
+                        </m:r>
+                        <m:r>
+                          <a:rPr lang="en-US" sz="1700" b="0" i="1" smtClean="0">
+                            <a:solidFill>
+                              <a:sysClr val="windowText" lastClr="000000"/>
+                            </a:solidFill>
+                            <a:latin typeface="Cambria Math" panose="02040503050406030204" pitchFamily="18" charset="0"/>
+                          </a:rPr>
+                          <m:t>0</m:t>
                         </m:r>
                       </m:oMath>
                     </m:oMathPara>
@@ -14179,7 +14422,25 @@
                             </a:solidFill>
                             <a:latin typeface="Cambria Math" panose="02040503050406030204" pitchFamily="18" charset="0"/>
                           </a:rPr>
-                          <m:t>0.8</m:t>
+                          <m:t>0</m:t>
+                        </m:r>
+                        <m:r>
+                          <a:rPr lang="en-US" sz="1700" b="0" i="1" smtClean="0">
+                            <a:solidFill>
+                              <a:schemeClr val="bg1"/>
+                            </a:solidFill>
+                            <a:latin typeface="Cambria Math" panose="02040503050406030204" pitchFamily="18" charset="0"/>
+                          </a:rPr>
+                          <m:t>.</m:t>
+                        </m:r>
+                        <m:r>
+                          <a:rPr lang="en-US" sz="1700" b="0" i="1" smtClean="0">
+                            <a:solidFill>
+                              <a:schemeClr val="bg1"/>
+                            </a:solidFill>
+                            <a:latin typeface="Cambria Math" panose="02040503050406030204" pitchFamily="18" charset="0"/>
+                          </a:rPr>
+                          <m:t>8</m:t>
                         </m:r>
                       </m:oMath>
                     </m:oMathPara>
@@ -14438,7 +14699,16 @@
                             </a:solidFill>
                             <a:latin typeface="Cambria Math" panose="02040503050406030204" pitchFamily="18" charset="0"/>
                           </a:rPr>
-                          <m:t> 0</m:t>
+                          <m:t> </m:t>
+                        </m:r>
+                        <m:r>
+                          <a:rPr lang="en-US" sz="1700" b="0" i="1" smtClean="0">
+                            <a:solidFill>
+                              <a:schemeClr val="tx1"/>
+                            </a:solidFill>
+                            <a:latin typeface="Cambria Math" panose="02040503050406030204" pitchFamily="18" charset="0"/>
+                          </a:rPr>
+                          <m:t>0</m:t>
                         </m:r>
                         <m:r>
                           <a:rPr lang="en-US" sz="1700" b="0" i="0" smtClean="0">
@@ -15066,7 +15336,34 @@
                             </a:solidFill>
                             <a:latin typeface="Cambria Math" panose="02040503050406030204" pitchFamily="18" charset="0"/>
                           </a:rPr>
-                          <m:t> 0.1</m:t>
+                          <m:t> </m:t>
+                        </m:r>
+                        <m:r>
+                          <a:rPr lang="en-US" sz="1700" b="0" i="1" smtClean="0">
+                            <a:solidFill>
+                              <a:schemeClr val="tx1"/>
+                            </a:solidFill>
+                            <a:latin typeface="Cambria Math" panose="02040503050406030204" pitchFamily="18" charset="0"/>
+                          </a:rPr>
+                          <m:t>0</m:t>
+                        </m:r>
+                        <m:r>
+                          <a:rPr lang="en-US" sz="1700" b="0" i="1" smtClean="0">
+                            <a:solidFill>
+                              <a:schemeClr val="tx1"/>
+                            </a:solidFill>
+                            <a:latin typeface="Cambria Math" panose="02040503050406030204" pitchFamily="18" charset="0"/>
+                          </a:rPr>
+                          <m:t>.</m:t>
+                        </m:r>
+                        <m:r>
+                          <a:rPr lang="en-US" sz="1700" b="0" i="1" smtClean="0">
+                            <a:solidFill>
+                              <a:schemeClr val="tx1"/>
+                            </a:solidFill>
+                            <a:latin typeface="Cambria Math" panose="02040503050406030204" pitchFamily="18" charset="0"/>
+                          </a:rPr>
+                          <m:t>1</m:t>
                         </m:r>
                       </m:oMath>
                     </m:oMathPara>
@@ -15175,7 +15472,34 @@
                             </a:solidFill>
                             <a:latin typeface="Cambria Math" panose="02040503050406030204" pitchFamily="18" charset="0"/>
                           </a:rPr>
-                          <m:t> 0.05</m:t>
+                          <m:t> </m:t>
+                        </m:r>
+                        <m:r>
+                          <a:rPr lang="en-US" sz="1700" b="0" i="1" smtClean="0">
+                            <a:solidFill>
+                              <a:sysClr val="windowText" lastClr="000000"/>
+                            </a:solidFill>
+                            <a:latin typeface="Cambria Math" panose="02040503050406030204" pitchFamily="18" charset="0"/>
+                          </a:rPr>
+                          <m:t>0</m:t>
+                        </m:r>
+                        <m:r>
+                          <a:rPr lang="en-US" sz="1700" b="0" i="1" smtClean="0">
+                            <a:solidFill>
+                              <a:sysClr val="windowText" lastClr="000000"/>
+                            </a:solidFill>
+                            <a:latin typeface="Cambria Math" panose="02040503050406030204" pitchFamily="18" charset="0"/>
+                          </a:rPr>
+                          <m:t>.</m:t>
+                        </m:r>
+                        <m:r>
+                          <a:rPr lang="en-US" sz="1700" b="0" i="1" smtClean="0">
+                            <a:solidFill>
+                              <a:sysClr val="windowText" lastClr="000000"/>
+                            </a:solidFill>
+                            <a:latin typeface="Cambria Math" panose="02040503050406030204" pitchFamily="18" charset="0"/>
+                          </a:rPr>
+                          <m:t>05</m:t>
                         </m:r>
                       </m:oMath>
                     </m:oMathPara>
@@ -15282,7 +15606,34 @@
                             </a:solidFill>
                             <a:latin typeface="Cambria Math" panose="02040503050406030204" pitchFamily="18" charset="0"/>
                           </a:rPr>
-                          <m:t> 0.0</m:t>
+                          <m:t> </m:t>
+                        </m:r>
+                        <m:r>
+                          <a:rPr lang="en-US" sz="1700" b="0" i="1" smtClean="0">
+                            <a:solidFill>
+                              <a:schemeClr val="tx1"/>
+                            </a:solidFill>
+                            <a:latin typeface="Cambria Math" panose="02040503050406030204" pitchFamily="18" charset="0"/>
+                          </a:rPr>
+                          <m:t>0</m:t>
+                        </m:r>
+                        <m:r>
+                          <a:rPr lang="en-US" sz="1700" b="0" i="1" smtClean="0">
+                            <a:solidFill>
+                              <a:schemeClr val="tx1"/>
+                            </a:solidFill>
+                            <a:latin typeface="Cambria Math" panose="02040503050406030204" pitchFamily="18" charset="0"/>
+                          </a:rPr>
+                          <m:t>.</m:t>
+                        </m:r>
+                        <m:r>
+                          <a:rPr lang="en-US" sz="1700" b="0" i="1" smtClean="0">
+                            <a:solidFill>
+                              <a:schemeClr val="tx1"/>
+                            </a:solidFill>
+                            <a:latin typeface="Cambria Math" panose="02040503050406030204" pitchFamily="18" charset="0"/>
+                          </a:rPr>
+                          <m:t>0</m:t>
                         </m:r>
                       </m:oMath>
                     </m:oMathPara>
@@ -15391,7 +15742,34 @@
                             </a:solidFill>
                             <a:latin typeface="Cambria Math" panose="02040503050406030204" pitchFamily="18" charset="0"/>
                           </a:rPr>
-                          <m:t> 0.05</m:t>
+                          <m:t> </m:t>
+                        </m:r>
+                        <m:r>
+                          <a:rPr lang="en-US" sz="1700" b="0" i="1" smtClean="0">
+                            <a:solidFill>
+                              <a:sysClr val="windowText" lastClr="000000"/>
+                            </a:solidFill>
+                            <a:latin typeface="Cambria Math" panose="02040503050406030204" pitchFamily="18" charset="0"/>
+                          </a:rPr>
+                          <m:t>0</m:t>
+                        </m:r>
+                        <m:r>
+                          <a:rPr lang="en-US" sz="1700" b="0" i="1" smtClean="0">
+                            <a:solidFill>
+                              <a:sysClr val="windowText" lastClr="000000"/>
+                            </a:solidFill>
+                            <a:latin typeface="Cambria Math" panose="02040503050406030204" pitchFamily="18" charset="0"/>
+                          </a:rPr>
+                          <m:t>.</m:t>
+                        </m:r>
+                        <m:r>
+                          <a:rPr lang="en-US" sz="1700" b="0" i="1" smtClean="0">
+                            <a:solidFill>
+                              <a:sysClr val="windowText" lastClr="000000"/>
+                            </a:solidFill>
+                            <a:latin typeface="Cambria Math" panose="02040503050406030204" pitchFamily="18" charset="0"/>
+                          </a:rPr>
+                          <m:t>05</m:t>
                         </m:r>
                       </m:oMath>
                     </m:oMathPara>
@@ -15501,7 +15879,34 @@
                             </a:solidFill>
                             <a:latin typeface="Cambria Math" panose="02040503050406030204" pitchFamily="18" charset="0"/>
                           </a:rPr>
-                          <m:t> 0.8</m:t>
+                          <m:t> </m:t>
+                        </m:r>
+                        <m:r>
+                          <a:rPr lang="en-US" sz="1700" b="0" i="1" smtClean="0">
+                            <a:solidFill>
+                              <a:schemeClr val="bg1"/>
+                            </a:solidFill>
+                            <a:latin typeface="Cambria Math" panose="02040503050406030204" pitchFamily="18" charset="0"/>
+                          </a:rPr>
+                          <m:t>0</m:t>
+                        </m:r>
+                        <m:r>
+                          <a:rPr lang="en-US" sz="1700" b="0" i="1" smtClean="0">
+                            <a:solidFill>
+                              <a:schemeClr val="bg1"/>
+                            </a:solidFill>
+                            <a:latin typeface="Cambria Math" panose="02040503050406030204" pitchFamily="18" charset="0"/>
+                          </a:rPr>
+                          <m:t>.</m:t>
+                        </m:r>
+                        <m:r>
+                          <a:rPr lang="en-US" sz="1700" b="0" i="1" smtClean="0">
+                            <a:solidFill>
+                              <a:schemeClr val="bg1"/>
+                            </a:solidFill>
+                            <a:latin typeface="Cambria Math" panose="02040503050406030204" pitchFamily="18" charset="0"/>
+                          </a:rPr>
+                          <m:t>8</m:t>
                         </m:r>
                       </m:oMath>
                     </m:oMathPara>
@@ -15912,7 +16317,34 @@
                             </a:solidFill>
                             <a:latin typeface="Cambria Math" panose="02040503050406030204" pitchFamily="18" charset="0"/>
                           </a:rPr>
-                          <m:t> 0.0</m:t>
+                          <m:t> </m:t>
+                        </m:r>
+                        <m:r>
+                          <a:rPr lang="en-US" sz="1700" b="0" i="1" smtClean="0">
+                            <a:solidFill>
+                              <a:sysClr val="windowText" lastClr="000000"/>
+                            </a:solidFill>
+                            <a:latin typeface="Cambria Math" panose="02040503050406030204" pitchFamily="18" charset="0"/>
+                          </a:rPr>
+                          <m:t>0</m:t>
+                        </m:r>
+                        <m:r>
+                          <a:rPr lang="en-US" sz="1700" b="0" i="1" smtClean="0">
+                            <a:solidFill>
+                              <a:sysClr val="windowText" lastClr="000000"/>
+                            </a:solidFill>
+                            <a:latin typeface="Cambria Math" panose="02040503050406030204" pitchFamily="18" charset="0"/>
+                          </a:rPr>
+                          <m:t>.</m:t>
+                        </m:r>
+                        <m:r>
+                          <a:rPr lang="en-US" sz="1700" b="0" i="1" smtClean="0">
+                            <a:solidFill>
+                              <a:sysClr val="windowText" lastClr="000000"/>
+                            </a:solidFill>
+                            <a:latin typeface="Cambria Math" panose="02040503050406030204" pitchFamily="18" charset="0"/>
+                          </a:rPr>
+                          <m:t>0</m:t>
                         </m:r>
                       </m:oMath>
                     </m:oMathPara>
@@ -16021,7 +16453,34 @@
                             </a:solidFill>
                             <a:latin typeface="Cambria Math" panose="02040503050406030204" pitchFamily="18" charset="0"/>
                           </a:rPr>
-                          <m:t> 0.1</m:t>
+                          <m:t> </m:t>
+                        </m:r>
+                        <m:r>
+                          <a:rPr lang="en-US" sz="1700" b="0" i="1" smtClean="0">
+                            <a:solidFill>
+                              <a:schemeClr val="tx1"/>
+                            </a:solidFill>
+                            <a:latin typeface="Cambria Math" panose="02040503050406030204" pitchFamily="18" charset="0"/>
+                          </a:rPr>
+                          <m:t>0</m:t>
+                        </m:r>
+                        <m:r>
+                          <a:rPr lang="en-US" sz="1700" b="0" i="1" smtClean="0">
+                            <a:solidFill>
+                              <a:schemeClr val="tx1"/>
+                            </a:solidFill>
+                            <a:latin typeface="Cambria Math" panose="02040503050406030204" pitchFamily="18" charset="0"/>
+                          </a:rPr>
+                          <m:t>.</m:t>
+                        </m:r>
+                        <m:r>
+                          <a:rPr lang="en-US" sz="1700" b="0" i="1" smtClean="0">
+                            <a:solidFill>
+                              <a:schemeClr val="tx1"/>
+                            </a:solidFill>
+                            <a:latin typeface="Cambria Math" panose="02040503050406030204" pitchFamily="18" charset="0"/>
+                          </a:rPr>
+                          <m:t>1</m:t>
                         </m:r>
                       </m:oMath>
                     </m:oMathPara>
@@ -16128,7 +16587,34 @@
                             </a:solidFill>
                             <a:latin typeface="Cambria Math" panose="02040503050406030204" pitchFamily="18" charset="0"/>
                           </a:rPr>
-                          <m:t> 0.0</m:t>
+                          <m:t> </m:t>
+                        </m:r>
+                        <m:r>
+                          <a:rPr lang="en-US" sz="1700" b="0" i="1" smtClean="0">
+                            <a:solidFill>
+                              <a:sysClr val="windowText" lastClr="000000"/>
+                            </a:solidFill>
+                            <a:latin typeface="Cambria Math" panose="02040503050406030204" pitchFamily="18" charset="0"/>
+                          </a:rPr>
+                          <m:t>0</m:t>
+                        </m:r>
+                        <m:r>
+                          <a:rPr lang="en-US" sz="1700" b="0" i="1" smtClean="0">
+                            <a:solidFill>
+                              <a:sysClr val="windowText" lastClr="000000"/>
+                            </a:solidFill>
+                            <a:latin typeface="Cambria Math" panose="02040503050406030204" pitchFamily="18" charset="0"/>
+                          </a:rPr>
+                          <m:t>.</m:t>
+                        </m:r>
+                        <m:r>
+                          <a:rPr lang="en-US" sz="1700" b="0" i="1" smtClean="0">
+                            <a:solidFill>
+                              <a:sysClr val="windowText" lastClr="000000"/>
+                            </a:solidFill>
+                            <a:latin typeface="Cambria Math" panose="02040503050406030204" pitchFamily="18" charset="0"/>
+                          </a:rPr>
+                          <m:t>0</m:t>
                         </m:r>
                       </m:oMath>
                     </m:oMathPara>
@@ -22771,7 +23257,43 @@
                               </a:solidFill>
                               <a:latin typeface="Cambria Math" panose="02040503050406030204" pitchFamily="18" charset="0"/>
                             </a:rPr>
-                            <m:t> (1,0)</m:t>
+                            <m:t> (</m:t>
+                          </m:r>
+                          <m:r>
+                            <a:rPr lang="en-US" sz="1200" b="0" i="1" smtClean="0">
+                              <a:solidFill>
+                                <a:schemeClr val="tx1"/>
+                              </a:solidFill>
+                              <a:latin typeface="Cambria Math" panose="02040503050406030204" pitchFamily="18" charset="0"/>
+                            </a:rPr>
+                            <m:t>1</m:t>
+                          </m:r>
+                          <m:r>
+                            <a:rPr lang="en-US" sz="1200" b="0" i="1" smtClean="0">
+                              <a:solidFill>
+                                <a:schemeClr val="tx1"/>
+                              </a:solidFill>
+                              <a:latin typeface="Cambria Math" panose="02040503050406030204" pitchFamily="18" charset="0"/>
+                            </a:rPr>
+                            <m:t>,</m:t>
+                          </m:r>
+                          <m:r>
+                            <a:rPr lang="en-US" sz="1200" b="0" i="1" smtClean="0">
+                              <a:solidFill>
+                                <a:schemeClr val="tx1"/>
+                              </a:solidFill>
+                              <a:latin typeface="Cambria Math" panose="02040503050406030204" pitchFamily="18" charset="0"/>
+                            </a:rPr>
+                            <m:t>0</m:t>
+                          </m:r>
+                          <m:r>
+                            <a:rPr lang="en-US" sz="1200" b="0" i="1" smtClean="0">
+                              <a:solidFill>
+                                <a:schemeClr val="tx1"/>
+                              </a:solidFill>
+                              <a:latin typeface="Cambria Math" panose="02040503050406030204" pitchFamily="18" charset="0"/>
+                            </a:rPr>
+                            <m:t>)</m:t>
                           </m:r>
                         </m:oMath>
                       </m:oMathPara>
@@ -22962,7 +23484,43 @@
                               </a:solidFill>
                               <a:latin typeface="Cambria Math" panose="02040503050406030204" pitchFamily="18" charset="0"/>
                             </a:rPr>
-                            <m:t> (1,1)</m:t>
+                            <m:t> (</m:t>
+                          </m:r>
+                          <m:r>
+                            <a:rPr lang="en-US" sz="1200" b="0" i="1" smtClean="0">
+                              <a:solidFill>
+                                <a:schemeClr val="tx1"/>
+                              </a:solidFill>
+                              <a:latin typeface="Cambria Math" panose="02040503050406030204" pitchFamily="18" charset="0"/>
+                            </a:rPr>
+                            <m:t>1</m:t>
+                          </m:r>
+                          <m:r>
+                            <a:rPr lang="en-US" sz="1200" b="0" i="1" smtClean="0">
+                              <a:solidFill>
+                                <a:schemeClr val="tx1"/>
+                              </a:solidFill>
+                              <a:latin typeface="Cambria Math" panose="02040503050406030204" pitchFamily="18" charset="0"/>
+                            </a:rPr>
+                            <m:t>,</m:t>
+                          </m:r>
+                          <m:r>
+                            <a:rPr lang="en-US" sz="1200" b="0" i="1" smtClean="0">
+                              <a:solidFill>
+                                <a:schemeClr val="tx1"/>
+                              </a:solidFill>
+                              <a:latin typeface="Cambria Math" panose="02040503050406030204" pitchFamily="18" charset="0"/>
+                            </a:rPr>
+                            <m:t>1</m:t>
+                          </m:r>
+                          <m:r>
+                            <a:rPr lang="en-US" sz="1200" b="0" i="1" smtClean="0">
+                              <a:solidFill>
+                                <a:schemeClr val="tx1"/>
+                              </a:solidFill>
+                              <a:latin typeface="Cambria Math" panose="02040503050406030204" pitchFamily="18" charset="0"/>
+                            </a:rPr>
+                            <m:t>)</m:t>
                           </m:r>
                         </m:oMath>
                       </m:oMathPara>
@@ -23822,7 +24380,43 @@
                               </a:solidFill>
                               <a:latin typeface="Cambria Math" panose="02040503050406030204" pitchFamily="18" charset="0"/>
                             </a:rPr>
-                            <m:t> (1,1)</m:t>
+                            <m:t> (</m:t>
+                          </m:r>
+                          <m:r>
+                            <a:rPr lang="en-US" sz="1200" i="1">
+                              <a:solidFill>
+                                <a:schemeClr val="tx1"/>
+                              </a:solidFill>
+                              <a:latin typeface="Cambria Math" panose="02040503050406030204" pitchFamily="18" charset="0"/>
+                            </a:rPr>
+                            <m:t>1</m:t>
+                          </m:r>
+                          <m:r>
+                            <a:rPr lang="en-US" sz="1200" i="1">
+                              <a:solidFill>
+                                <a:schemeClr val="tx1"/>
+                              </a:solidFill>
+                              <a:latin typeface="Cambria Math" panose="02040503050406030204" pitchFamily="18" charset="0"/>
+                            </a:rPr>
+                            <m:t>,</m:t>
+                          </m:r>
+                          <m:r>
+                            <a:rPr lang="en-US" sz="1200" i="1">
+                              <a:solidFill>
+                                <a:schemeClr val="tx1"/>
+                              </a:solidFill>
+                              <a:latin typeface="Cambria Math" panose="02040503050406030204" pitchFamily="18" charset="0"/>
+                            </a:rPr>
+                            <m:t>1</m:t>
+                          </m:r>
+                          <m:r>
+                            <a:rPr lang="en-US" sz="1200" i="1">
+                              <a:solidFill>
+                                <a:schemeClr val="tx1"/>
+                              </a:solidFill>
+                              <a:latin typeface="Cambria Math" panose="02040503050406030204" pitchFamily="18" charset="0"/>
+                            </a:rPr>
+                            <m:t>)</m:t>
                           </m:r>
                         </m:oMath>
                       </m:oMathPara>
@@ -24007,7 +24601,43 @@
                               </a:solidFill>
                               <a:latin typeface="Cambria Math" panose="02040503050406030204" pitchFamily="18" charset="0"/>
                             </a:rPr>
-                            <m:t> (1,1)</m:t>
+                            <m:t> (</m:t>
+                          </m:r>
+                          <m:r>
+                            <a:rPr lang="en-US" sz="1200" i="1">
+                              <a:solidFill>
+                                <a:schemeClr val="tx1"/>
+                              </a:solidFill>
+                              <a:latin typeface="Cambria Math" panose="02040503050406030204" pitchFamily="18" charset="0"/>
+                            </a:rPr>
+                            <m:t>1</m:t>
+                          </m:r>
+                          <m:r>
+                            <a:rPr lang="en-US" sz="1200" i="1">
+                              <a:solidFill>
+                                <a:schemeClr val="tx1"/>
+                              </a:solidFill>
+                              <a:latin typeface="Cambria Math" panose="02040503050406030204" pitchFamily="18" charset="0"/>
+                            </a:rPr>
+                            <m:t>,</m:t>
+                          </m:r>
+                          <m:r>
+                            <a:rPr lang="en-US" sz="1200" i="1">
+                              <a:solidFill>
+                                <a:schemeClr val="tx1"/>
+                              </a:solidFill>
+                              <a:latin typeface="Cambria Math" panose="02040503050406030204" pitchFamily="18" charset="0"/>
+                            </a:rPr>
+                            <m:t>1</m:t>
+                          </m:r>
+                          <m:r>
+                            <a:rPr lang="en-US" sz="1200" i="1">
+                              <a:solidFill>
+                                <a:schemeClr val="tx1"/>
+                              </a:solidFill>
+                              <a:latin typeface="Cambria Math" panose="02040503050406030204" pitchFamily="18" charset="0"/>
+                            </a:rPr>
+                            <m:t>)</m:t>
                           </m:r>
                         </m:oMath>
                       </m:oMathPara>
@@ -24606,7 +25236,25 @@
                               </a:solidFill>
                               <a:latin typeface="Cambria Math" panose="02040503050406030204" pitchFamily="18" charset="0"/>
                             </a:rPr>
-                            <m:t>,0)</m:t>
+                            <m:t>,</m:t>
+                          </m:r>
+                          <m:r>
+                            <a:rPr lang="en-US" sz="1200" i="1">
+                              <a:solidFill>
+                                <a:schemeClr val="tx1"/>
+                              </a:solidFill>
+                              <a:latin typeface="Cambria Math" panose="02040503050406030204" pitchFamily="18" charset="0"/>
+                            </a:rPr>
+                            <m:t>0</m:t>
+                          </m:r>
+                          <m:r>
+                            <a:rPr lang="en-US" sz="1200" i="1">
+                              <a:solidFill>
+                                <a:schemeClr val="tx1"/>
+                              </a:solidFill>
+                              <a:latin typeface="Cambria Math" panose="02040503050406030204" pitchFamily="18" charset="0"/>
+                            </a:rPr>
+                            <m:t>)</m:t>
                           </m:r>
                         </m:oMath>
                       </m:oMathPara>
@@ -24806,7 +25454,43 @@
                               </a:solidFill>
                               <a:latin typeface="Cambria Math" panose="02040503050406030204" pitchFamily="18" charset="0"/>
                             </a:rPr>
-                            <m:t>(1,1)</m:t>
+                            <m:t>(</m:t>
+                          </m:r>
+                          <m:r>
+                            <a:rPr lang="en-US" sz="1200" i="1">
+                              <a:solidFill>
+                                <a:schemeClr val="tx1"/>
+                              </a:solidFill>
+                              <a:latin typeface="Cambria Math" panose="02040503050406030204" pitchFamily="18" charset="0"/>
+                            </a:rPr>
+                            <m:t>1</m:t>
+                          </m:r>
+                          <m:r>
+                            <a:rPr lang="en-US" sz="1200" i="1">
+                              <a:solidFill>
+                                <a:schemeClr val="tx1"/>
+                              </a:solidFill>
+                              <a:latin typeface="Cambria Math" panose="02040503050406030204" pitchFamily="18" charset="0"/>
+                            </a:rPr>
+                            <m:t>,</m:t>
+                          </m:r>
+                          <m:r>
+                            <a:rPr lang="en-US" sz="1200" i="1">
+                              <a:solidFill>
+                                <a:schemeClr val="tx1"/>
+                              </a:solidFill>
+                              <a:latin typeface="Cambria Math" panose="02040503050406030204" pitchFamily="18" charset="0"/>
+                            </a:rPr>
+                            <m:t>1</m:t>
+                          </m:r>
+                          <m:r>
+                            <a:rPr lang="en-US" sz="1200" i="1">
+                              <a:solidFill>
+                                <a:schemeClr val="tx1"/>
+                              </a:solidFill>
+                              <a:latin typeface="Cambria Math" panose="02040503050406030204" pitchFamily="18" charset="0"/>
+                            </a:rPr>
+                            <m:t>)</m:t>
                           </m:r>
                         </m:oMath>
                       </m:oMathPara>
@@ -25672,7 +26356,43 @@
                               </a:solidFill>
                               <a:latin typeface="Cambria Math" panose="02040503050406030204" pitchFamily="18" charset="0"/>
                             </a:rPr>
-                            <m:t> (1,1)</m:t>
+                            <m:t> (</m:t>
+                          </m:r>
+                          <m:r>
+                            <a:rPr lang="en-US" sz="1200" i="1">
+                              <a:solidFill>
+                                <a:schemeClr val="tx1"/>
+                              </a:solidFill>
+                              <a:latin typeface="Cambria Math" panose="02040503050406030204" pitchFamily="18" charset="0"/>
+                            </a:rPr>
+                            <m:t>1</m:t>
+                          </m:r>
+                          <m:r>
+                            <a:rPr lang="en-US" sz="1200" i="1">
+                              <a:solidFill>
+                                <a:schemeClr val="tx1"/>
+                              </a:solidFill>
+                              <a:latin typeface="Cambria Math" panose="02040503050406030204" pitchFamily="18" charset="0"/>
+                            </a:rPr>
+                            <m:t>,</m:t>
+                          </m:r>
+                          <m:r>
+                            <a:rPr lang="en-US" sz="1200" i="1">
+                              <a:solidFill>
+                                <a:schemeClr val="tx1"/>
+                              </a:solidFill>
+                              <a:latin typeface="Cambria Math" panose="02040503050406030204" pitchFamily="18" charset="0"/>
+                            </a:rPr>
+                            <m:t>1</m:t>
+                          </m:r>
+                          <m:r>
+                            <a:rPr lang="en-US" sz="1200" i="1">
+                              <a:solidFill>
+                                <a:schemeClr val="tx1"/>
+                              </a:solidFill>
+                              <a:latin typeface="Cambria Math" panose="02040503050406030204" pitchFamily="18" charset="0"/>
+                            </a:rPr>
+                            <m:t>)</m:t>
                           </m:r>
                         </m:oMath>
                       </m:oMathPara>
@@ -25857,7 +26577,43 @@
                               </a:solidFill>
                               <a:latin typeface="Cambria Math" panose="02040503050406030204" pitchFamily="18" charset="0"/>
                             </a:rPr>
-                            <m:t> (1,1)</m:t>
+                            <m:t> (</m:t>
+                          </m:r>
+                          <m:r>
+                            <a:rPr lang="en-US" sz="1200" i="1">
+                              <a:solidFill>
+                                <a:schemeClr val="tx1"/>
+                              </a:solidFill>
+                              <a:latin typeface="Cambria Math" panose="02040503050406030204" pitchFamily="18" charset="0"/>
+                            </a:rPr>
+                            <m:t>1</m:t>
+                          </m:r>
+                          <m:r>
+                            <a:rPr lang="en-US" sz="1200" i="1">
+                              <a:solidFill>
+                                <a:schemeClr val="tx1"/>
+                              </a:solidFill>
+                              <a:latin typeface="Cambria Math" panose="02040503050406030204" pitchFamily="18" charset="0"/>
+                            </a:rPr>
+                            <m:t>,</m:t>
+                          </m:r>
+                          <m:r>
+                            <a:rPr lang="en-US" sz="1200" i="1">
+                              <a:solidFill>
+                                <a:schemeClr val="tx1"/>
+                              </a:solidFill>
+                              <a:latin typeface="Cambria Math" panose="02040503050406030204" pitchFamily="18" charset="0"/>
+                            </a:rPr>
+                            <m:t>1</m:t>
+                          </m:r>
+                          <m:r>
+                            <a:rPr lang="en-US" sz="1200" i="1">
+                              <a:solidFill>
+                                <a:schemeClr val="tx1"/>
+                              </a:solidFill>
+                              <a:latin typeface="Cambria Math" panose="02040503050406030204" pitchFamily="18" charset="0"/>
+                            </a:rPr>
+                            <m:t>)</m:t>
                           </m:r>
                         </m:oMath>
                       </m:oMathPara>
@@ -26385,7 +27141,25 @@
                               </a:solidFill>
                               <a:latin typeface="Cambria Math" panose="02040503050406030204" pitchFamily="18" charset="0"/>
                             </a:rPr>
-                            <m:t> ,0 )</m:t>
+                            <m:t> ,</m:t>
+                          </m:r>
+                          <m:r>
+                            <a:rPr lang="en-US" sz="1200" b="0" i="1" spc="-150" smtClean="0">
+                              <a:solidFill>
+                                <a:schemeClr val="tx1"/>
+                              </a:solidFill>
+                              <a:latin typeface="Cambria Math" panose="02040503050406030204" pitchFamily="18" charset="0"/>
+                            </a:rPr>
+                            <m:t>0</m:t>
+                          </m:r>
+                          <m:r>
+                            <a:rPr lang="en-US" sz="1200" b="0" i="1" spc="-150" smtClean="0">
+                              <a:solidFill>
+                                <a:schemeClr val="tx1"/>
+                              </a:solidFill>
+                              <a:latin typeface="Cambria Math" panose="02040503050406030204" pitchFamily="18" charset="0"/>
+                            </a:rPr>
+                            <m:t> )</m:t>
                           </m:r>
                         </m:oMath>
                       </m:oMathPara>
@@ -26612,7 +27386,25 @@
                               </a:solidFill>
                               <a:latin typeface="Cambria Math" panose="02040503050406030204" pitchFamily="18" charset="0"/>
                             </a:rPr>
-                            <m:t>,1)</m:t>
+                            <m:t>,</m:t>
+                          </m:r>
+                          <m:r>
+                            <a:rPr lang="en-US" sz="1200" b="0" i="1" spc="-150" smtClean="0">
+                              <a:solidFill>
+                                <a:schemeClr val="tx1"/>
+                              </a:solidFill>
+                              <a:latin typeface="Cambria Math" panose="02040503050406030204" pitchFamily="18" charset="0"/>
+                            </a:rPr>
+                            <m:t>1</m:t>
+                          </m:r>
+                          <m:r>
+                            <a:rPr lang="en-US" sz="1200" b="0" i="1" spc="-150" smtClean="0">
+                              <a:solidFill>
+                                <a:schemeClr val="tx1"/>
+                              </a:solidFill>
+                              <a:latin typeface="Cambria Math" panose="02040503050406030204" pitchFamily="18" charset="0"/>
+                            </a:rPr>
+                            <m:t>)</m:t>
                           </m:r>
                         </m:oMath>
                       </m:oMathPara>
@@ -27472,7 +28264,43 @@
                               </a:solidFill>
                               <a:latin typeface="Cambria Math" panose="02040503050406030204" pitchFamily="18" charset="0"/>
                             </a:rPr>
-                            <m:t> (1,1)</m:t>
+                            <m:t> (</m:t>
+                          </m:r>
+                          <m:r>
+                            <a:rPr lang="en-US" sz="1200" i="1">
+                              <a:solidFill>
+                                <a:schemeClr val="tx1"/>
+                              </a:solidFill>
+                              <a:latin typeface="Cambria Math" panose="02040503050406030204" pitchFamily="18" charset="0"/>
+                            </a:rPr>
+                            <m:t>1</m:t>
+                          </m:r>
+                          <m:r>
+                            <a:rPr lang="en-US" sz="1200" i="1">
+                              <a:solidFill>
+                                <a:schemeClr val="tx1"/>
+                              </a:solidFill>
+                              <a:latin typeface="Cambria Math" panose="02040503050406030204" pitchFamily="18" charset="0"/>
+                            </a:rPr>
+                            <m:t>,</m:t>
+                          </m:r>
+                          <m:r>
+                            <a:rPr lang="en-US" sz="1200" i="1">
+                              <a:solidFill>
+                                <a:schemeClr val="tx1"/>
+                              </a:solidFill>
+                              <a:latin typeface="Cambria Math" panose="02040503050406030204" pitchFamily="18" charset="0"/>
+                            </a:rPr>
+                            <m:t>1</m:t>
+                          </m:r>
+                          <m:r>
+                            <a:rPr lang="en-US" sz="1200" i="1">
+                              <a:solidFill>
+                                <a:schemeClr val="tx1"/>
+                              </a:solidFill>
+                              <a:latin typeface="Cambria Math" panose="02040503050406030204" pitchFamily="18" charset="0"/>
+                            </a:rPr>
+                            <m:t>)</m:t>
                           </m:r>
                         </m:oMath>
                       </m:oMathPara>
@@ -27663,7 +28491,43 @@
                               </a:solidFill>
                               <a:latin typeface="Cambria Math" panose="02040503050406030204" pitchFamily="18" charset="0"/>
                             </a:rPr>
-                            <m:t> (1,1)</m:t>
+                            <m:t> (</m:t>
+                          </m:r>
+                          <m:r>
+                            <a:rPr lang="en-US" sz="1200" i="1">
+                              <a:solidFill>
+                                <a:schemeClr val="tx1"/>
+                              </a:solidFill>
+                              <a:latin typeface="Cambria Math" panose="02040503050406030204" pitchFamily="18" charset="0"/>
+                            </a:rPr>
+                            <m:t>1</m:t>
+                          </m:r>
+                          <m:r>
+                            <a:rPr lang="en-US" sz="1200" i="1">
+                              <a:solidFill>
+                                <a:schemeClr val="tx1"/>
+                              </a:solidFill>
+                              <a:latin typeface="Cambria Math" panose="02040503050406030204" pitchFamily="18" charset="0"/>
+                            </a:rPr>
+                            <m:t>,</m:t>
+                          </m:r>
+                          <m:r>
+                            <a:rPr lang="en-US" sz="1200" i="1">
+                              <a:solidFill>
+                                <a:schemeClr val="tx1"/>
+                              </a:solidFill>
+                              <a:latin typeface="Cambria Math" panose="02040503050406030204" pitchFamily="18" charset="0"/>
+                            </a:rPr>
+                            <m:t>1</m:t>
+                          </m:r>
+                          <m:r>
+                            <a:rPr lang="en-US" sz="1200" i="1">
+                              <a:solidFill>
+                                <a:schemeClr val="tx1"/>
+                              </a:solidFill>
+                              <a:latin typeface="Cambria Math" panose="02040503050406030204" pitchFamily="18" charset="0"/>
+                            </a:rPr>
+                            <m:t>)</m:t>
                           </m:r>
                         </m:oMath>
                       </m:oMathPara>
@@ -40195,7 +41059,18 @@
                                       <a:schemeClr val="tx1"/>
                                     </a:solidFill>
                                   </a:rPr>
-                                  <m:t>′,</m:t>
+                                  <m:t>′</m:t>
+                                </m:r>
+                                <m:r>
+                                  <m:rPr>
+                                    <m:nor/>
+                                  </m:rPr>
+                                  <a:rPr lang="en-US" sz="2400" i="1" dirty="0">
+                                    <a:solidFill>
+                                      <a:schemeClr val="tx1"/>
+                                    </a:solidFill>
+                                  </a:rPr>
+                                  <m:t>,</m:t>
                                 </m:r>
                                 <m:r>
                                   <m:rPr>
@@ -40262,7 +41137,18 @@
                                       <a:schemeClr val="tx1"/>
                                     </a:solidFill>
                                   </a:rPr>
-                                  <m:t>′,</m:t>
+                                  <m:t>′</m:t>
+                                </m:r>
+                                <m:r>
+                                  <m:rPr>
+                                    <m:nor/>
+                                  </m:rPr>
+                                  <a:rPr lang="en-US" sz="2400" i="1" dirty="0">
+                                    <a:solidFill>
+                                      <a:schemeClr val="tx1"/>
+                                    </a:solidFill>
+                                  </a:rPr>
+                                  <m:t>,</m:t>
                                 </m:r>
                                 <m:r>
                                   <m:rPr>
@@ -40284,7 +41170,18 @@
                                       <a:schemeClr val="tx1"/>
                                     </a:solidFill>
                                   </a:rPr>
-                                  <m:t>−1</m:t>
+                                  <m:t>−</m:t>
+                                </m:r>
+                                <m:r>
+                                  <m:rPr>
+                                    <m:nor/>
+                                  </m:rPr>
+                                  <a:rPr lang="en-US" sz="2400" i="1" dirty="0">
+                                    <a:solidFill>
+                                      <a:schemeClr val="tx1"/>
+                                    </a:solidFill>
+                                  </a:rPr>
+                                  <m:t>1</m:t>
                                 </m:r>
                               </m:sub>
                             </m:sSub>
@@ -42490,7 +43387,18 @@
                                     <a:schemeClr val="tx1"/>
                                   </a:solidFill>
                                 </a:rPr>
-                                <m:t>′,</m:t>
+                                <m:t>′</m:t>
+                              </m:r>
+                              <m:r>
+                                <m:rPr>
+                                  <m:nor/>
+                                </m:rPr>
+                                <a:rPr lang="en-US" sz="2400" i="1" dirty="0">
+                                  <a:solidFill>
+                                    <a:schemeClr val="tx1"/>
+                                  </a:solidFill>
+                                </a:rPr>
+                                <m:t>,</m:t>
                               </m:r>
                               <m:r>
                                 <m:rPr>
@@ -42512,7 +43420,18 @@
                                     <a:schemeClr val="tx1"/>
                                   </a:solidFill>
                                 </a:rPr>
-                                <m:t>+1</m:t>
+                                <m:t>+</m:t>
+                              </m:r>
+                              <m:r>
+                                <m:rPr>
+                                  <m:nor/>
+                                </m:rPr>
+                                <a:rPr lang="en-US" sz="2400" i="1" dirty="0">
+                                  <a:solidFill>
+                                    <a:schemeClr val="tx1"/>
+                                  </a:solidFill>
+                                </a:rPr>
+                                <m:t>1</m:t>
                               </m:r>
                             </m:sub>
                           </m:sSub>
@@ -42611,7 +43530,16 @@
                                       </a:solidFill>
                                       <a:latin typeface="Cambria Math" panose="02040503050406030204" pitchFamily="18" charset="0"/>
                                     </a:rPr>
-                                    <m:t>+1</m:t>
+                                    <m:t>+</m:t>
+                                  </m:r>
+                                  <m:r>
+                                    <a:rPr lang="en-US" sz="2400" i="1" dirty="0">
+                                      <a:solidFill>
+                                        <a:schemeClr val="tx1"/>
+                                      </a:solidFill>
+                                      <a:latin typeface="Cambria Math" panose="02040503050406030204" pitchFamily="18" charset="0"/>
+                                    </a:rPr>
+                                    <m:t>1</m:t>
                                   </m:r>
                                 </m:sub>
                               </m:sSub>
@@ -42793,1183 +43721,1016 @@
       </p:grpSpPr>
       <p:grpSp>
         <p:nvGrpSpPr>
-          <p:cNvPr id="14" name="Group 13"/>
+          <p:cNvPr id="4" name="Group 3"/>
           <p:cNvGrpSpPr/>
           <p:nvPr/>
         </p:nvGrpSpPr>
         <p:grpSpPr>
           <a:xfrm>
-            <a:off x="-438006" y="443167"/>
-            <a:ext cx="12869753" cy="5341997"/>
+            <a:off x="-427846" y="443167"/>
+            <a:ext cx="11554370" cy="5328625"/>
             <a:chOff x="-438006" y="443167"/>
-            <a:chExt cx="12869753" cy="5341997"/>
+            <a:chExt cx="11554370" cy="5328625"/>
           </a:xfrm>
         </p:grpSpPr>
-        <p:grpSp>
-          <p:nvGrpSpPr>
-            <p:cNvPr id="2" name="Group 1"/>
-            <p:cNvGrpSpPr/>
+        <p:sp>
+          <p:nvSpPr>
+            <p:cNvPr id="12" name="Equal 11"/>
+            <p:cNvSpPr/>
             <p:nvPr/>
-          </p:nvGrpSpPr>
-          <p:grpSpPr>
+          </p:nvSpPr>
+          <p:spPr>
             <a:xfrm>
-              <a:off x="-438006" y="443167"/>
-              <a:ext cx="12869753" cy="5341997"/>
-              <a:chOff x="-448166" y="445072"/>
-              <a:chExt cx="12869753" cy="5341997"/>
+              <a:off x="7997566" y="2814956"/>
+              <a:ext cx="438009" cy="233675"/>
             </a:xfrm>
-          </p:grpSpPr>
-          <p:sp>
-            <p:nvSpPr>
-              <p:cNvPr id="11" name="Oval 10"/>
-              <p:cNvSpPr/>
-              <p:nvPr/>
-            </p:nvSpPr>
-            <p:spPr>
-              <a:xfrm>
-                <a:off x="3846007" y="2849882"/>
-                <a:ext cx="150832" cy="167635"/>
-              </a:xfrm>
-              <a:prstGeom prst="ellipse">
-                <a:avLst/>
-              </a:prstGeom>
+            <a:prstGeom prst="mathEqual">
+              <a:avLst>
+                <a:gd name="adj1" fmla="val 26550"/>
+                <a:gd name="adj2" fmla="val 36003"/>
+              </a:avLst>
+            </a:prstGeom>
+            <a:solidFill>
+              <a:schemeClr val="tx1"/>
+            </a:solidFill>
+            <a:ln>
               <a:solidFill>
-                <a:schemeClr val="bg1"/>
+                <a:schemeClr val="tx1"/>
               </a:solidFill>
-              <a:ln w="57150">
+            </a:ln>
+          </p:spPr>
+          <p:style>
+            <a:lnRef idx="2">
+              <a:schemeClr val="accent1">
+                <a:shade val="50000"/>
+              </a:schemeClr>
+            </a:lnRef>
+            <a:fillRef idx="1">
+              <a:schemeClr val="accent1"/>
+            </a:fillRef>
+            <a:effectRef idx="0">
+              <a:schemeClr val="accent1"/>
+            </a:effectRef>
+            <a:fontRef idx="minor">
+              <a:schemeClr val="lt1"/>
+            </a:fontRef>
+          </p:style>
+          <p:txBody>
+            <a:bodyPr rtlCol="0" anchor="ctr"/>
+            <a:lstStyle/>
+            <a:p>
+              <a:pPr algn="ctr"/>
+              <a:endParaRPr lang="en-US" dirty="0">
                 <a:solidFill>
                   <a:schemeClr val="tx1"/>
                 </a:solidFill>
-              </a:ln>
-            </p:spPr>
-            <p:style>
-              <a:lnRef idx="2">
-                <a:schemeClr val="accent1">
-                  <a:shade val="50000"/>
-                </a:schemeClr>
-              </a:lnRef>
-              <a:fillRef idx="1">
-                <a:schemeClr val="accent1"/>
-              </a:fillRef>
-              <a:effectRef idx="0">
-                <a:schemeClr val="accent1"/>
-              </a:effectRef>
-              <a:fontRef idx="minor">
-                <a:schemeClr val="lt1"/>
-              </a:fontRef>
-            </p:style>
-            <p:txBody>
-              <a:bodyPr rtlCol="0" anchor="ctr"/>
-              <a:lstStyle/>
-              <a:p>
-                <a:pPr algn="ctr"/>
-                <a:endParaRPr lang="en-US" dirty="0"/>
-              </a:p>
-            </p:txBody>
-          </p:sp>
-          <p:sp>
-            <p:nvSpPr>
-              <p:cNvPr id="12" name="Equal 11"/>
-              <p:cNvSpPr/>
-              <p:nvPr/>
-            </p:nvSpPr>
-            <p:spPr>
-              <a:xfrm>
-                <a:off x="7863208" y="2816863"/>
-                <a:ext cx="438009" cy="233675"/>
-              </a:xfrm>
-              <a:prstGeom prst="mathEqual">
-                <a:avLst>
-                  <a:gd name="adj1" fmla="val 26550"/>
-                  <a:gd name="adj2" fmla="val 36003"/>
-                </a:avLst>
-              </a:prstGeom>
+              </a:endParaRPr>
+            </a:p>
+          </p:txBody>
+        </p:sp>
+        <p:cxnSp>
+          <p:nvCxnSpPr>
+            <p:cNvPr id="21" name="Straight Connector 20"/>
+            <p:cNvCxnSpPr/>
+            <p:nvPr/>
+          </p:nvCxnSpPr>
+          <p:spPr>
+            <a:xfrm flipH="1">
+              <a:off x="58159" y="979820"/>
+              <a:ext cx="585731" cy="1054546"/>
+            </a:xfrm>
+            <a:prstGeom prst="line">
+              <a:avLst/>
+            </a:prstGeom>
+            <a:ln w="12700">
               <a:solidFill>
                 <a:schemeClr val="tx1"/>
               </a:solidFill>
-              <a:ln>
+            </a:ln>
+          </p:spPr>
+          <p:style>
+            <a:lnRef idx="1">
+              <a:schemeClr val="accent1"/>
+            </a:lnRef>
+            <a:fillRef idx="0">
+              <a:schemeClr val="accent1"/>
+            </a:fillRef>
+            <a:effectRef idx="0">
+              <a:schemeClr val="accent1"/>
+            </a:effectRef>
+            <a:fontRef idx="minor">
+              <a:schemeClr val="tx1"/>
+            </a:fontRef>
+          </p:style>
+        </p:cxnSp>
+        <p:cxnSp>
+          <p:nvCxnSpPr>
+            <p:cNvPr id="266" name="Straight Connector 265"/>
+            <p:cNvCxnSpPr/>
+            <p:nvPr/>
+          </p:nvCxnSpPr>
+          <p:spPr>
+            <a:xfrm>
+              <a:off x="2973448" y="978658"/>
+              <a:ext cx="672361" cy="1054546"/>
+            </a:xfrm>
+            <a:prstGeom prst="line">
+              <a:avLst/>
+            </a:prstGeom>
+            <a:ln w="12700">
+              <a:solidFill>
+                <a:schemeClr val="tx1"/>
+              </a:solidFill>
+            </a:ln>
+          </p:spPr>
+          <p:style>
+            <a:lnRef idx="1">
+              <a:schemeClr val="accent1"/>
+            </a:lnRef>
+            <a:fillRef idx="0">
+              <a:schemeClr val="accent1"/>
+            </a:fillRef>
+            <a:effectRef idx="0">
+              <a:schemeClr val="accent1"/>
+            </a:effectRef>
+            <a:fontRef idx="minor">
+              <a:schemeClr val="tx1"/>
+            </a:fontRef>
+          </p:style>
+        </p:cxnSp>
+        <p:sp>
+          <p:nvSpPr>
+            <p:cNvPr id="267" name="Rectangle 266"/>
+            <p:cNvSpPr/>
+            <p:nvPr/>
+          </p:nvSpPr>
+          <p:spPr>
+            <a:xfrm>
+              <a:off x="3685505" y="1470279"/>
+              <a:ext cx="4572000" cy="606467"/>
+            </a:xfrm>
+            <a:prstGeom prst="rect">
+              <a:avLst/>
+            </a:prstGeom>
+            <a:noFill/>
+            <a:ln>
+              <a:noFill/>
+            </a:ln>
+          </p:spPr>
+          <p:style>
+            <a:lnRef idx="2">
+              <a:schemeClr val="accent1">
+                <a:shade val="50000"/>
+              </a:schemeClr>
+            </a:lnRef>
+            <a:fillRef idx="1">
+              <a:schemeClr val="accent1"/>
+            </a:fillRef>
+            <a:effectRef idx="0">
+              <a:schemeClr val="accent1"/>
+            </a:effectRef>
+            <a:fontRef idx="minor">
+              <a:schemeClr val="lt1"/>
+            </a:fontRef>
+          </p:style>
+          <p:txBody>
+            <a:bodyPr rtlCol="0" anchor="ctr"/>
+            <a:lstStyle/>
+            <a:p>
+              <a:pPr algn="ctr"/>
+              <a:r>
+                <a:rPr lang="en-US" sz="2400" dirty="0" smtClean="0">
+                  <a:solidFill>
+                    <a:schemeClr val="tx1"/>
+                  </a:solidFill>
+                  <a:latin typeface="Cambria Math" panose="02040503050406030204" pitchFamily="18" charset="0"/>
+                  <a:ea typeface="Cambria Math" panose="02040503050406030204" pitchFamily="18" charset="0"/>
+                </a:rPr>
+                <a:t>PWM (M)</a:t>
+              </a:r>
+              <a:endParaRPr lang="en-US" sz="2400" dirty="0">
                 <a:solidFill>
                   <a:schemeClr val="tx1"/>
                 </a:solidFill>
-              </a:ln>
-            </p:spPr>
-            <p:style>
-              <a:lnRef idx="2">
-                <a:schemeClr val="accent1">
-                  <a:shade val="50000"/>
-                </a:schemeClr>
-              </a:lnRef>
-              <a:fillRef idx="1">
-                <a:schemeClr val="accent1"/>
-              </a:fillRef>
-              <a:effectRef idx="0">
-                <a:schemeClr val="accent1"/>
-              </a:effectRef>
-              <a:fontRef idx="minor">
-                <a:schemeClr val="lt1"/>
-              </a:fontRef>
-            </p:style>
-            <p:txBody>
-              <a:bodyPr rtlCol="0" anchor="ctr"/>
-              <a:lstStyle/>
-              <a:p>
-                <a:pPr algn="ctr"/>
-                <a:endParaRPr lang="en-US" dirty="0">
+                <a:latin typeface="Cambria Math" panose="02040503050406030204" pitchFamily="18" charset="0"/>
+                <a:ea typeface="Cambria Math" panose="02040503050406030204" pitchFamily="18" charset="0"/>
+              </a:endParaRPr>
+            </a:p>
+          </p:txBody>
+        </p:sp>
+        <p:sp>
+          <p:nvSpPr>
+            <p:cNvPr id="72" name="Rectangle 71"/>
+            <p:cNvSpPr/>
+            <p:nvPr/>
+          </p:nvSpPr>
+          <p:spPr>
+            <a:xfrm>
+              <a:off x="-438006" y="443167"/>
+              <a:ext cx="4572000" cy="606467"/>
+            </a:xfrm>
+            <a:prstGeom prst="rect">
+              <a:avLst/>
+            </a:prstGeom>
+            <a:noFill/>
+            <a:ln>
+              <a:noFill/>
+            </a:ln>
+          </p:spPr>
+          <p:style>
+            <a:lnRef idx="2">
+              <a:schemeClr val="accent1">
+                <a:shade val="50000"/>
+              </a:schemeClr>
+            </a:lnRef>
+            <a:fillRef idx="1">
+              <a:schemeClr val="accent1"/>
+            </a:fillRef>
+            <a:effectRef idx="0">
+              <a:schemeClr val="accent1"/>
+            </a:effectRef>
+            <a:fontRef idx="minor">
+              <a:schemeClr val="lt1"/>
+            </a:fontRef>
+          </p:style>
+          <p:txBody>
+            <a:bodyPr rtlCol="0" anchor="ctr"/>
+            <a:lstStyle/>
+            <a:p>
+              <a:pPr algn="ctr"/>
+              <a:r>
+                <a:rPr lang="en-US" sz="2800" b="1" spc="600" dirty="0">
                   <a:solidFill>
-                    <a:schemeClr val="tx1"/>
+                    <a:schemeClr val="bg2">
+                      <a:lumMod val="75000"/>
+                    </a:schemeClr>
                   </a:solidFill>
-                </a:endParaRPr>
-              </a:p>
-            </p:txBody>
-          </p:sp>
-          <p:cxnSp>
-            <p:nvCxnSpPr>
-              <p:cNvPr id="21" name="Straight Connector 20"/>
-              <p:cNvCxnSpPr/>
-              <p:nvPr/>
-            </p:nvCxnSpPr>
-            <p:spPr>
-              <a:xfrm flipH="1">
-                <a:off x="47999" y="981725"/>
-                <a:ext cx="585731" cy="1054546"/>
-              </a:xfrm>
-              <a:prstGeom prst="line">
-                <a:avLst/>
-              </a:prstGeom>
-              <a:ln w="12700">
-                <a:solidFill>
-                  <a:schemeClr val="tx1"/>
-                </a:solidFill>
-              </a:ln>
-            </p:spPr>
-            <p:style>
-              <a:lnRef idx="1">
-                <a:schemeClr val="accent1"/>
-              </a:lnRef>
-              <a:fillRef idx="0">
-                <a:schemeClr val="accent1"/>
-              </a:fillRef>
-              <a:effectRef idx="0">
-                <a:schemeClr val="accent1"/>
-              </a:effectRef>
-              <a:fontRef idx="minor">
+                  <a:latin typeface="Courier New" panose="02070309020205020404" pitchFamily="49" charset="0"/>
+                  <a:cs typeface="Courier New" panose="02070309020205020404" pitchFamily="49" charset="0"/>
+                </a:rPr>
+                <a:t>…</a:t>
+              </a:r>
+              <a:r>
+                <a:rPr lang="en-US" sz="2800" b="1" spc="600" dirty="0" smtClean="0">
+                  <a:solidFill>
+                    <a:schemeClr val="bg2">
+                      <a:lumMod val="75000"/>
+                    </a:schemeClr>
+                  </a:solidFill>
+                  <a:latin typeface="Courier New" panose="02070309020205020404" pitchFamily="49" charset="0"/>
+                  <a:cs typeface="Courier New" panose="02070309020205020404" pitchFamily="49" charset="0"/>
+                </a:rPr>
+                <a:t>CG</a:t>
+              </a:r>
+              <a:r>
+                <a:rPr lang="en-US" sz="2800" b="1" spc="600" dirty="0" smtClean="0">
+                  <a:solidFill>
+                    <a:sysClr val="windowText" lastClr="000000"/>
+                  </a:solidFill>
+                  <a:latin typeface="Courier New" panose="02070309020205020404" pitchFamily="49" charset="0"/>
+                  <a:cs typeface="Courier New" panose="02070309020205020404" pitchFamily="49" charset="0"/>
+                </a:rPr>
+                <a:t>ACTCCGTA</a:t>
+              </a:r>
+              <a:r>
+                <a:rPr lang="en-US" sz="2800" b="1" spc="600" dirty="0" smtClean="0">
+                  <a:solidFill>
+                    <a:schemeClr val="bg2">
+                      <a:lumMod val="75000"/>
+                    </a:schemeClr>
+                  </a:solidFill>
+                  <a:latin typeface="Courier New" panose="02070309020205020404" pitchFamily="49" charset="0"/>
+                  <a:cs typeface="Courier New" panose="02070309020205020404" pitchFamily="49" charset="0"/>
+                </a:rPr>
+                <a:t>TA</a:t>
+              </a:r>
+              <a:r>
+                <a:rPr lang="en-US" sz="2800" b="1" spc="600" dirty="0">
+                  <a:solidFill>
+                    <a:schemeClr val="bg2">
+                      <a:lumMod val="75000"/>
+                    </a:schemeClr>
+                  </a:solidFill>
+                  <a:latin typeface="Courier New" panose="02070309020205020404" pitchFamily="49" charset="0"/>
+                  <a:cs typeface="Courier New" panose="02070309020205020404" pitchFamily="49" charset="0"/>
+                </a:rPr>
+                <a:t>…</a:t>
+              </a:r>
+            </a:p>
+          </p:txBody>
+        </p:sp>
+        <p:sp>
+          <p:nvSpPr>
+            <p:cNvPr id="73" name="Rectangle 72"/>
+            <p:cNvSpPr/>
+            <p:nvPr/>
+          </p:nvSpPr>
+          <p:spPr>
+            <a:xfrm>
+              <a:off x="649114" y="523523"/>
+              <a:ext cx="2326640" cy="450835"/>
+            </a:xfrm>
+            <a:prstGeom prst="rect">
+              <a:avLst/>
+            </a:prstGeom>
+            <a:noFill/>
+            <a:ln w="38100">
+              <a:solidFill>
                 <a:schemeClr val="tx1"/>
-              </a:fontRef>
-            </p:style>
-          </p:cxnSp>
-          <p:cxnSp>
-            <p:nvCxnSpPr>
-              <p:cNvPr id="266" name="Straight Connector 265"/>
-              <p:cNvCxnSpPr/>
-              <p:nvPr/>
-            </p:nvCxnSpPr>
-            <p:spPr>
-              <a:xfrm>
-                <a:off x="2963288" y="980563"/>
-                <a:ext cx="672361" cy="1054546"/>
-              </a:xfrm>
-              <a:prstGeom prst="line">
-                <a:avLst/>
-              </a:prstGeom>
-              <a:ln w="12700">
-                <a:solidFill>
-                  <a:schemeClr val="tx1"/>
-                </a:solidFill>
-              </a:ln>
-            </p:spPr>
-            <p:style>
-              <a:lnRef idx="1">
-                <a:schemeClr val="accent1"/>
-              </a:lnRef>
-              <a:fillRef idx="0">
-                <a:schemeClr val="accent1"/>
-              </a:fillRef>
-              <a:effectRef idx="0">
-                <a:schemeClr val="accent1"/>
-              </a:effectRef>
-              <a:fontRef idx="minor">
-                <a:schemeClr val="tx1"/>
-              </a:fontRef>
-            </p:style>
-          </p:cxnSp>
-          <p:sp>
-            <p:nvSpPr>
-              <p:cNvPr id="267" name="Rectangle 266"/>
-              <p:cNvSpPr/>
-              <p:nvPr/>
-            </p:nvSpPr>
-            <p:spPr>
-              <a:xfrm>
-                <a:off x="3675345" y="1472184"/>
-                <a:ext cx="4572000" cy="606467"/>
-              </a:xfrm>
-              <a:prstGeom prst="rect">
-                <a:avLst/>
-              </a:prstGeom>
-              <a:noFill/>
-              <a:ln>
+              </a:solidFill>
+            </a:ln>
+          </p:spPr>
+          <p:style>
+            <a:lnRef idx="2">
+              <a:schemeClr val="accent1">
+                <a:shade val="50000"/>
+              </a:schemeClr>
+            </a:lnRef>
+            <a:fillRef idx="1">
+              <a:schemeClr val="accent1"/>
+            </a:fillRef>
+            <a:effectRef idx="0">
+              <a:schemeClr val="accent1"/>
+            </a:effectRef>
+            <a:fontRef idx="minor">
+              <a:schemeClr val="lt1"/>
+            </a:fontRef>
+          </p:style>
+          <p:txBody>
+            <a:bodyPr rtlCol="0" anchor="ctr"/>
+            <a:lstStyle/>
+            <a:p>
+              <a:pPr algn="ctr"/>
+              <a:endParaRPr lang="en-US" dirty="0"/>
+            </a:p>
+          </p:txBody>
+        </p:sp>
+        <p:cxnSp>
+          <p:nvCxnSpPr>
+            <p:cNvPr id="74" name="Straight Arrow Connector 73"/>
+            <p:cNvCxnSpPr/>
+            <p:nvPr/>
+          </p:nvCxnSpPr>
+          <p:spPr>
+            <a:xfrm>
+              <a:off x="2844108" y="455476"/>
+              <a:ext cx="901161" cy="3397"/>
+            </a:xfrm>
+            <a:prstGeom prst="straightConnector1">
+              <a:avLst/>
+            </a:prstGeom>
+            <a:ln w="57150">
+              <a:solidFill>
+                <a:srgbClr val="C00000"/>
+              </a:solidFill>
+              <a:tailEnd type="triangle"/>
+            </a:ln>
+          </p:spPr>
+          <p:style>
+            <a:lnRef idx="1">
+              <a:schemeClr val="accent1"/>
+            </a:lnRef>
+            <a:fillRef idx="0">
+              <a:schemeClr val="accent1"/>
+            </a:fillRef>
+            <a:effectRef idx="0">
+              <a:schemeClr val="accent1"/>
+            </a:effectRef>
+            <a:fontRef idx="minor">
+              <a:schemeClr val="tx1"/>
+            </a:fontRef>
+          </p:style>
+        </p:cxnSp>
+        <mc:AlternateContent xmlns:mc="http://schemas.openxmlformats.org/markup-compatibility/2006">
+          <mc:Choice xmlns:a14="http://schemas.microsoft.com/office/drawing/2010/main" Requires="a14">
+            <p:sp>
+              <p:nvSpPr>
+                <p:cNvPr id="30" name="Rectangle 29"/>
+                <p:cNvSpPr/>
+                <p:nvPr/>
+              </p:nvSpPr>
+              <p:spPr>
+                <a:xfrm>
+                  <a:off x="8355097" y="2348237"/>
+                  <a:ext cx="2761267" cy="1151875"/>
+                </a:xfrm>
+                <a:prstGeom prst="rect">
+                  <a:avLst/>
+                </a:prstGeom>
                 <a:noFill/>
-              </a:ln>
-            </p:spPr>
-            <p:style>
-              <a:lnRef idx="2">
-                <a:schemeClr val="accent1">
-                  <a:shade val="50000"/>
-                </a:schemeClr>
-              </a:lnRef>
-              <a:fillRef idx="1">
-                <a:schemeClr val="accent1"/>
-              </a:fillRef>
-              <a:effectRef idx="0">
-                <a:schemeClr val="accent1"/>
-              </a:effectRef>
-              <a:fontRef idx="minor">
-                <a:schemeClr val="lt1"/>
-              </a:fontRef>
-            </p:style>
-            <p:txBody>
-              <a:bodyPr rtlCol="0" anchor="ctr"/>
-              <a:lstStyle/>
-              <a:p>
-                <a:pPr algn="ctr"/>
-                <a:r>
-                  <a:rPr lang="en-US" sz="2400" dirty="0">
+                <a:ln>
+                  <a:solidFill>
+                    <a:schemeClr val="bg1"/>
+                  </a:solidFill>
+                </a:ln>
+              </p:spPr>
+              <p:style>
+                <a:lnRef idx="2">
+                  <a:schemeClr val="accent1">
+                    <a:shade val="50000"/>
+                  </a:schemeClr>
+                </a:lnRef>
+                <a:fillRef idx="1">
+                  <a:schemeClr val="accent1"/>
+                </a:fillRef>
+                <a:effectRef idx="0">
+                  <a:schemeClr val="accent1"/>
+                </a:effectRef>
+                <a:fontRef idx="minor">
+                  <a:schemeClr val="lt1"/>
+                </a:fontRef>
+              </p:style>
+              <p:txBody>
+                <a:bodyPr rtlCol="0" anchor="ctr"/>
+                <a:lstStyle/>
+                <a:p>
+                  <a:pPr algn="ctr"/>
+                  <a14:m>
+                    <m:oMathPara xmlns:m="http://schemas.openxmlformats.org/officeDocument/2006/math">
+                      <m:oMathParaPr>
+                        <m:jc m:val="centerGroup"/>
+                      </m:oMathParaPr>
+                      <m:oMath xmlns:m="http://schemas.openxmlformats.org/officeDocument/2006/math">
+                        <m:nary>
+                          <m:naryPr>
+                            <m:chr m:val="∑"/>
+                            <m:supHide m:val="on"/>
+                            <m:ctrlPr>
+                              <a:rPr lang="en-US" sz="2400" i="1" smtClean="0">
+                                <a:solidFill>
+                                  <a:schemeClr val="tx1"/>
+                                </a:solidFill>
+                                <a:latin typeface="Cambria Math" panose="02040503050406030204" pitchFamily="18" charset="0"/>
+                                <a:ea typeface="Cambria Math" panose="02040503050406030204" pitchFamily="18" charset="0"/>
+                              </a:rPr>
+                            </m:ctrlPr>
+                          </m:naryPr>
+                          <m:sub>
+                            <m:r>
+                              <m:rPr>
+                                <m:sty m:val="p"/>
+                              </m:rPr>
+                              <a:rPr lang="en-GB" sz="2400" b="0" i="0" smtClean="0">
+                                <a:solidFill>
+                                  <a:schemeClr val="tx1"/>
+                                </a:solidFill>
+                                <a:latin typeface="Cambria Math" panose="02040503050406030204" pitchFamily="18" charset="0"/>
+                                <a:ea typeface="Cambria Math" panose="02040503050406030204" pitchFamily="18" charset="0"/>
+                              </a:rPr>
+                              <m:t>i</m:t>
+                            </m:r>
+                            <m:r>
+                              <a:rPr lang="en-GB" sz="2400" b="0" i="0" smtClean="0">
+                                <a:solidFill>
+                                  <a:schemeClr val="tx1"/>
+                                </a:solidFill>
+                                <a:latin typeface="Cambria Math" panose="02040503050406030204" pitchFamily="18" charset="0"/>
+                                <a:ea typeface="Cambria Math" panose="02040503050406030204" pitchFamily="18" charset="0"/>
+                              </a:rPr>
+                              <m:t>,</m:t>
+                            </m:r>
+                            <m:r>
+                              <m:rPr>
+                                <m:sty m:val="p"/>
+                              </m:rPr>
+                              <a:rPr lang="en-GB" sz="2400">
+                                <a:solidFill>
+                                  <a:schemeClr val="tx1"/>
+                                </a:solidFill>
+                                <a:latin typeface="Cambria Math" panose="02040503050406030204" pitchFamily="18" charset="0"/>
+                                <a:ea typeface="Cambria Math" panose="02040503050406030204" pitchFamily="18" charset="0"/>
+                              </a:rPr>
+                              <m:t>j</m:t>
+                            </m:r>
+                          </m:sub>
+                          <m:sup/>
+                          <m:e>
+                            <m:nary>
+                              <m:naryPr>
+                                <m:chr m:val="∑"/>
+                                <m:supHide m:val="on"/>
+                                <m:ctrlPr>
+                                  <a:rPr lang="en-US" sz="2400" i="1">
+                                    <a:solidFill>
+                                      <a:schemeClr val="tx1"/>
+                                    </a:solidFill>
+                                    <a:latin typeface="Cambria Math" panose="02040503050406030204" pitchFamily="18" charset="0"/>
+                                    <a:ea typeface="Cambria Math" panose="02040503050406030204" pitchFamily="18" charset="0"/>
+                                  </a:rPr>
+                                </m:ctrlPr>
+                              </m:naryPr>
+                              <m:sub>
+                                <m:r>
+                                  <m:rPr>
+                                    <m:sty m:val="p"/>
+                                  </m:rPr>
+                                  <a:rPr lang="en-GB" sz="2400">
+                                    <a:solidFill>
+                                      <a:schemeClr val="tx1"/>
+                                    </a:solidFill>
+                                    <a:latin typeface="Cambria Math" panose="02040503050406030204" pitchFamily="18" charset="0"/>
+                                    <a:ea typeface="Cambria Math" panose="02040503050406030204" pitchFamily="18" charset="0"/>
+                                  </a:rPr>
+                                  <m:t>j</m:t>
+                                </m:r>
+                              </m:sub>
+                              <m:sup/>
+                              <m:e>
+                                <m:sSub>
+                                  <m:sSubPr>
+                                    <m:ctrlPr>
+                                      <a:rPr lang="en-US" sz="2400" b="0" i="1" smtClean="0">
+                                        <a:solidFill>
+                                          <a:schemeClr val="tx1"/>
+                                        </a:solidFill>
+                                        <a:latin typeface="Cambria Math" panose="02040503050406030204" pitchFamily="18" charset="0"/>
+                                        <a:ea typeface="Cambria Math" panose="02040503050406030204" pitchFamily="18" charset="0"/>
+                                      </a:rPr>
+                                    </m:ctrlPr>
+                                  </m:sSubPr>
+                                  <m:e>
+                                    <m:r>
+                                      <a:rPr lang="en-US" sz="2400" b="0" i="1" smtClean="0">
+                                        <a:solidFill>
+                                          <a:schemeClr val="tx1"/>
+                                        </a:solidFill>
+                                        <a:latin typeface="Cambria Math" panose="02040503050406030204" pitchFamily="18" charset="0"/>
+                                        <a:ea typeface="Cambria Math" panose="02040503050406030204" pitchFamily="18" charset="0"/>
+                                      </a:rPr>
+                                      <m:t>𝐻</m:t>
+                                    </m:r>
+                                  </m:e>
+                                  <m:sub>
+                                    <m:r>
+                                      <a:rPr lang="en-US" sz="2400" b="0" i="1" smtClean="0">
+                                        <a:solidFill>
+                                          <a:schemeClr val="tx1"/>
+                                        </a:solidFill>
+                                        <a:latin typeface="Cambria Math" panose="02040503050406030204" pitchFamily="18" charset="0"/>
+                                        <a:ea typeface="Cambria Math" panose="02040503050406030204" pitchFamily="18" charset="0"/>
+                                      </a:rPr>
+                                      <m:t>𝑖</m:t>
+                                    </m:r>
+                                    <m:r>
+                                      <a:rPr lang="en-US" sz="2400" b="0" i="1" smtClean="0">
+                                        <a:solidFill>
+                                          <a:schemeClr val="tx1"/>
+                                        </a:solidFill>
+                                        <a:latin typeface="Cambria Math" panose="02040503050406030204" pitchFamily="18" charset="0"/>
+                                        <a:ea typeface="Cambria Math" panose="02040503050406030204" pitchFamily="18" charset="0"/>
+                                      </a:rPr>
+                                      <m:t>,</m:t>
+                                    </m:r>
+                                    <m:r>
+                                      <a:rPr lang="en-US" sz="2400" b="0" i="1" smtClean="0">
+                                        <a:solidFill>
+                                          <a:schemeClr val="tx1"/>
+                                        </a:solidFill>
+                                        <a:latin typeface="Cambria Math" panose="02040503050406030204" pitchFamily="18" charset="0"/>
+                                        <a:ea typeface="Cambria Math" panose="02040503050406030204" pitchFamily="18" charset="0"/>
+                                      </a:rPr>
+                                      <m:t>𝑗</m:t>
+                                    </m:r>
+                                  </m:sub>
+                                </m:sSub>
+                              </m:e>
+                            </m:nary>
+                            <m:r>
+                              <a:rPr lang="en-US" sz="2400" b="0" i="1" smtClean="0">
+                                <a:solidFill>
+                                  <a:schemeClr val="tx1"/>
+                                </a:solidFill>
+                                <a:latin typeface="Cambria Math" panose="02040503050406030204" pitchFamily="18" charset="0"/>
+                                <a:ea typeface="Cambria Math" panose="02040503050406030204" pitchFamily="18" charset="0"/>
+                              </a:rPr>
+                              <m:t>⋅</m:t>
+                            </m:r>
+                            <m:sSub>
+                              <m:sSubPr>
+                                <m:ctrlPr>
+                                  <a:rPr lang="en-US" sz="2400" b="0" i="1" smtClean="0">
+                                    <a:solidFill>
+                                      <a:schemeClr val="tx1"/>
+                                    </a:solidFill>
+                                    <a:latin typeface="Cambria Math" panose="02040503050406030204" pitchFamily="18" charset="0"/>
+                                    <a:ea typeface="Cambria Math" panose="02040503050406030204" pitchFamily="18" charset="0"/>
+                                  </a:rPr>
+                                </m:ctrlPr>
+                              </m:sSubPr>
+                              <m:e>
+                                <m:r>
+                                  <a:rPr lang="en-US" sz="2400" b="0" i="1" smtClean="0">
+                                    <a:solidFill>
+                                      <a:schemeClr val="tx1"/>
+                                    </a:solidFill>
+                                    <a:latin typeface="Cambria Math" panose="02040503050406030204" pitchFamily="18" charset="0"/>
+                                    <a:ea typeface="Cambria Math" panose="02040503050406030204" pitchFamily="18" charset="0"/>
+                                  </a:rPr>
+                                  <m:t>𝑀</m:t>
+                                </m:r>
+                              </m:e>
+                              <m:sub>
+                                <m:r>
+                                  <a:rPr lang="en-US" sz="2400" b="0" i="1" smtClean="0">
+                                    <a:solidFill>
+                                      <a:schemeClr val="tx1"/>
+                                    </a:solidFill>
+                                    <a:latin typeface="Cambria Math" panose="02040503050406030204" pitchFamily="18" charset="0"/>
+                                    <a:ea typeface="Cambria Math" panose="02040503050406030204" pitchFamily="18" charset="0"/>
+                                  </a:rPr>
+                                  <m:t>𝑖</m:t>
+                                </m:r>
+                                <m:r>
+                                  <a:rPr lang="en-US" sz="2400" b="0" i="1" smtClean="0">
+                                    <a:solidFill>
+                                      <a:schemeClr val="tx1"/>
+                                    </a:solidFill>
+                                    <a:latin typeface="Cambria Math" panose="02040503050406030204" pitchFamily="18" charset="0"/>
+                                    <a:ea typeface="Cambria Math" panose="02040503050406030204" pitchFamily="18" charset="0"/>
+                                  </a:rPr>
+                                  <m:t>,</m:t>
+                                </m:r>
+                                <m:r>
+                                  <a:rPr lang="en-US" sz="2400" b="0" i="1" smtClean="0">
+                                    <a:solidFill>
+                                      <a:schemeClr val="tx1"/>
+                                    </a:solidFill>
+                                    <a:latin typeface="Cambria Math" panose="02040503050406030204" pitchFamily="18" charset="0"/>
+                                    <a:ea typeface="Cambria Math" panose="02040503050406030204" pitchFamily="18" charset="0"/>
+                                  </a:rPr>
+                                  <m:t>𝑗</m:t>
+                                </m:r>
+                              </m:sub>
+                            </m:sSub>
+                          </m:e>
+                        </m:nary>
+                      </m:oMath>
+                    </m:oMathPara>
+                  </a14:m>
+                  <a:endParaRPr lang="en-US" sz="2400" dirty="0">
                     <a:solidFill>
                       <a:schemeClr val="tx1"/>
                     </a:solidFill>
                     <a:latin typeface="Cambria Math" panose="02040503050406030204" pitchFamily="18" charset="0"/>
                     <a:ea typeface="Cambria Math" panose="02040503050406030204" pitchFamily="18" charset="0"/>
-                  </a:rPr>
-                  <a:t>PWM</a:t>
-                </a:r>
-              </a:p>
-            </p:txBody>
-          </p:sp>
-          <p:sp>
-            <p:nvSpPr>
-              <p:cNvPr id="61" name="Rectangle 60"/>
-              <p:cNvSpPr/>
-              <p:nvPr/>
-            </p:nvSpPr>
-            <p:spPr>
-              <a:xfrm>
-                <a:off x="7849587" y="1472184"/>
-                <a:ext cx="4572000" cy="606467"/>
-              </a:xfrm>
-              <a:prstGeom prst="rect">
-                <a:avLst/>
-              </a:prstGeom>
+                  </a:endParaRPr>
+                </a:p>
+              </p:txBody>
+            </p:sp>
+          </mc:Choice>
+          <mc:Fallback>
+            <p:sp>
+              <p:nvSpPr>
+                <p:cNvPr id="30" name="Rectangle 29"/>
+                <p:cNvSpPr>
+                  <a:spLocks noRot="1" noChangeAspect="1" noMove="1" noResize="1" noEditPoints="1" noAdjustHandles="1" noChangeArrowheads="1" noChangeShapeType="1" noTextEdit="1"/>
+                </p:cNvSpPr>
+                <p:nvPr/>
+              </p:nvSpPr>
+              <p:spPr>
+                <a:xfrm>
+                  <a:off x="8355097" y="2348237"/>
+                  <a:ext cx="2761267" cy="1151875"/>
+                </a:xfrm>
+                <a:prstGeom prst="rect">
+                  <a:avLst/>
+                </a:prstGeom>
+                <a:blipFill rotWithShape="0">
+                  <a:blip r:embed="rId2"/>
+                  <a:stretch>
+                    <a:fillRect/>
+                  </a:stretch>
+                </a:blipFill>
+                <a:ln>
+                  <a:solidFill>
+                    <a:schemeClr val="bg1"/>
+                  </a:solidFill>
+                </a:ln>
+              </p:spPr>
+              <p:txBody>
+                <a:bodyPr/>
+                <a:lstStyle/>
+                <a:p>
+                  <a:r>
+                    <a:rPr lang="en-US">
+                      <a:noFill/>
+                    </a:rPr>
+                    <a:t> </a:t>
+                  </a:r>
+                </a:p>
+              </p:txBody>
+            </p:sp>
+          </mc:Fallback>
+        </mc:AlternateContent>
+        <p:sp>
+          <p:nvSpPr>
+            <p:cNvPr id="31" name="Bent-Up Arrow 30"/>
+            <p:cNvSpPr/>
+            <p:nvPr/>
+          </p:nvSpPr>
+          <p:spPr>
+            <a:xfrm rot="5400000" flipV="1">
+              <a:off x="8787730" y="4055005"/>
+              <a:ext cx="801064" cy="1094938"/>
+            </a:xfrm>
+            <a:prstGeom prst="bentUpArrow">
+              <a:avLst>
+                <a:gd name="adj1" fmla="val 22965"/>
+                <a:gd name="adj2" fmla="val 25000"/>
+                <a:gd name="adj3" fmla="val 25000"/>
+              </a:avLst>
+            </a:prstGeom>
+            <a:solidFill>
+              <a:schemeClr val="tx1"/>
+            </a:solidFill>
+            <a:ln>
+              <a:solidFill>
+                <a:schemeClr val="tx1"/>
+              </a:solidFill>
+            </a:ln>
+          </p:spPr>
+          <p:style>
+            <a:lnRef idx="2">
+              <a:schemeClr val="accent1">
+                <a:shade val="50000"/>
+              </a:schemeClr>
+            </a:lnRef>
+            <a:fillRef idx="1">
+              <a:schemeClr val="accent1"/>
+            </a:fillRef>
+            <a:effectRef idx="0">
+              <a:schemeClr val="accent1"/>
+            </a:effectRef>
+            <a:fontRef idx="minor">
+              <a:schemeClr val="lt1"/>
+            </a:fontRef>
+          </p:style>
+          <p:txBody>
+            <a:bodyPr rtlCol="0" anchor="ctr"/>
+            <a:lstStyle/>
+            <a:p>
+              <a:pPr algn="ctr"/>
+              <a:endParaRPr lang="en-US" dirty="0"/>
+            </a:p>
+          </p:txBody>
+        </p:sp>
+        <p:pic>
+          <p:nvPicPr>
+            <p:cNvPr id="36" name="Picture 35"/>
+            <p:cNvPicPr>
+              <a:picLocks noChangeAspect="1"/>
+            </p:cNvPicPr>
+            <p:nvPr/>
+          </p:nvPicPr>
+          <p:blipFill rotWithShape="1">
+            <a:blip r:embed="rId3"/>
+            <a:srcRect l="12750" t="16058" r="16917" b="16369"/>
+            <a:stretch/>
+          </p:blipFill>
+          <p:spPr>
+            <a:xfrm>
+              <a:off x="5225644" y="3888252"/>
+              <a:ext cx="3043716" cy="1281349"/>
+            </a:xfrm>
+            <a:prstGeom prst="rect">
+              <a:avLst/>
+            </a:prstGeom>
+          </p:spPr>
+        </p:pic>
+        <p:sp>
+          <p:nvSpPr>
+            <p:cNvPr id="37" name="Rectangle 36"/>
+            <p:cNvSpPr/>
+            <p:nvPr/>
+          </p:nvSpPr>
+          <p:spPr>
+            <a:xfrm>
+              <a:off x="5360803" y="5117845"/>
+              <a:ext cx="2855768" cy="653947"/>
+            </a:xfrm>
+            <a:prstGeom prst="rect">
+              <a:avLst/>
+            </a:prstGeom>
+            <a:noFill/>
+            <a:ln>
               <a:noFill/>
-              <a:ln>
-                <a:noFill/>
-              </a:ln>
-            </p:spPr>
-            <p:style>
-              <a:lnRef idx="2">
-                <a:schemeClr val="accent1">
-                  <a:shade val="50000"/>
-                </a:schemeClr>
-              </a:lnRef>
-              <a:fillRef idx="1">
-                <a:schemeClr val="accent1"/>
-              </a:fillRef>
-              <a:effectRef idx="0">
-                <a:schemeClr val="accent1"/>
-              </a:effectRef>
-              <a:fontRef idx="minor">
-                <a:schemeClr val="lt1"/>
-              </a:fontRef>
-            </p:style>
-            <p:txBody>
-              <a:bodyPr rtlCol="0" anchor="ctr"/>
-              <a:lstStyle/>
-              <a:p>
-                <a:pPr algn="ctr"/>
-                <a:r>
-                  <a:rPr lang="en-US" sz="2400" dirty="0">
-                    <a:solidFill>
-                      <a:schemeClr val="tx1"/>
-                    </a:solidFill>
-                    <a:latin typeface="Cambria Math" panose="02040503050406030204" pitchFamily="18" charset="0"/>
-                    <a:ea typeface="Cambria Math" panose="02040503050406030204" pitchFamily="18" charset="0"/>
-                  </a:rPr>
-                  <a:t>M</a:t>
-                </a:r>
-              </a:p>
-            </p:txBody>
-          </p:sp>
-          <p:sp>
-            <p:nvSpPr>
-              <p:cNvPr id="72" name="Rectangle 71"/>
-              <p:cNvSpPr/>
-              <p:nvPr/>
-            </p:nvSpPr>
-            <p:spPr>
-              <a:xfrm>
-                <a:off x="-448166" y="445072"/>
-                <a:ext cx="4572000" cy="606467"/>
-              </a:xfrm>
-              <a:prstGeom prst="rect">
-                <a:avLst/>
-              </a:prstGeom>
+            </a:ln>
+          </p:spPr>
+          <p:style>
+            <a:lnRef idx="2">
+              <a:schemeClr val="accent1">
+                <a:shade val="50000"/>
+              </a:schemeClr>
+            </a:lnRef>
+            <a:fillRef idx="1">
+              <a:schemeClr val="accent1"/>
+            </a:fillRef>
+            <a:effectRef idx="0">
+              <a:schemeClr val="accent1"/>
+            </a:effectRef>
+            <a:fontRef idx="minor">
+              <a:schemeClr val="lt1"/>
+            </a:fontRef>
+          </p:style>
+          <p:txBody>
+            <a:bodyPr rtlCol="0" anchor="ctr"/>
+            <a:lstStyle/>
+            <a:p>
+              <a:pPr algn="ctr"/>
+              <a:r>
+                <a:rPr lang="en-US" sz="2000" dirty="0">
+                  <a:solidFill>
+                    <a:schemeClr val="tx1"/>
+                  </a:solidFill>
+                  <a:latin typeface="Cambria Math" panose="02040503050406030204" pitchFamily="18" charset="0"/>
+                  <a:ea typeface="Cambria Math" panose="02040503050406030204" pitchFamily="18" charset="0"/>
+                </a:rPr>
+                <a:t>Location in sequence</a:t>
+              </a:r>
+            </a:p>
+          </p:txBody>
+        </p:sp>
+        <p:sp>
+          <p:nvSpPr>
+            <p:cNvPr id="92" name="Rectangle 91"/>
+            <p:cNvSpPr/>
+            <p:nvPr/>
+          </p:nvSpPr>
+          <p:spPr>
+            <a:xfrm>
+              <a:off x="3436019" y="4528926"/>
+              <a:ext cx="1745889" cy="575616"/>
+            </a:xfrm>
+            <a:prstGeom prst="rect">
+              <a:avLst/>
+            </a:prstGeom>
+            <a:noFill/>
+            <a:ln>
               <a:noFill/>
-              <a:ln>
-                <a:noFill/>
-              </a:ln>
-            </p:spPr>
-            <p:style>
-              <a:lnRef idx="2">
-                <a:schemeClr val="accent1">
-                  <a:shade val="50000"/>
-                </a:schemeClr>
-              </a:lnRef>
-              <a:fillRef idx="1">
-                <a:schemeClr val="accent1"/>
-              </a:fillRef>
-              <a:effectRef idx="0">
-                <a:schemeClr val="accent1"/>
-              </a:effectRef>
-              <a:fontRef idx="minor">
-                <a:schemeClr val="lt1"/>
-              </a:fontRef>
-            </p:style>
-            <p:txBody>
-              <a:bodyPr rtlCol="0" anchor="ctr"/>
-              <a:lstStyle/>
-              <a:p>
-                <a:pPr algn="ctr"/>
-                <a:r>
-                  <a:rPr lang="en-US" sz="2800" b="1" spc="600">
-                    <a:solidFill>
-                      <a:schemeClr val="bg2">
-                        <a:lumMod val="75000"/>
-                      </a:schemeClr>
-                    </a:solidFill>
-                    <a:latin typeface="Courier New" panose="02070309020205020404" pitchFamily="49" charset="0"/>
-                    <a:cs typeface="Courier New" panose="02070309020205020404" pitchFamily="49" charset="0"/>
-                  </a:rPr>
-                  <a:t>…</a:t>
-                </a:r>
-                <a:r>
-                  <a:rPr lang="en-US" sz="2800" b="1" spc="600" smtClean="0">
-                    <a:solidFill>
-                      <a:schemeClr val="bg2">
-                        <a:lumMod val="75000"/>
-                      </a:schemeClr>
-                    </a:solidFill>
-                    <a:latin typeface="Courier New" panose="02070309020205020404" pitchFamily="49" charset="0"/>
-                    <a:cs typeface="Courier New" panose="02070309020205020404" pitchFamily="49" charset="0"/>
-                  </a:rPr>
-                  <a:t>CG</a:t>
-                </a:r>
-                <a:r>
-                  <a:rPr lang="en-US" sz="2800" b="1" spc="600" smtClean="0">
-                    <a:solidFill>
-                      <a:sysClr val="windowText" lastClr="000000"/>
-                    </a:solidFill>
-                    <a:latin typeface="Courier New" panose="02070309020205020404" pitchFamily="49" charset="0"/>
-                    <a:cs typeface="Courier New" panose="02070309020205020404" pitchFamily="49" charset="0"/>
-                  </a:rPr>
-                  <a:t>ACTCCGTA</a:t>
-                </a:r>
-                <a:r>
-                  <a:rPr lang="en-US" sz="2800" b="1" spc="600" smtClean="0">
-                    <a:solidFill>
-                      <a:schemeClr val="bg2">
-                        <a:lumMod val="75000"/>
-                      </a:schemeClr>
-                    </a:solidFill>
-                    <a:latin typeface="Courier New" panose="02070309020205020404" pitchFamily="49" charset="0"/>
-                    <a:cs typeface="Courier New" panose="02070309020205020404" pitchFamily="49" charset="0"/>
-                  </a:rPr>
-                  <a:t>TA</a:t>
-                </a:r>
-                <a:r>
-                  <a:rPr lang="en-US" sz="2800" b="1" spc="600" dirty="0">
-                    <a:solidFill>
-                      <a:schemeClr val="bg2">
-                        <a:lumMod val="75000"/>
-                      </a:schemeClr>
-                    </a:solidFill>
-                    <a:latin typeface="Courier New" panose="02070309020205020404" pitchFamily="49" charset="0"/>
-                    <a:cs typeface="Courier New" panose="02070309020205020404" pitchFamily="49" charset="0"/>
-                  </a:rPr>
-                  <a:t>…</a:t>
-                </a:r>
-              </a:p>
-            </p:txBody>
-          </p:sp>
-          <p:sp>
-            <p:nvSpPr>
-              <p:cNvPr id="73" name="Rectangle 72"/>
-              <p:cNvSpPr/>
-              <p:nvPr/>
-            </p:nvSpPr>
-            <p:spPr>
-              <a:xfrm>
-                <a:off x="638954" y="525428"/>
-                <a:ext cx="2326640" cy="450835"/>
-              </a:xfrm>
-              <a:prstGeom prst="rect">
-                <a:avLst/>
-              </a:prstGeom>
+            </a:ln>
+          </p:spPr>
+          <p:style>
+            <a:lnRef idx="2">
+              <a:schemeClr val="accent1">
+                <a:shade val="50000"/>
+              </a:schemeClr>
+            </a:lnRef>
+            <a:fillRef idx="1">
+              <a:schemeClr val="accent1"/>
+            </a:fillRef>
+            <a:effectRef idx="0">
+              <a:schemeClr val="accent1"/>
+            </a:effectRef>
+            <a:fontRef idx="minor">
+              <a:schemeClr val="lt1"/>
+            </a:fontRef>
+          </p:style>
+          <p:txBody>
+            <a:bodyPr rtlCol="0" anchor="ctr"/>
+            <a:lstStyle/>
+            <a:p>
+              <a:pPr algn="ctr"/>
+              <a:r>
+                <a:rPr lang="en-US" sz="2000" dirty="0">
+                  <a:solidFill>
+                    <a:schemeClr val="tx1"/>
+                  </a:solidFill>
+                  <a:latin typeface="Cambria Math" panose="02040503050406030204" pitchFamily="18" charset="0"/>
+                  <a:ea typeface="Cambria Math" panose="02040503050406030204" pitchFamily="18" charset="0"/>
+                </a:rPr>
+                <a:t>Log likelihood of TF binding</a:t>
+              </a:r>
+            </a:p>
+          </p:txBody>
+        </p:sp>
+        <p:sp>
+          <p:nvSpPr>
+            <p:cNvPr id="24" name="Rectangle 23"/>
+            <p:cNvSpPr/>
+            <p:nvPr/>
+          </p:nvSpPr>
+          <p:spPr>
+            <a:xfrm>
+              <a:off x="497509" y="1538367"/>
+              <a:ext cx="3683296" cy="575616"/>
+            </a:xfrm>
+            <a:prstGeom prst="rect">
+              <a:avLst/>
+            </a:prstGeom>
+            <a:noFill/>
+            <a:ln>
               <a:noFill/>
-              <a:ln w="38100">
+            </a:ln>
+          </p:spPr>
+          <p:style>
+            <a:lnRef idx="2">
+              <a:schemeClr val="accent1">
+                <a:shade val="50000"/>
+              </a:schemeClr>
+            </a:lnRef>
+            <a:fillRef idx="1">
+              <a:schemeClr val="accent1"/>
+            </a:fillRef>
+            <a:effectRef idx="0">
+              <a:schemeClr val="accent1"/>
+            </a:effectRef>
+            <a:fontRef idx="minor">
+              <a:schemeClr val="lt1"/>
+            </a:fontRef>
+          </p:style>
+          <p:txBody>
+            <a:bodyPr rtlCol="0" anchor="ctr"/>
+            <a:lstStyle/>
+            <a:p>
+              <a:pPr algn="ctr"/>
+              <a:endParaRPr lang="en-US" sz="2800" dirty="0">
+                <a:ln w="0"/>
+                <a:solidFill>
+                  <a:schemeClr val="accent1"/>
+                </a:solidFill>
+                <a:effectLst>
+                  <a:outerShdw blurRad="38100" dist="25400" dir="5400000" algn="ctr" rotWithShape="0">
+                    <a:srgbClr val="6E747A">
+                      <a:alpha val="43000"/>
+                    </a:srgbClr>
+                  </a:outerShdw>
+                </a:effectLst>
+                <a:latin typeface="Courier New" panose="02070309020205020404" pitchFamily="49" charset="0"/>
+                <a:cs typeface="Courier New" panose="02070309020205020404" pitchFamily="49" charset="0"/>
+              </a:endParaRPr>
+            </a:p>
+          </p:txBody>
+        </p:sp>
+        <p:sp>
+          <p:nvSpPr>
+            <p:cNvPr id="25" name="Rectangle 24"/>
+            <p:cNvSpPr/>
+            <p:nvPr/>
+          </p:nvSpPr>
+          <p:spPr>
+            <a:xfrm>
+              <a:off x="-438006" y="1470279"/>
+              <a:ext cx="4572000" cy="606467"/>
+            </a:xfrm>
+            <a:prstGeom prst="rect">
+              <a:avLst/>
+            </a:prstGeom>
+            <a:noFill/>
+            <a:ln>
+              <a:noFill/>
+            </a:ln>
+          </p:spPr>
+          <p:style>
+            <a:lnRef idx="2">
+              <a:schemeClr val="accent1">
+                <a:shade val="50000"/>
+              </a:schemeClr>
+            </a:lnRef>
+            <a:fillRef idx="1">
+              <a:schemeClr val="accent1"/>
+            </a:fillRef>
+            <a:effectRef idx="0">
+              <a:schemeClr val="accent1"/>
+            </a:effectRef>
+            <a:fontRef idx="minor">
+              <a:schemeClr val="lt1"/>
+            </a:fontRef>
+          </p:style>
+          <p:txBody>
+            <a:bodyPr rtlCol="0" anchor="ctr"/>
+            <a:lstStyle/>
+            <a:p>
+              <a:pPr algn="ctr"/>
+              <a:r>
+                <a:rPr lang="en-US" sz="2400" dirty="0">
+                  <a:solidFill>
+                    <a:schemeClr val="tx1"/>
+                  </a:solidFill>
+                  <a:latin typeface="Cambria Math" panose="02040503050406030204" pitchFamily="18" charset="0"/>
+                  <a:ea typeface="Cambria Math" panose="02040503050406030204" pitchFamily="18" charset="0"/>
+                </a:rPr>
+                <a:t>One-hot </a:t>
+              </a:r>
+              <a:r>
+                <a:rPr lang="en-US" sz="2400" dirty="0" smtClean="0">
+                  <a:solidFill>
+                    <a:schemeClr val="tx1"/>
+                  </a:solidFill>
+                  <a:latin typeface="Cambria Math" panose="02040503050406030204" pitchFamily="18" charset="0"/>
+                  <a:ea typeface="Cambria Math" panose="02040503050406030204" pitchFamily="18" charset="0"/>
+                </a:rPr>
+                <a:t>encoding (H)</a:t>
+              </a:r>
+              <a:endParaRPr lang="en-US" sz="2400" dirty="0">
                 <a:solidFill>
                   <a:schemeClr val="tx1"/>
                 </a:solidFill>
-              </a:ln>
-            </p:spPr>
-            <p:style>
-              <a:lnRef idx="2">
-                <a:schemeClr val="accent1">
-                  <a:shade val="50000"/>
-                </a:schemeClr>
-              </a:lnRef>
-              <a:fillRef idx="1">
-                <a:schemeClr val="accent1"/>
-              </a:fillRef>
-              <a:effectRef idx="0">
-                <a:schemeClr val="accent1"/>
-              </a:effectRef>
-              <a:fontRef idx="minor">
-                <a:schemeClr val="lt1"/>
-              </a:fontRef>
-            </p:style>
-            <p:txBody>
-              <a:bodyPr rtlCol="0" anchor="ctr"/>
-              <a:lstStyle/>
-              <a:p>
-                <a:pPr algn="ctr"/>
-                <a:endParaRPr lang="en-US" dirty="0"/>
-              </a:p>
-            </p:txBody>
-          </p:sp>
-          <p:cxnSp>
-            <p:nvCxnSpPr>
-              <p:cNvPr id="74" name="Straight Arrow Connector 73"/>
-              <p:cNvCxnSpPr/>
-              <p:nvPr/>
-            </p:nvCxnSpPr>
-            <p:spPr>
-              <a:xfrm>
-                <a:off x="2833948" y="457381"/>
-                <a:ext cx="901161" cy="3397"/>
-              </a:xfrm>
-              <a:prstGeom prst="straightConnector1">
-                <a:avLst/>
-              </a:prstGeom>
-              <a:ln w="57150">
-                <a:solidFill>
-                  <a:srgbClr val="C00000"/>
-                </a:solidFill>
-                <a:tailEnd type="triangle"/>
-              </a:ln>
-            </p:spPr>
-            <p:style>
-              <a:lnRef idx="1">
-                <a:schemeClr val="accent1"/>
-              </a:lnRef>
-              <a:fillRef idx="0">
-                <a:schemeClr val="accent1"/>
-              </a:fillRef>
-              <a:effectRef idx="0">
-                <a:schemeClr val="accent1"/>
-              </a:effectRef>
-              <a:fontRef idx="minor">
-                <a:schemeClr val="tx1"/>
-              </a:fontRef>
-            </p:style>
-          </p:cxnSp>
-          <mc:AlternateContent xmlns:mc="http://schemas.openxmlformats.org/markup-compatibility/2006">
-            <mc:Choice xmlns:a14="http://schemas.microsoft.com/office/drawing/2010/main" Requires="a14">
-              <p:sp>
-                <p:nvSpPr>
-                  <p:cNvPr id="30" name="Rectangle 29"/>
-                  <p:cNvSpPr/>
-                  <p:nvPr/>
-                </p:nvSpPr>
-                <p:spPr>
-                  <a:xfrm>
-                    <a:off x="7045673" y="4219372"/>
-                    <a:ext cx="2761267" cy="1151875"/>
-                  </a:xfrm>
-                  <a:prstGeom prst="rect">
-                    <a:avLst/>
-                  </a:prstGeom>
-                  <a:noFill/>
-                  <a:ln>
-                    <a:solidFill>
-                      <a:schemeClr val="bg1"/>
-                    </a:solidFill>
-                  </a:ln>
-                </p:spPr>
-                <p:style>
-                  <a:lnRef idx="2">
-                    <a:schemeClr val="accent1">
-                      <a:shade val="50000"/>
-                    </a:schemeClr>
-                  </a:lnRef>
-                  <a:fillRef idx="1">
-                    <a:schemeClr val="accent1"/>
-                  </a:fillRef>
-                  <a:effectRef idx="0">
-                    <a:schemeClr val="accent1"/>
-                  </a:effectRef>
-                  <a:fontRef idx="minor">
-                    <a:schemeClr val="lt1"/>
-                  </a:fontRef>
-                </p:style>
-                <p:txBody>
-                  <a:bodyPr rtlCol="0" anchor="ctr"/>
-                  <a:lstStyle/>
-                  <a:p>
-                    <a:pPr algn="ctr"/>
-                    <a14:m>
-                      <m:oMathPara xmlns:m="http://schemas.openxmlformats.org/officeDocument/2006/math">
-                        <m:oMathParaPr>
-                          <m:jc m:val="centerGroup"/>
-                        </m:oMathParaPr>
-                        <m:oMath xmlns:m="http://schemas.openxmlformats.org/officeDocument/2006/math">
-                          <m:nary>
-                            <m:naryPr>
-                              <m:chr m:val="∑"/>
-                              <m:supHide m:val="on"/>
-                              <m:ctrlPr>
-                                <a:rPr lang="en-US" sz="2400" i="1" smtClean="0">
-                                  <a:solidFill>
-                                    <a:schemeClr val="tx1"/>
-                                  </a:solidFill>
-                                  <a:latin typeface="Cambria Math" panose="02040503050406030204" pitchFamily="18" charset="0"/>
-                                  <a:ea typeface="Cambria Math" panose="02040503050406030204" pitchFamily="18" charset="0"/>
-                                </a:rPr>
-                              </m:ctrlPr>
-                            </m:naryPr>
-                            <m:sub>
-                              <m:r>
-                                <m:rPr>
-                                  <m:sty m:val="p"/>
-                                </m:rPr>
-                                <a:rPr lang="en-GB" sz="2400" b="0" i="0" smtClean="0">
-                                  <a:solidFill>
-                                    <a:schemeClr val="tx1"/>
-                                  </a:solidFill>
-                                  <a:latin typeface="Cambria Math" panose="02040503050406030204" pitchFamily="18" charset="0"/>
-                                  <a:ea typeface="Cambria Math" panose="02040503050406030204" pitchFamily="18" charset="0"/>
-                                </a:rPr>
-                                <m:t>j</m:t>
-                              </m:r>
-                            </m:sub>
-                            <m:sup/>
-                            <m:e>
-                              <m:r>
-                                <m:rPr>
-                                  <m:sty m:val="p"/>
-                                </m:rPr>
-                                <a:rPr lang="en-US" sz="2400" smtClean="0">
-                                  <a:solidFill>
-                                    <a:schemeClr val="tx1"/>
-                                  </a:solidFill>
-                                  <a:latin typeface="Cambria Math" panose="02040503050406030204" pitchFamily="18" charset="0"/>
-                                  <a:ea typeface="Cambria Math" panose="02040503050406030204" pitchFamily="18" charset="0"/>
-                                </a:rPr>
-                                <m:t>log</m:t>
-                              </m:r>
-                              <m:r>
-                                <a:rPr lang="en-US" sz="2400" smtClean="0">
-                                  <a:solidFill>
-                                    <a:schemeClr val="tx1"/>
-                                  </a:solidFill>
-                                  <a:latin typeface="Cambria Math" panose="02040503050406030204" pitchFamily="18" charset="0"/>
-                                  <a:ea typeface="Cambria Math" panose="02040503050406030204" pitchFamily="18" charset="0"/>
-                                </a:rPr>
-                                <m:t>⁡</m:t>
-                              </m:r>
-                              <m:d>
-                                <m:dPr>
-                                  <m:ctrlPr>
-                                    <a:rPr lang="en-US" sz="2400" i="1">
-                                      <a:solidFill>
-                                        <a:schemeClr val="tx1"/>
-                                      </a:solidFill>
-                                      <a:latin typeface="Cambria Math" panose="02040503050406030204" pitchFamily="18" charset="0"/>
-                                      <a:ea typeface="Cambria Math" panose="02040503050406030204" pitchFamily="18" charset="0"/>
-                                    </a:rPr>
-                                  </m:ctrlPr>
-                                </m:dPr>
-                                <m:e>
-                                  <m:func>
-                                    <m:funcPr>
-                                      <m:ctrlPr>
-                                        <a:rPr lang="en-GB" sz="2400" b="0" i="0" smtClean="0">
-                                          <a:solidFill>
-                                            <a:schemeClr val="tx1"/>
-                                          </a:solidFill>
-                                          <a:latin typeface="Cambria Math" panose="02040503050406030204" pitchFamily="18" charset="0"/>
-                                          <a:ea typeface="Cambria Math" panose="02040503050406030204" pitchFamily="18" charset="0"/>
-                                        </a:rPr>
-                                      </m:ctrlPr>
-                                    </m:funcPr>
-                                    <m:fName>
-                                      <m:limLow>
-                                        <m:limLowPr>
-                                          <m:ctrlPr>
-                                            <a:rPr lang="en-GB" sz="2400" b="0" i="0" smtClean="0">
-                                              <a:solidFill>
-                                                <a:schemeClr val="tx1"/>
-                                              </a:solidFill>
-                                              <a:latin typeface="Cambria Math" panose="02040503050406030204" pitchFamily="18" charset="0"/>
-                                              <a:ea typeface="Cambria Math" panose="02040503050406030204" pitchFamily="18" charset="0"/>
-                                            </a:rPr>
-                                          </m:ctrlPr>
-                                        </m:limLowPr>
-                                        <m:e>
-                                          <m:r>
-                                            <m:rPr>
-                                              <m:sty m:val="p"/>
-                                            </m:rPr>
-                                            <a:rPr lang="en-US" sz="2400">
-                                              <a:solidFill>
-                                                <a:schemeClr val="tx1"/>
-                                              </a:solidFill>
-                                              <a:latin typeface="Cambria Math" panose="02040503050406030204" pitchFamily="18" charset="0"/>
-                                              <a:ea typeface="Cambria Math" panose="02040503050406030204" pitchFamily="18" charset="0"/>
-                                            </a:rPr>
-                                            <m:t>max</m:t>
-                                          </m:r>
-                                        </m:e>
-                                        <m:lim>
-                                          <m:r>
-                                            <m:rPr>
-                                              <m:sty m:val="p"/>
-                                            </m:rPr>
-                                            <a:rPr lang="en-GB" sz="2400" b="0" i="0" smtClean="0">
-                                              <a:solidFill>
-                                                <a:schemeClr val="tx1"/>
-                                              </a:solidFill>
-                                              <a:latin typeface="Cambria Math" panose="02040503050406030204" pitchFamily="18" charset="0"/>
-                                              <a:ea typeface="Cambria Math" panose="02040503050406030204" pitchFamily="18" charset="0"/>
-                                            </a:rPr>
-                                            <m:t>i</m:t>
-                                          </m:r>
-                                        </m:lim>
-                                      </m:limLow>
-                                    </m:fName>
-                                    <m:e>
-                                      <m:d>
-                                        <m:dPr>
-                                          <m:ctrlPr>
-                                            <a:rPr lang="en-US" sz="2400" i="1">
-                                              <a:solidFill>
-                                                <a:schemeClr val="tx1"/>
-                                              </a:solidFill>
-                                              <a:latin typeface="Cambria Math" panose="02040503050406030204" pitchFamily="18" charset="0"/>
-                                              <a:ea typeface="Cambria Math" panose="02040503050406030204" pitchFamily="18" charset="0"/>
-                                            </a:rPr>
-                                          </m:ctrlPr>
-                                        </m:dPr>
-                                        <m:e>
-                                          <m:sSub>
-                                            <m:sSubPr>
-                                              <m:ctrlPr>
-                                                <a:rPr lang="en-US" sz="2400" i="1">
-                                                  <a:solidFill>
-                                                    <a:schemeClr val="tx1"/>
-                                                  </a:solidFill>
-                                                  <a:latin typeface="Cambria Math" panose="02040503050406030204" pitchFamily="18" charset="0"/>
-                                                  <a:ea typeface="Cambria Math" panose="02040503050406030204" pitchFamily="18" charset="0"/>
-                                                </a:rPr>
-                                              </m:ctrlPr>
-                                            </m:sSubPr>
-                                            <m:e>
-                                              <m:r>
-                                                <a:rPr lang="en-US" sz="2400">
-                                                  <a:solidFill>
-                                                    <a:schemeClr val="tx1"/>
-                                                  </a:solidFill>
-                                                  <a:latin typeface="Cambria Math" panose="02040503050406030204" pitchFamily="18" charset="0"/>
-                                                  <a:ea typeface="Cambria Math" panose="02040503050406030204" pitchFamily="18" charset="0"/>
-                                                </a:rPr>
-                                                <m:t>𝑀</m:t>
-                                              </m:r>
-                                            </m:e>
-                                            <m:sub>
-                                              <m:r>
-                                                <m:rPr>
-                                                  <m:sty m:val="p"/>
-                                                </m:rPr>
-                                                <a:rPr lang="en-GB" sz="2400" b="0" i="0" smtClean="0">
-                                                  <a:solidFill>
-                                                    <a:schemeClr val="tx1"/>
-                                                  </a:solidFill>
-                                                  <a:latin typeface="Cambria Math" panose="02040503050406030204" pitchFamily="18" charset="0"/>
-                                                  <a:ea typeface="Cambria Math" panose="02040503050406030204" pitchFamily="18" charset="0"/>
-                                                </a:rPr>
-                                                <m:t>i</m:t>
-                                              </m:r>
-                                              <m:r>
-                                                <a:rPr lang="en-GB" sz="2400" b="0" i="0" smtClean="0">
-                                                  <a:solidFill>
-                                                    <a:schemeClr val="tx1"/>
-                                                  </a:solidFill>
-                                                  <a:latin typeface="Cambria Math" panose="02040503050406030204" pitchFamily="18" charset="0"/>
-                                                  <a:ea typeface="Cambria Math" panose="02040503050406030204" pitchFamily="18" charset="0"/>
-                                                </a:rPr>
-                                                <m:t>,</m:t>
-                                              </m:r>
-                                              <m:r>
-                                                <m:rPr>
-                                                  <m:sty m:val="p"/>
-                                                </m:rPr>
-                                                <a:rPr lang="en-GB" sz="2400" b="0" i="0" smtClean="0">
-                                                  <a:solidFill>
-                                                    <a:schemeClr val="tx1"/>
-                                                  </a:solidFill>
-                                                  <a:latin typeface="Cambria Math" panose="02040503050406030204" pitchFamily="18" charset="0"/>
-                                                  <a:ea typeface="Cambria Math" panose="02040503050406030204" pitchFamily="18" charset="0"/>
-                                                </a:rPr>
-                                                <m:t>j</m:t>
-                                              </m:r>
-                                            </m:sub>
-                                          </m:sSub>
-                                        </m:e>
-                                      </m:d>
-                                    </m:e>
-                                  </m:func>
-                                </m:e>
-                              </m:d>
-                              <m:r>
-                                <m:rPr>
-                                  <m:nor/>
-                                </m:rPr>
-                                <a:rPr lang="en-US" sz="2400" dirty="0">
-                                  <a:solidFill>
-                                    <a:schemeClr val="tx1"/>
-                                  </a:solidFill>
-                                  <a:latin typeface="Cambria Math" panose="02040503050406030204" pitchFamily="18" charset="0"/>
-                                  <a:ea typeface="Cambria Math" panose="02040503050406030204" pitchFamily="18" charset="0"/>
-                                </a:rPr>
-                                <m:t>=</m:t>
-                              </m:r>
-                              <m:r>
-                                <m:rPr>
-                                  <m:nor/>
-                                </m:rPr>
-                                <a:rPr lang="en-US" sz="2400" dirty="0" smtClean="0">
-                                  <a:solidFill>
-                                    <a:schemeClr val="tx1"/>
-                                  </a:solidFill>
-                                  <a:latin typeface="Cambria Math" panose="02040503050406030204" pitchFamily="18" charset="0"/>
-                                  <a:ea typeface="Cambria Math" panose="02040503050406030204" pitchFamily="18" charset="0"/>
-                                </a:rPr>
-                                <m:t>6.</m:t>
-                              </m:r>
-                              <m:r>
-                                <m:rPr>
-                                  <m:nor/>
-                                </m:rPr>
-                                <a:rPr lang="en-US" sz="2400" b="0" i="0" dirty="0" smtClean="0">
-                                  <a:solidFill>
-                                    <a:schemeClr val="tx1"/>
-                                  </a:solidFill>
-                                  <a:latin typeface="Cambria Math" panose="02040503050406030204" pitchFamily="18" charset="0"/>
-                                  <a:ea typeface="Cambria Math" panose="02040503050406030204" pitchFamily="18" charset="0"/>
-                                </a:rPr>
-                                <m:t>8</m:t>
-                              </m:r>
-                            </m:e>
-                          </m:nary>
-                        </m:oMath>
-                      </m:oMathPara>
-                    </a14:m>
-                    <a:endParaRPr lang="en-US" sz="2400" dirty="0">
-                      <a:solidFill>
-                        <a:schemeClr val="tx1"/>
-                      </a:solidFill>
-                      <a:latin typeface="Cambria Math" panose="02040503050406030204" pitchFamily="18" charset="0"/>
-                      <a:ea typeface="Cambria Math" panose="02040503050406030204" pitchFamily="18" charset="0"/>
-                    </a:endParaRPr>
-                  </a:p>
-                </p:txBody>
-              </p:sp>
-            </mc:Choice>
-            <mc:Fallback>
-              <p:sp>
-                <p:nvSpPr>
-                  <p:cNvPr id="30" name="Rectangle 29"/>
-                  <p:cNvSpPr>
-                    <a:spLocks noRot="1" noChangeAspect="1" noMove="1" noResize="1" noEditPoints="1" noAdjustHandles="1" noChangeArrowheads="1" noChangeShapeType="1" noTextEdit="1"/>
-                  </p:cNvSpPr>
-                  <p:nvPr/>
-                </p:nvSpPr>
-                <p:spPr>
-                  <a:xfrm>
-                    <a:off x="7045673" y="4219372"/>
-                    <a:ext cx="2761267" cy="1151875"/>
-                  </a:xfrm>
-                  <a:prstGeom prst="rect">
-                    <a:avLst/>
-                  </a:prstGeom>
-                  <a:blipFill rotWithShape="0">
-                    <a:blip r:embed="rId2"/>
-                    <a:stretch>
-                      <a:fillRect l="-7692" r="-5055"/>
-                    </a:stretch>
-                  </a:blipFill>
-                  <a:ln>
-                    <a:solidFill>
-                      <a:schemeClr val="bg1"/>
-                    </a:solidFill>
-                  </a:ln>
-                </p:spPr>
-                <p:txBody>
-                  <a:bodyPr/>
-                  <a:lstStyle/>
-                  <a:p>
-                    <a:r>
-                      <a:rPr lang="en-US">
-                        <a:noFill/>
-                      </a:rPr>
-                      <a:t> </a:t>
-                    </a:r>
-                  </a:p>
-                </p:txBody>
-              </p:sp>
-            </mc:Fallback>
-          </mc:AlternateContent>
-          <p:sp>
-            <p:nvSpPr>
-              <p:cNvPr id="31" name="Bent-Up Arrow 30"/>
-              <p:cNvSpPr/>
-              <p:nvPr/>
-            </p:nvSpPr>
-            <p:spPr>
-              <a:xfrm rot="5400000" flipV="1">
-                <a:off x="10531095" y="4007233"/>
-                <a:ext cx="801064" cy="1094938"/>
-              </a:xfrm>
-              <a:prstGeom prst="bentUpArrow">
-                <a:avLst>
-                  <a:gd name="adj1" fmla="val 22965"/>
-                  <a:gd name="adj2" fmla="val 25000"/>
-                  <a:gd name="adj3" fmla="val 25000"/>
-                </a:avLst>
-              </a:prstGeom>
-              <a:solidFill>
-                <a:schemeClr val="tx1"/>
-              </a:solidFill>
-              <a:ln>
-                <a:solidFill>
-                  <a:schemeClr val="tx1"/>
-                </a:solidFill>
-              </a:ln>
-            </p:spPr>
-            <p:style>
-              <a:lnRef idx="2">
-                <a:schemeClr val="accent1">
-                  <a:shade val="50000"/>
-                </a:schemeClr>
-              </a:lnRef>
-              <a:fillRef idx="1">
-                <a:schemeClr val="accent1"/>
-              </a:fillRef>
-              <a:effectRef idx="0">
-                <a:schemeClr val="accent1"/>
-              </a:effectRef>
-              <a:fontRef idx="minor">
-                <a:schemeClr val="lt1"/>
-              </a:fontRef>
-            </p:style>
-            <p:txBody>
-              <a:bodyPr rtlCol="0" anchor="ctr"/>
-              <a:lstStyle/>
-              <a:p>
-                <a:pPr algn="ctr"/>
-                <a:endParaRPr lang="en-US" dirty="0"/>
-              </a:p>
-            </p:txBody>
-          </p:sp>
-          <p:pic>
-            <p:nvPicPr>
-              <p:cNvPr id="36" name="Picture 35"/>
-              <p:cNvPicPr>
-                <a:picLocks noChangeAspect="1"/>
-              </p:cNvPicPr>
-              <p:nvPr/>
-            </p:nvPicPr>
-            <p:blipFill rotWithShape="1">
-              <a:blip r:embed="rId3"/>
-              <a:srcRect l="12750" t="16058" r="16917" b="16369"/>
-              <a:stretch/>
-            </p:blipFill>
-            <p:spPr>
-              <a:xfrm>
-                <a:off x="2633229" y="3903529"/>
-                <a:ext cx="3043716" cy="1281349"/>
-              </a:xfrm>
-              <a:prstGeom prst="rect">
-                <a:avLst/>
-              </a:prstGeom>
-            </p:spPr>
-          </p:pic>
-          <p:sp>
-            <p:nvSpPr>
-              <p:cNvPr id="37" name="Rectangle 36"/>
-              <p:cNvSpPr/>
-              <p:nvPr/>
-            </p:nvSpPr>
-            <p:spPr>
-              <a:xfrm>
-                <a:off x="2768388" y="5133122"/>
-                <a:ext cx="2855768" cy="653947"/>
-              </a:xfrm>
-              <a:prstGeom prst="rect">
-                <a:avLst/>
-              </a:prstGeom>
-              <a:noFill/>
-              <a:ln>
-                <a:noFill/>
-              </a:ln>
-            </p:spPr>
-            <p:style>
-              <a:lnRef idx="2">
-                <a:schemeClr val="accent1">
-                  <a:shade val="50000"/>
-                </a:schemeClr>
-              </a:lnRef>
-              <a:fillRef idx="1">
-                <a:schemeClr val="accent1"/>
-              </a:fillRef>
-              <a:effectRef idx="0">
-                <a:schemeClr val="accent1"/>
-              </a:effectRef>
-              <a:fontRef idx="minor">
-                <a:schemeClr val="lt1"/>
-              </a:fontRef>
-            </p:style>
-            <p:txBody>
-              <a:bodyPr rtlCol="0" anchor="ctr"/>
-              <a:lstStyle/>
-              <a:p>
-                <a:pPr algn="ctr"/>
-                <a:r>
-                  <a:rPr lang="en-US" sz="2000" dirty="0">
-                    <a:solidFill>
-                      <a:schemeClr val="tx1"/>
-                    </a:solidFill>
-                    <a:latin typeface="Cambria Math" panose="02040503050406030204" pitchFamily="18" charset="0"/>
-                    <a:ea typeface="Cambria Math" panose="02040503050406030204" pitchFamily="18" charset="0"/>
-                  </a:rPr>
-                  <a:t>Location in sequence</a:t>
-                </a:r>
-              </a:p>
-            </p:txBody>
-          </p:sp>
-          <p:sp>
-            <p:nvSpPr>
-              <p:cNvPr id="92" name="Rectangle 91"/>
-              <p:cNvSpPr/>
-              <p:nvPr/>
-            </p:nvSpPr>
-            <p:spPr>
-              <a:xfrm>
-                <a:off x="843604" y="4544203"/>
-                <a:ext cx="1745889" cy="575616"/>
-              </a:xfrm>
-              <a:prstGeom prst="rect">
-                <a:avLst/>
-              </a:prstGeom>
-              <a:noFill/>
-              <a:ln>
-                <a:noFill/>
-              </a:ln>
-            </p:spPr>
-            <p:style>
-              <a:lnRef idx="2">
-                <a:schemeClr val="accent1">
-                  <a:shade val="50000"/>
-                </a:schemeClr>
-              </a:lnRef>
-              <a:fillRef idx="1">
-                <a:schemeClr val="accent1"/>
-              </a:fillRef>
-              <a:effectRef idx="0">
-                <a:schemeClr val="accent1"/>
-              </a:effectRef>
-              <a:fontRef idx="minor">
-                <a:schemeClr val="lt1"/>
-              </a:fontRef>
-            </p:style>
-            <p:txBody>
-              <a:bodyPr rtlCol="0" anchor="ctr"/>
-              <a:lstStyle/>
-              <a:p>
-                <a:pPr algn="ctr"/>
-                <a:r>
-                  <a:rPr lang="en-US" sz="2000" dirty="0">
-                    <a:solidFill>
-                      <a:schemeClr val="tx1"/>
-                    </a:solidFill>
-                    <a:latin typeface="Cambria Math" panose="02040503050406030204" pitchFamily="18" charset="0"/>
-                    <a:ea typeface="Cambria Math" panose="02040503050406030204" pitchFamily="18" charset="0"/>
-                  </a:rPr>
-                  <a:t>Log likelihood of TF binding</a:t>
-                </a:r>
-              </a:p>
-            </p:txBody>
-          </p:sp>
-          <p:sp>
-            <p:nvSpPr>
-              <p:cNvPr id="38" name="Left Arrow 37"/>
-              <p:cNvSpPr/>
-              <p:nvPr/>
-            </p:nvSpPr>
-            <p:spPr>
-              <a:xfrm>
-                <a:off x="5895726" y="4596605"/>
-                <a:ext cx="654009" cy="338309"/>
-              </a:xfrm>
-              <a:prstGeom prst="leftArrow">
-                <a:avLst/>
-              </a:prstGeom>
-            </p:spPr>
-            <p:style>
-              <a:lnRef idx="2">
-                <a:schemeClr val="dk1">
-                  <a:shade val="50000"/>
-                </a:schemeClr>
-              </a:lnRef>
-              <a:fillRef idx="1">
-                <a:schemeClr val="dk1"/>
-              </a:fillRef>
-              <a:effectRef idx="0">
-                <a:schemeClr val="dk1"/>
-              </a:effectRef>
-              <a:fontRef idx="minor">
-                <a:schemeClr val="lt1"/>
-              </a:fontRef>
-            </p:style>
-            <p:txBody>
-              <a:bodyPr rtlCol="0" anchor="ctr"/>
-              <a:lstStyle/>
-              <a:p>
-                <a:pPr algn="ctr"/>
-                <a:endParaRPr lang="en-US" dirty="0"/>
-              </a:p>
-            </p:txBody>
-          </p:sp>
-          <p:sp>
-            <p:nvSpPr>
-              <p:cNvPr id="24" name="Rectangle 23"/>
-              <p:cNvSpPr/>
-              <p:nvPr/>
-            </p:nvSpPr>
-            <p:spPr>
-              <a:xfrm>
-                <a:off x="487349" y="1540272"/>
-                <a:ext cx="3683296" cy="575616"/>
-              </a:xfrm>
-              <a:prstGeom prst="rect">
-                <a:avLst/>
-              </a:prstGeom>
-              <a:noFill/>
-              <a:ln>
-                <a:noFill/>
-              </a:ln>
-            </p:spPr>
-            <p:style>
-              <a:lnRef idx="2">
-                <a:schemeClr val="accent1">
-                  <a:shade val="50000"/>
-                </a:schemeClr>
-              </a:lnRef>
-              <a:fillRef idx="1">
-                <a:schemeClr val="accent1"/>
-              </a:fillRef>
-              <a:effectRef idx="0">
-                <a:schemeClr val="accent1"/>
-              </a:effectRef>
-              <a:fontRef idx="minor">
-                <a:schemeClr val="lt1"/>
-              </a:fontRef>
-            </p:style>
-            <p:txBody>
-              <a:bodyPr rtlCol="0" anchor="ctr"/>
-              <a:lstStyle/>
-              <a:p>
-                <a:pPr algn="ctr"/>
-                <a:endParaRPr lang="en-US" sz="2800" dirty="0">
-                  <a:ln w="0"/>
-                  <a:solidFill>
-                    <a:schemeClr val="accent1"/>
-                  </a:solidFill>
-                  <a:effectLst>
-                    <a:outerShdw blurRad="38100" dist="25400" dir="5400000" algn="ctr" rotWithShape="0">
-                      <a:srgbClr val="6E747A">
-                        <a:alpha val="43000"/>
-                      </a:srgbClr>
-                    </a:outerShdw>
-                  </a:effectLst>
-                  <a:latin typeface="Courier New" panose="02070309020205020404" pitchFamily="49" charset="0"/>
-                  <a:cs typeface="Courier New" panose="02070309020205020404" pitchFamily="49" charset="0"/>
-                </a:endParaRPr>
-              </a:p>
-            </p:txBody>
-          </p:sp>
-          <p:sp>
-            <p:nvSpPr>
-              <p:cNvPr id="25" name="Rectangle 24"/>
-              <p:cNvSpPr/>
-              <p:nvPr/>
-            </p:nvSpPr>
-            <p:spPr>
-              <a:xfrm>
-                <a:off x="-448166" y="1472184"/>
-                <a:ext cx="4572000" cy="606467"/>
-              </a:xfrm>
-              <a:prstGeom prst="rect">
-                <a:avLst/>
-              </a:prstGeom>
-              <a:noFill/>
-              <a:ln>
-                <a:noFill/>
-              </a:ln>
-            </p:spPr>
-            <p:style>
-              <a:lnRef idx="2">
-                <a:schemeClr val="accent1">
-                  <a:shade val="50000"/>
-                </a:schemeClr>
-              </a:lnRef>
-              <a:fillRef idx="1">
-                <a:schemeClr val="accent1"/>
-              </a:fillRef>
-              <a:effectRef idx="0">
-                <a:schemeClr val="accent1"/>
-              </a:effectRef>
-              <a:fontRef idx="minor">
-                <a:schemeClr val="lt1"/>
-              </a:fontRef>
-            </p:style>
-            <p:txBody>
-              <a:bodyPr rtlCol="0" anchor="ctr"/>
-              <a:lstStyle/>
-              <a:p>
-                <a:pPr algn="ctr"/>
-                <a:r>
-                  <a:rPr lang="en-US" sz="2400" dirty="0">
-                    <a:solidFill>
-                      <a:schemeClr val="tx1"/>
-                    </a:solidFill>
-                    <a:latin typeface="Cambria Math" panose="02040503050406030204" pitchFamily="18" charset="0"/>
-                    <a:ea typeface="Cambria Math" panose="02040503050406030204" pitchFamily="18" charset="0"/>
-                  </a:rPr>
-                  <a:t>One-hot encoding</a:t>
-                </a:r>
-              </a:p>
-            </p:txBody>
-          </p:sp>
-        </p:grpSp>
+                <a:latin typeface="Cambria Math" panose="02040503050406030204" pitchFamily="18" charset="0"/>
+                <a:ea typeface="Cambria Math" panose="02040503050406030204" pitchFamily="18" charset="0"/>
+              </a:endParaRPr>
+            </a:p>
+          </p:txBody>
+        </p:sp>
         <p:pic>
           <p:nvPicPr>
             <p:cNvPr id="9" name="Picture 8"/>
@@ -44018,30 +44779,66 @@
             </a:prstGeom>
           </p:spPr>
         </p:pic>
-        <p:pic>
-          <p:nvPicPr>
-            <p:cNvPr id="13" name="Picture 12"/>
-            <p:cNvPicPr>
-              <a:picLocks noChangeAspect="1"/>
-            </p:cNvPicPr>
+        <p:sp>
+          <p:nvSpPr>
+            <p:cNvPr id="26" name="Round Diagonal Corner Rectangle 25"/>
+            <p:cNvSpPr/>
             <p:nvPr/>
-          </p:nvPicPr>
-          <p:blipFill>
-            <a:blip r:embed="rId6"/>
-            <a:stretch>
-              <a:fillRect/>
-            </a:stretch>
-          </p:blipFill>
+          </p:nvSpPr>
           <p:spPr>
             <a:xfrm>
-              <a:off x="8386797" y="2028190"/>
-              <a:ext cx="3634002" cy="1828800"/>
+              <a:off x="3763741" y="2877882"/>
+              <a:ext cx="300258" cy="311022"/>
             </a:xfrm>
-            <a:prstGeom prst="rect">
+            <a:prstGeom prst="round2DiagRect">
               <a:avLst/>
             </a:prstGeom>
+            <a:solidFill>
+              <a:schemeClr val="bg1"/>
+            </a:solidFill>
+            <a:ln>
+              <a:solidFill>
+                <a:schemeClr val="bg1"/>
+              </a:solidFill>
+            </a:ln>
           </p:spPr>
-        </p:pic>
+          <p:style>
+            <a:lnRef idx="2">
+              <a:schemeClr val="accent1">
+                <a:shade val="50000"/>
+              </a:schemeClr>
+            </a:lnRef>
+            <a:fillRef idx="1">
+              <a:schemeClr val="accent1"/>
+            </a:fillRef>
+            <a:effectRef idx="0">
+              <a:schemeClr val="accent1"/>
+            </a:effectRef>
+            <a:fontRef idx="minor">
+              <a:schemeClr val="lt1"/>
+            </a:fontRef>
+          </p:style>
+          <p:txBody>
+            <a:bodyPr rtlCol="0" anchor="ctr"/>
+            <a:lstStyle/>
+            <a:p>
+              <a:pPr algn="ctr"/>
+              <a:r>
+                <a:rPr lang="en-GB" sz="5400" dirty="0">
+                  <a:solidFill>
+                    <a:schemeClr val="tx1"/>
+                  </a:solidFill>
+                </a:rPr>
+                <a:t>*</a:t>
+              </a:r>
+              <a:endParaRPr lang="en-US" sz="5400" dirty="0">
+                <a:solidFill>
+                  <a:schemeClr val="tx1"/>
+                </a:solidFill>
+              </a:endParaRPr>
+            </a:p>
+          </p:txBody>
+        </p:sp>
       </p:grpSp>
     </p:spTree>
     <p:extLst>

</xml_diff>